<commit_message>
Inseriti shrinkage methods + inizio alberi
</commit_message>
<xml_diff>
--- a/Presentazione_Gotti_Mazzoleni.pptx
+++ b/Presentazione_Gotti_Mazzoleni.pptx
@@ -5,33 +5,43 @@
     <p:sldMasterId id="2147483648" r:id="rId1"/>
   </p:sldMasterIdLst>
   <p:notesMasterIdLst>
-    <p:notesMasterId r:id="rId26"/>
+    <p:notesMasterId r:id="rId36"/>
   </p:notesMasterIdLst>
   <p:sldIdLst>
     <p:sldId id="256" r:id="rId2"/>
-    <p:sldId id="262" r:id="rId3"/>
-    <p:sldId id="317" r:id="rId4"/>
-    <p:sldId id="263" r:id="rId5"/>
-    <p:sldId id="264" r:id="rId6"/>
-    <p:sldId id="270" r:id="rId7"/>
-    <p:sldId id="271" r:id="rId8"/>
-    <p:sldId id="318" r:id="rId9"/>
-    <p:sldId id="319" r:id="rId10"/>
-    <p:sldId id="320" r:id="rId11"/>
-    <p:sldId id="272" r:id="rId12"/>
-    <p:sldId id="321" r:id="rId13"/>
-    <p:sldId id="322" r:id="rId14"/>
-    <p:sldId id="323" r:id="rId15"/>
-    <p:sldId id="324" r:id="rId16"/>
-    <p:sldId id="325" r:id="rId17"/>
-    <p:sldId id="326" r:id="rId18"/>
-    <p:sldId id="327" r:id="rId19"/>
-    <p:sldId id="328" r:id="rId20"/>
-    <p:sldId id="329" r:id="rId21"/>
-    <p:sldId id="330" r:id="rId22"/>
-    <p:sldId id="331" r:id="rId23"/>
-    <p:sldId id="332" r:id="rId24"/>
-    <p:sldId id="333" r:id="rId25"/>
+    <p:sldId id="336" r:id="rId3"/>
+    <p:sldId id="262" r:id="rId4"/>
+    <p:sldId id="317" r:id="rId5"/>
+    <p:sldId id="263" r:id="rId6"/>
+    <p:sldId id="264" r:id="rId7"/>
+    <p:sldId id="270" r:id="rId8"/>
+    <p:sldId id="271" r:id="rId9"/>
+    <p:sldId id="318" r:id="rId10"/>
+    <p:sldId id="319" r:id="rId11"/>
+    <p:sldId id="320" r:id="rId12"/>
+    <p:sldId id="272" r:id="rId13"/>
+    <p:sldId id="321" r:id="rId14"/>
+    <p:sldId id="322" r:id="rId15"/>
+    <p:sldId id="323" r:id="rId16"/>
+    <p:sldId id="324" r:id="rId17"/>
+    <p:sldId id="325" r:id="rId18"/>
+    <p:sldId id="326" r:id="rId19"/>
+    <p:sldId id="327" r:id="rId20"/>
+    <p:sldId id="328" r:id="rId21"/>
+    <p:sldId id="329" r:id="rId22"/>
+    <p:sldId id="330" r:id="rId23"/>
+    <p:sldId id="331" r:id="rId24"/>
+    <p:sldId id="332" r:id="rId25"/>
+    <p:sldId id="333" r:id="rId26"/>
+    <p:sldId id="334" r:id="rId27"/>
+    <p:sldId id="340" r:id="rId28"/>
+    <p:sldId id="335" r:id="rId29"/>
+    <p:sldId id="337" r:id="rId30"/>
+    <p:sldId id="339" r:id="rId31"/>
+    <p:sldId id="338" r:id="rId32"/>
+    <p:sldId id="341" r:id="rId33"/>
+    <p:sldId id="342" r:id="rId34"/>
+    <p:sldId id="343" r:id="rId35"/>
   </p:sldIdLst>
   <p:sldSz cx="12192000" cy="6858000"/>
   <p:notesSz cx="12192000" cy="6858000"/>
@@ -141,7 +151,7 @@
           <a:p>
             <a:fld id="{52CF3C78-BFF9-4137-8833-13E3D0B09D8B}" type="datetimeFigureOut">
               <a:rPr lang="it-IT" smtClean="0"/>
-              <a:t>18/06/2025</a:t>
+              <a:t>19/06/2025</a:t>
             </a:fld>
             <a:endParaRPr lang="it-IT"/>
           </a:p>
@@ -559,7 +569,7 @@
           <a:p>
             <a:fld id="{1D8BD707-D9CF-40AE-B4C6-C98DA3205C09}" type="datetimeFigureOut">
               <a:rPr lang="en-US"/>
-              <a:t>6/18/2025</a:t>
+              <a:t>6/19/2025</a:t>
             </a:fld>
             <a:endParaRPr lang="en-US"/>
           </a:p>
@@ -736,7 +746,7 @@
           <a:p>
             <a:fld id="{1D8BD707-D9CF-40AE-B4C6-C98DA3205C09}" type="datetimeFigureOut">
               <a:rPr lang="en-US"/>
-              <a:t>6/18/2025</a:t>
+              <a:t>6/19/2025</a:t>
             </a:fld>
             <a:endParaRPr lang="en-US"/>
           </a:p>
@@ -950,7 +960,7 @@
           <a:p>
             <a:fld id="{1D8BD707-D9CF-40AE-B4C6-C98DA3205C09}" type="datetimeFigureOut">
               <a:rPr lang="en-US"/>
-              <a:t>6/18/2025</a:t>
+              <a:t>6/19/2025</a:t>
             </a:fld>
             <a:endParaRPr lang="en-US"/>
           </a:p>
@@ -1098,7 +1108,7 @@
           <a:p>
             <a:fld id="{1D8BD707-D9CF-40AE-B4C6-C98DA3205C09}" type="datetimeFigureOut">
               <a:rPr lang="en-US"/>
-              <a:t>6/18/2025</a:t>
+              <a:t>6/19/2025</a:t>
             </a:fld>
             <a:endParaRPr lang="en-US"/>
           </a:p>
@@ -1217,7 +1227,7 @@
           <a:p>
             <a:fld id="{1D8BD707-D9CF-40AE-B4C6-C98DA3205C09}" type="datetimeFigureOut">
               <a:rPr lang="en-US"/>
-              <a:t>6/18/2025</a:t>
+              <a:t>6/19/2025</a:t>
             </a:fld>
             <a:endParaRPr lang="en-US"/>
           </a:p>
@@ -1514,7 +1524,7 @@
           <a:p>
             <a:fld id="{1D8BD707-D9CF-40AE-B4C6-C98DA3205C09}" type="datetimeFigureOut">
               <a:rPr lang="en-US"/>
-              <a:t>6/18/2025</a:t>
+              <a:t>6/19/2025</a:t>
             </a:fld>
             <a:endParaRPr lang="en-US"/>
           </a:p>
@@ -1813,7 +1823,7 @@
                 <a:latin typeface="Franklin Gothic Medium"/>
                 <a:cs typeface="Franklin Gothic Medium"/>
               </a:rPr>
-              <a:t>Gotti Daniele </a:t>
+              <a:t>Gotti Daniele -</a:t>
             </a:r>
             <a:r>
               <a:rPr lang="en-GB" sz="1600" noProof="0" dirty="0">
@@ -1823,27 +1833,7 @@
                 <a:latin typeface="Franklin Gothic Medium"/>
                 <a:cs typeface="Franklin Gothic Medium"/>
               </a:rPr>
-              <a:t>(</a:t>
-            </a:r>
-            <a:r>
-              <a:rPr lang="en-GB" sz="1600" noProof="0" dirty="0" err="1">
-                <a:solidFill>
-                  <a:srgbClr val="FFFFFF"/>
-                </a:solidFill>
-                <a:latin typeface="Franklin Gothic Medium"/>
-                <a:cs typeface="Franklin Gothic Medium"/>
-              </a:rPr>
-              <a:t>matr</a:t>
-            </a:r>
-            <a:r>
-              <a:rPr lang="en-GB" sz="1600" noProof="0" dirty="0">
-                <a:solidFill>
-                  <a:srgbClr val="FFFFFF"/>
-                </a:solidFill>
-                <a:latin typeface="Franklin Gothic Medium"/>
-                <a:cs typeface="Franklin Gothic Medium"/>
-              </a:rPr>
-              <a:t> 1078011)</a:t>
+              <a:t> 1079011</a:t>
             </a:r>
             <a:endParaRPr lang="en-GB" sz="1600" noProof="0" dirty="0">
               <a:latin typeface="Franklin Gothic Medium"/>
@@ -1911,7 +1901,7 @@
         <p:spPr>
           <a:xfrm>
             <a:off x="853566" y="2560827"/>
-            <a:ext cx="6456190" cy="1059264"/>
+            <a:ext cx="6456190" cy="1551707"/>
           </a:xfrm>
           <a:prstGeom prst="rect">
             <a:avLst/>
@@ -1951,13 +1941,42 @@
               </a:rPr>
             </a:br>
             <a:r>
+              <a:rPr lang="en-GB" sz="3200" b="0" noProof="0" dirty="0">
+                <a:solidFill>
+                  <a:srgbClr val="FFFFFF"/>
+                </a:solidFill>
+                <a:latin typeface="Arial Black"/>
+                <a:cs typeface="Arial Black"/>
+              </a:rPr>
+              <a:t>Prediction of</a:t>
+            </a:r>
+            <a:br>
+              <a:rPr lang="en-GB" sz="3200" b="0" noProof="0" dirty="0">
+                <a:solidFill>
+                  <a:srgbClr val="FFFFFF"/>
+                </a:solidFill>
+                <a:latin typeface="Arial Black"/>
+                <a:cs typeface="Arial Black"/>
+              </a:rPr>
+            </a:br>
+            <a:r>
               <a:rPr lang="en-GB" sz="3600" b="0" dirty="0">
                 <a:solidFill>
                   <a:srgbClr val="FFFFFF"/>
                 </a:solidFill>
                 <a:latin typeface="Arial Black"/>
-              </a:rPr>
-              <a:t>Dataset analysis project</a:t>
+                <a:cs typeface="Arial Black"/>
+              </a:rPr>
+              <a:t>food</a:t>
+            </a:r>
+            <a:r>
+              <a:rPr lang="en-GB" sz="3600" b="0" dirty="0">
+                <a:solidFill>
+                  <a:srgbClr val="FFFFFF"/>
+                </a:solidFill>
+                <a:latin typeface="Arial Black"/>
+              </a:rPr>
+              <a:t> delivery times</a:t>
             </a:r>
             <a:endParaRPr lang="en-GB" sz="3200" b="0" dirty="0">
               <a:solidFill>
@@ -1976,7 +1995,7 @@
         </p:nvSpPr>
         <p:spPr>
           <a:xfrm>
-            <a:off x="853566" y="3810000"/>
+            <a:off x="853566" y="4343400"/>
             <a:ext cx="3559810" cy="391160"/>
           </a:xfrm>
           <a:prstGeom prst="rect">
@@ -2054,17 +2073,17 @@
                 <a:latin typeface="Franklin Gothic Medium"/>
                 <a:cs typeface="Franklin Gothic Medium"/>
               </a:rPr>
-              <a:t>Mazzoleni Gabriele 	(</a:t>
-            </a:r>
-            <a:r>
-              <a:rPr lang="en-GB" sz="1600" noProof="0" dirty="0" err="1">
+              <a:t>Mazzoleni Gabriele </a:t>
+            </a:r>
+            <a:r>
+              <a:rPr lang="en-GB" sz="1600" dirty="0">
                 <a:solidFill>
                   <a:srgbClr val="FFFFFF"/>
                 </a:solidFill>
                 <a:latin typeface="Franklin Gothic Medium"/>
                 <a:cs typeface="Franklin Gothic Medium"/>
               </a:rPr>
-              <a:t>matr</a:t>
+              <a:t>-</a:t>
             </a:r>
             <a:r>
               <a:rPr lang="en-GB" sz="1600" noProof="0" dirty="0">
@@ -2074,7 +2093,7 @@
                 <a:latin typeface="Franklin Gothic Medium"/>
                 <a:cs typeface="Franklin Gothic Medium"/>
               </a:rPr>
-              <a:t> 1079514)</a:t>
+              <a:t> 1079514</a:t>
             </a:r>
             <a:endParaRPr lang="en-GB" sz="1600" noProof="0" dirty="0">
               <a:latin typeface="Franklin Gothic Medium"/>
@@ -2092,6 +2111,181 @@
 </file>
 
 <file path=ppt/slides/slide10.xml><?xml version="1.0" encoding="utf-8"?>
+<p:sld xmlns:a="http://schemas.openxmlformats.org/drawingml/2006/main" xmlns:r="http://schemas.openxmlformats.org/officeDocument/2006/relationships" xmlns:p="http://schemas.openxmlformats.org/presentationml/2006/main">
+  <p:cSld>
+    <p:spTree>
+      <p:nvGrpSpPr>
+        <p:cNvPr id="1" name="">
+          <a:extLst>
+            <a:ext uri="{FF2B5EF4-FFF2-40B4-BE49-F238E27FC236}">
+              <a16:creationId xmlns:a16="http://schemas.microsoft.com/office/drawing/2014/main" id="{BA6FD53E-49CA-D830-B50B-627F7455BEE0}"/>
+            </a:ext>
+          </a:extLst>
+        </p:cNvPr>
+        <p:cNvGrpSpPr/>
+        <p:nvPr/>
+      </p:nvGrpSpPr>
+      <p:grpSpPr>
+        <a:xfrm>
+          <a:off x="0" y="0"/>
+          <a:ext cx="0" cy="0"/>
+          <a:chOff x="0" y="0"/>
+          <a:chExt cx="0" cy="0"/>
+        </a:xfrm>
+      </p:grpSpPr>
+      <p:sp>
+        <p:nvSpPr>
+          <p:cNvPr id="10" name="Titolo 9">
+            <a:extLst>
+              <a:ext uri="{FF2B5EF4-FFF2-40B4-BE49-F238E27FC236}">
+                <a16:creationId xmlns:a16="http://schemas.microsoft.com/office/drawing/2014/main" id="{424E2423-362E-3208-896E-568C379717FA}"/>
+              </a:ext>
+            </a:extLst>
+          </p:cNvPr>
+          <p:cNvSpPr>
+            <a:spLocks noGrp="1"/>
+          </p:cNvSpPr>
+          <p:nvPr>
+            <p:ph type="title"/>
+          </p:nvPr>
+        </p:nvSpPr>
+        <p:spPr>
+          <a:xfrm>
+            <a:off x="762000" y="457200"/>
+            <a:ext cx="10668000" cy="538609"/>
+          </a:xfrm>
+        </p:spPr>
+        <p:txBody>
+          <a:bodyPr/>
+          <a:lstStyle/>
+          <a:p>
+            <a:r>
+              <a:rPr lang="en-GB" noProof="0" dirty="0">
+                <a:latin typeface="Arial Black" panose="020B0A04020102020204" pitchFamily="34" charset="0"/>
+              </a:rPr>
+              <a:t>Data </a:t>
+            </a:r>
+            <a:r>
+              <a:rPr lang="en-GB" noProof="0" dirty="0" err="1">
+                <a:latin typeface="Arial Black" panose="020B0A04020102020204" pitchFamily="34" charset="0"/>
+              </a:rPr>
+              <a:t>Distribuition</a:t>
+            </a:r>
+            <a:r>
+              <a:rPr lang="en-GB" noProof="0" dirty="0">
+                <a:latin typeface="Arial Black" panose="020B0A04020102020204" pitchFamily="34" charset="0"/>
+              </a:rPr>
+              <a:t> – </a:t>
+            </a:r>
+            <a:r>
+              <a:rPr lang="en-GB" noProof="0" dirty="0">
+                <a:latin typeface="Arial" panose="020B0604020202020204" pitchFamily="34" charset="0"/>
+                <a:cs typeface="Arial" panose="020B0604020202020204" pitchFamily="34" charset="0"/>
+              </a:rPr>
+              <a:t>categorical</a:t>
+            </a:r>
+            <a:r>
+              <a:rPr lang="en-GB" noProof="0" dirty="0">
+                <a:latin typeface="Arial Black" panose="020B0A04020102020204" pitchFamily="34" charset="0"/>
+              </a:rPr>
+              <a:t> </a:t>
+            </a:r>
+            <a:r>
+              <a:rPr lang="en-GB" noProof="0" dirty="0">
+                <a:latin typeface="Arial" panose="020B0604020202020204" pitchFamily="34" charset="0"/>
+                <a:cs typeface="Arial" panose="020B0604020202020204" pitchFamily="34" charset="0"/>
+              </a:rPr>
+              <a:t>variables</a:t>
+            </a:r>
+          </a:p>
+        </p:txBody>
+      </p:sp>
+      <p:pic>
+        <p:nvPicPr>
+          <p:cNvPr id="3" name="Immagine 2" descr="Immagine che contiene testo, schermata, diagramma, linea&#10;&#10;Il contenuto generato dall'IA potrebbe non essere corretto.">
+            <a:extLst>
+              <a:ext uri="{FF2B5EF4-FFF2-40B4-BE49-F238E27FC236}">
+                <a16:creationId xmlns:a16="http://schemas.microsoft.com/office/drawing/2014/main" id="{142869E7-5E74-04C5-FF3D-01D89840F45C}"/>
+              </a:ext>
+            </a:extLst>
+          </p:cNvPr>
+          <p:cNvPicPr>
+            <a:picLocks noChangeAspect="1"/>
+          </p:cNvPicPr>
+          <p:nvPr/>
+        </p:nvPicPr>
+        <p:blipFill>
+          <a:blip r:embed="rId2">
+            <a:extLst>
+              <a:ext uri="{28A0092B-C50C-407E-A947-70E740481C1C}">
+                <a14:useLocalDpi xmlns:a14="http://schemas.microsoft.com/office/drawing/2010/main" val="0"/>
+              </a:ext>
+            </a:extLst>
+          </a:blip>
+          <a:stretch>
+            <a:fillRect/>
+          </a:stretch>
+        </p:blipFill>
+        <p:spPr>
+          <a:xfrm>
+            <a:off x="762000" y="1545654"/>
+            <a:ext cx="5043534" cy="3766691"/>
+          </a:xfrm>
+          <a:prstGeom prst="rect">
+            <a:avLst/>
+          </a:prstGeom>
+        </p:spPr>
+      </p:pic>
+      <p:pic>
+        <p:nvPicPr>
+          <p:cNvPr id="5" name="Immagine 4" descr="Immagine che contiene testo, schermata, diagramma, Diagramma&#10;&#10;Il contenuto generato dall'IA potrebbe non essere corretto.">
+            <a:extLst>
+              <a:ext uri="{FF2B5EF4-FFF2-40B4-BE49-F238E27FC236}">
+                <a16:creationId xmlns:a16="http://schemas.microsoft.com/office/drawing/2014/main" id="{EAD0AAE0-21E8-513C-AD44-6E073A81ED24}"/>
+              </a:ext>
+            </a:extLst>
+          </p:cNvPr>
+          <p:cNvPicPr>
+            <a:picLocks noChangeAspect="1"/>
+          </p:cNvPicPr>
+          <p:nvPr/>
+        </p:nvPicPr>
+        <p:blipFill>
+          <a:blip r:embed="rId3">
+            <a:extLst>
+              <a:ext uri="{28A0092B-C50C-407E-A947-70E740481C1C}">
+                <a14:useLocalDpi xmlns:a14="http://schemas.microsoft.com/office/drawing/2010/main" val="0"/>
+              </a:ext>
+            </a:extLst>
+          </a:blip>
+          <a:stretch>
+            <a:fillRect/>
+          </a:stretch>
+        </p:blipFill>
+        <p:spPr>
+          <a:xfrm>
+            <a:off x="6096000" y="1545654"/>
+            <a:ext cx="5043535" cy="3766691"/>
+          </a:xfrm>
+          <a:prstGeom prst="rect">
+            <a:avLst/>
+          </a:prstGeom>
+        </p:spPr>
+      </p:pic>
+    </p:spTree>
+    <p:extLst>
+      <p:ext uri="{BB962C8B-B14F-4D97-AF65-F5344CB8AC3E}">
+        <p14:creationId xmlns:p14="http://schemas.microsoft.com/office/powerpoint/2010/main" val="2930566424"/>
+      </p:ext>
+    </p:extLst>
+  </p:cSld>
+  <p:clrMapOvr>
+    <a:masterClrMapping/>
+  </p:clrMapOvr>
+</p:sld>
+</file>
+
+<file path=ppt/slides/slide11.xml><?xml version="1.0" encoding="utf-8"?>
 <p:sld xmlns:a="http://schemas.openxmlformats.org/drawingml/2006/main" xmlns:r="http://schemas.openxmlformats.org/officeDocument/2006/relationships" xmlns:p="http://schemas.openxmlformats.org/presentationml/2006/main">
   <p:cSld>
     <p:spTree>
@@ -2270,7 +2464,7 @@
 </p:sld>
 </file>
 
-<file path=ppt/slides/slide11.xml><?xml version="1.0" encoding="utf-8"?>
+<file path=ppt/slides/slide12.xml><?xml version="1.0" encoding="utf-8"?>
 <p:sld xmlns:a="http://schemas.openxmlformats.org/drawingml/2006/main" xmlns:r="http://schemas.openxmlformats.org/officeDocument/2006/relationships" xmlns:p="http://schemas.openxmlformats.org/presentationml/2006/main">
   <p:cSld>
     <p:spTree>
@@ -2433,7 +2627,7 @@
 </p:sld>
 </file>
 
-<file path=ppt/slides/slide12.xml><?xml version="1.0" encoding="utf-8"?>
+<file path=ppt/slides/slide13.xml><?xml version="1.0" encoding="utf-8"?>
 <p:sld xmlns:a="http://schemas.openxmlformats.org/drawingml/2006/main" xmlns:r="http://schemas.openxmlformats.org/officeDocument/2006/relationships" xmlns:p="http://schemas.openxmlformats.org/presentationml/2006/main">
   <p:cSld>
     <p:spTree>
@@ -2848,7 +3042,7 @@
 </p:sld>
 </file>
 
-<file path=ppt/slides/slide13.xml><?xml version="1.0" encoding="utf-8"?>
+<file path=ppt/slides/slide14.xml><?xml version="1.0" encoding="utf-8"?>
 <p:sld xmlns:a="http://schemas.openxmlformats.org/drawingml/2006/main" xmlns:r="http://schemas.openxmlformats.org/officeDocument/2006/relationships" xmlns:p="http://schemas.openxmlformats.org/presentationml/2006/main">
   <p:cSld>
     <p:spTree>
@@ -3003,7 +3197,7 @@
 </p:sld>
 </file>
 
-<file path=ppt/slides/slide14.xml><?xml version="1.0" encoding="utf-8"?>
+<file path=ppt/slides/slide15.xml><?xml version="1.0" encoding="utf-8"?>
 <p:sld xmlns:a="http://schemas.openxmlformats.org/drawingml/2006/main" xmlns:r="http://schemas.openxmlformats.org/officeDocument/2006/relationships" xmlns:p="http://schemas.openxmlformats.org/presentationml/2006/main">
   <p:cSld>
     <p:spTree>
@@ -3221,7 +3415,7 @@
 </p:sld>
 </file>
 
-<file path=ppt/slides/slide15.xml><?xml version="1.0" encoding="utf-8"?>
+<file path=ppt/slides/slide16.xml><?xml version="1.0" encoding="utf-8"?>
 <p:sld xmlns:a="http://schemas.openxmlformats.org/drawingml/2006/main" xmlns:r="http://schemas.openxmlformats.org/officeDocument/2006/relationships" xmlns:p="http://schemas.openxmlformats.org/presentationml/2006/main">
   <p:cSld>
     <p:spTree>
@@ -3439,7 +3633,7 @@
 </p:sld>
 </file>
 
-<file path=ppt/slides/slide16.xml><?xml version="1.0" encoding="utf-8"?>
+<file path=ppt/slides/slide17.xml><?xml version="1.0" encoding="utf-8"?>
 <p:sld xmlns:a="http://schemas.openxmlformats.org/drawingml/2006/main" xmlns:r="http://schemas.openxmlformats.org/officeDocument/2006/relationships" xmlns:p="http://schemas.openxmlformats.org/presentationml/2006/main">
   <p:cSld>
     <p:spTree>
@@ -3702,7 +3896,7 @@
 </p:sld>
 </file>
 
-<file path=ppt/slides/slide17.xml><?xml version="1.0" encoding="utf-8"?>
+<file path=ppt/slides/slide18.xml><?xml version="1.0" encoding="utf-8"?>
 <p:sld xmlns:a="http://schemas.openxmlformats.org/drawingml/2006/main" xmlns:r="http://schemas.openxmlformats.org/officeDocument/2006/relationships" xmlns:p="http://schemas.openxmlformats.org/presentationml/2006/main">
   <p:cSld>
     <p:spTree>
@@ -3882,7 +4076,7 @@
 </p:sld>
 </file>
 
-<file path=ppt/slides/slide18.xml><?xml version="1.0" encoding="utf-8"?>
+<file path=ppt/slides/slide19.xml><?xml version="1.0" encoding="utf-8"?>
 <p:sld xmlns:a="http://schemas.openxmlformats.org/drawingml/2006/main" xmlns:r="http://schemas.openxmlformats.org/officeDocument/2006/relationships" xmlns:p="http://schemas.openxmlformats.org/presentationml/2006/main">
   <p:cSld>
     <p:spTree>
@@ -4130,7 +4324,134 @@
 </p:sld>
 </file>
 
-<file path=ppt/slides/slide19.xml><?xml version="1.0" encoding="utf-8"?>
+<file path=ppt/slides/slide2.xml><?xml version="1.0" encoding="utf-8"?>
+<p:sld xmlns:a="http://schemas.openxmlformats.org/drawingml/2006/main" xmlns:r="http://schemas.openxmlformats.org/officeDocument/2006/relationships" xmlns:p="http://schemas.openxmlformats.org/presentationml/2006/main">
+  <p:cSld>
+    <p:spTree>
+      <p:nvGrpSpPr>
+        <p:cNvPr id="1" name="">
+          <a:extLst>
+            <a:ext uri="{FF2B5EF4-FFF2-40B4-BE49-F238E27FC236}">
+              <a16:creationId xmlns:a16="http://schemas.microsoft.com/office/drawing/2014/main" id="{0D2BBF1D-1F5E-BF87-3774-E0C37D0EAF48}"/>
+            </a:ext>
+          </a:extLst>
+        </p:cNvPr>
+        <p:cNvGrpSpPr/>
+        <p:nvPr/>
+      </p:nvGrpSpPr>
+      <p:grpSpPr>
+        <a:xfrm>
+          <a:off x="0" y="0"/>
+          <a:ext cx="0" cy="0"/>
+          <a:chOff x="0" y="0"/>
+          <a:chExt cx="0" cy="0"/>
+        </a:xfrm>
+      </p:grpSpPr>
+      <p:sp>
+        <p:nvSpPr>
+          <p:cNvPr id="10" name="Titolo 9">
+            <a:extLst>
+              <a:ext uri="{FF2B5EF4-FFF2-40B4-BE49-F238E27FC236}">
+                <a16:creationId xmlns:a16="http://schemas.microsoft.com/office/drawing/2014/main" id="{649BF47E-C162-179C-D3F1-281638D0D1AF}"/>
+              </a:ext>
+            </a:extLst>
+          </p:cNvPr>
+          <p:cNvSpPr>
+            <a:spLocks noGrp="1"/>
+          </p:cNvSpPr>
+          <p:nvPr>
+            <p:ph type="title"/>
+          </p:nvPr>
+        </p:nvSpPr>
+        <p:spPr>
+          <a:xfrm>
+            <a:off x="762000" y="457200"/>
+            <a:ext cx="8991600" cy="538609"/>
+          </a:xfrm>
+        </p:spPr>
+        <p:txBody>
+          <a:bodyPr/>
+          <a:lstStyle/>
+          <a:p>
+            <a:r>
+              <a:rPr lang="en-GB" noProof="0" dirty="0">
+                <a:latin typeface="Arial Black" panose="020B0A04020102020204" pitchFamily="34" charset="0"/>
+              </a:rPr>
+              <a:t>Problem setting – food delivery</a:t>
+            </a:r>
+          </a:p>
+        </p:txBody>
+      </p:sp>
+      <p:sp>
+        <p:nvSpPr>
+          <p:cNvPr id="4" name="CasellaDiTesto 3">
+            <a:extLst>
+              <a:ext uri="{FF2B5EF4-FFF2-40B4-BE49-F238E27FC236}">
+                <a16:creationId xmlns:a16="http://schemas.microsoft.com/office/drawing/2014/main" id="{C610EBCA-39BF-8FE7-E254-D5B99F97EE2E}"/>
+              </a:ext>
+            </a:extLst>
+          </p:cNvPr>
+          <p:cNvSpPr txBox="1"/>
+          <p:nvPr/>
+        </p:nvSpPr>
+        <p:spPr>
+          <a:xfrm>
+            <a:off x="762000" y="1676400"/>
+            <a:ext cx="10287000" cy="1569660"/>
+          </a:xfrm>
+          <a:prstGeom prst="rect">
+            <a:avLst/>
+          </a:prstGeom>
+          <a:noFill/>
+        </p:spPr>
+        <p:txBody>
+          <a:bodyPr wrap="square">
+            <a:spAutoFit/>
+          </a:bodyPr>
+          <a:lstStyle/>
+          <a:p>
+            <a:pPr algn="just"/>
+            <a:r>
+              <a:rPr lang="en-GB" sz="2400" noProof="0" dirty="0">
+                <a:latin typeface="Arial" panose="020B0604020202020204" pitchFamily="34" charset="0"/>
+                <a:cs typeface="Arial" panose="020B0604020202020204" pitchFamily="34" charset="0"/>
+              </a:rPr>
+              <a:t>Food delivery is a market that …..</a:t>
+            </a:r>
+          </a:p>
+          <a:p>
+            <a:pPr algn="just"/>
+            <a:endParaRPr lang="en-GB" sz="2400" dirty="0">
+              <a:latin typeface="Arial" panose="020B0604020202020204" pitchFamily="34" charset="0"/>
+              <a:cs typeface="Arial" panose="020B0604020202020204" pitchFamily="34" charset="0"/>
+            </a:endParaRPr>
+          </a:p>
+          <a:p>
+            <a:pPr algn="just"/>
+            <a:r>
+              <a:rPr lang="en-GB" sz="2400" dirty="0">
+                <a:latin typeface="Arial" panose="020B0604020202020204" pitchFamily="34" charset="0"/>
+                <a:cs typeface="Arial" panose="020B0604020202020204" pitchFamily="34" charset="0"/>
+              </a:rPr>
+              <a:t>It grew massively in importance in 2020 – 2021 due to the spread of COVID-19…</a:t>
+            </a:r>
+          </a:p>
+        </p:txBody>
+      </p:sp>
+    </p:spTree>
+    <p:extLst>
+      <p:ext uri="{BB962C8B-B14F-4D97-AF65-F5344CB8AC3E}">
+        <p14:creationId xmlns:p14="http://schemas.microsoft.com/office/powerpoint/2010/main" val="1532105063"/>
+      </p:ext>
+    </p:extLst>
+  </p:cSld>
+  <p:clrMapOvr>
+    <a:masterClrMapping/>
+  </p:clrMapOvr>
+</p:sld>
+</file>
+
+<file path=ppt/slides/slide20.xml><?xml version="1.0" encoding="utf-8"?>
 <p:sld xmlns:a="http://schemas.openxmlformats.org/drawingml/2006/main" xmlns:r="http://schemas.openxmlformats.org/officeDocument/2006/relationships" xmlns:p="http://schemas.openxmlformats.org/presentationml/2006/main">
   <p:cSld>
     <p:spTree>
@@ -4338,234 +4659,7 @@
 </p:sld>
 </file>
 
-<file path=ppt/slides/slide2.xml><?xml version="1.0" encoding="utf-8"?>
-<p:sld xmlns:a="http://schemas.openxmlformats.org/drawingml/2006/main" xmlns:r="http://schemas.openxmlformats.org/officeDocument/2006/relationships" xmlns:p="http://schemas.openxmlformats.org/presentationml/2006/main">
-  <p:cSld>
-    <p:spTree>
-      <p:nvGrpSpPr>
-        <p:cNvPr id="1" name="">
-          <a:extLst>
-            <a:ext uri="{FF2B5EF4-FFF2-40B4-BE49-F238E27FC236}">
-              <a16:creationId xmlns:a16="http://schemas.microsoft.com/office/drawing/2014/main" id="{D9178864-40E2-AE35-E227-0E4BF1D82362}"/>
-            </a:ext>
-          </a:extLst>
-        </p:cNvPr>
-        <p:cNvGrpSpPr/>
-        <p:nvPr/>
-      </p:nvGrpSpPr>
-      <p:grpSpPr>
-        <a:xfrm>
-          <a:off x="0" y="0"/>
-          <a:ext cx="0" cy="0"/>
-          <a:chOff x="0" y="0"/>
-          <a:chExt cx="0" cy="0"/>
-        </a:xfrm>
-      </p:grpSpPr>
-      <p:sp>
-        <p:nvSpPr>
-          <p:cNvPr id="10" name="Titolo 9">
-            <a:extLst>
-              <a:ext uri="{FF2B5EF4-FFF2-40B4-BE49-F238E27FC236}">
-                <a16:creationId xmlns:a16="http://schemas.microsoft.com/office/drawing/2014/main" id="{0899A537-9AFA-917F-62DE-A21FD9521606}"/>
-              </a:ext>
-            </a:extLst>
-          </p:cNvPr>
-          <p:cNvSpPr>
-            <a:spLocks noGrp="1"/>
-          </p:cNvSpPr>
-          <p:nvPr>
-            <p:ph type="title"/>
-          </p:nvPr>
-        </p:nvSpPr>
-        <p:spPr>
-          <a:xfrm>
-            <a:off x="762000" y="457200"/>
-            <a:ext cx="8991600" cy="538609"/>
-          </a:xfrm>
-        </p:spPr>
-        <p:txBody>
-          <a:bodyPr/>
-          <a:lstStyle/>
-          <a:p>
-            <a:r>
-              <a:rPr lang="en-GB" noProof="0" dirty="0">
-                <a:latin typeface="Arial Black" panose="020B0A04020102020204" pitchFamily="34" charset="0"/>
-              </a:rPr>
-              <a:t>Problem setting – food delivery</a:t>
-            </a:r>
-          </a:p>
-        </p:txBody>
-      </p:sp>
-      <p:sp>
-        <p:nvSpPr>
-          <p:cNvPr id="4" name="CasellaDiTesto 3">
-            <a:extLst>
-              <a:ext uri="{FF2B5EF4-FFF2-40B4-BE49-F238E27FC236}">
-                <a16:creationId xmlns:a16="http://schemas.microsoft.com/office/drawing/2014/main" id="{D453E658-10AA-ABDE-4303-1B3984A036ED}"/>
-              </a:ext>
-            </a:extLst>
-          </p:cNvPr>
-          <p:cNvSpPr txBox="1"/>
-          <p:nvPr/>
-        </p:nvSpPr>
-        <p:spPr>
-          <a:xfrm>
-            <a:off x="762000" y="1676400"/>
-            <a:ext cx="10287000" cy="1200329"/>
-          </a:xfrm>
-          <a:prstGeom prst="rect">
-            <a:avLst/>
-          </a:prstGeom>
-          <a:noFill/>
-        </p:spPr>
-        <p:txBody>
-          <a:bodyPr wrap="square">
-            <a:spAutoFit/>
-          </a:bodyPr>
-          <a:lstStyle/>
-          <a:p>
-            <a:pPr algn="just"/>
-            <a:r>
-              <a:rPr lang="en-GB" sz="2400" noProof="0" dirty="0">
-                <a:latin typeface="Arial" panose="020B0604020202020204" pitchFamily="34" charset="0"/>
-                <a:cs typeface="Arial" panose="020B0604020202020204" pitchFamily="34" charset="0"/>
-              </a:rPr>
-              <a:t>In the current market for</a:t>
-            </a:r>
-            <a:r>
-              <a:rPr lang="en-GB" sz="2400" dirty="0">
-                <a:latin typeface="Arial" panose="020B0604020202020204" pitchFamily="34" charset="0"/>
-                <a:cs typeface="Arial" panose="020B0604020202020204" pitchFamily="34" charset="0"/>
-              </a:rPr>
-              <a:t> food delivery, full of already established services, it is paramount to find new ways to differentiate, to ensure a wider range of consumers.</a:t>
-            </a:r>
-          </a:p>
-        </p:txBody>
-      </p:sp>
-      <p:pic>
-        <p:nvPicPr>
-          <p:cNvPr id="3" name="Immagine 2" descr="Immagine che contiene Elementi grafici, grafica, schermata, logo&#10;&#10;Il contenuto generato dall'IA potrebbe non essere corretto.">
-            <a:extLst>
-              <a:ext uri="{FF2B5EF4-FFF2-40B4-BE49-F238E27FC236}">
-                <a16:creationId xmlns:a16="http://schemas.microsoft.com/office/drawing/2014/main" id="{9099EFAC-A1EC-67F2-4C65-109AB7B58EB4}"/>
-              </a:ext>
-            </a:extLst>
-          </p:cNvPr>
-          <p:cNvPicPr>
-            <a:picLocks noChangeAspect="1"/>
-          </p:cNvPicPr>
-          <p:nvPr/>
-        </p:nvPicPr>
-        <p:blipFill>
-          <a:blip r:embed="rId2">
-            <a:extLst>
-              <a:ext uri="{28A0092B-C50C-407E-A947-70E740481C1C}">
-                <a14:useLocalDpi xmlns:a14="http://schemas.microsoft.com/office/drawing/2010/main" val="0"/>
-              </a:ext>
-            </a:extLst>
-          </a:blip>
-          <a:stretch>
-            <a:fillRect/>
-          </a:stretch>
-        </p:blipFill>
-        <p:spPr>
-          <a:xfrm>
-            <a:off x="4343400" y="2876729"/>
-            <a:ext cx="2631649" cy="2552700"/>
-          </a:xfrm>
-          <a:prstGeom prst="rect">
-            <a:avLst/>
-          </a:prstGeom>
-        </p:spPr>
-      </p:pic>
-      <p:pic>
-        <p:nvPicPr>
-          <p:cNvPr id="6" name="Immagine 5" descr="Immagine che contiene Carattere, logo, Elementi grafici, testo&#10;&#10;Il contenuto generato dall'IA potrebbe non essere corretto.">
-            <a:extLst>
-              <a:ext uri="{FF2B5EF4-FFF2-40B4-BE49-F238E27FC236}">
-                <a16:creationId xmlns:a16="http://schemas.microsoft.com/office/drawing/2014/main" id="{1E2347B5-D8DD-97A7-240E-F2ECBAEA4DB9}"/>
-              </a:ext>
-            </a:extLst>
-          </p:cNvPr>
-          <p:cNvPicPr>
-            <a:picLocks noChangeAspect="1"/>
-          </p:cNvPicPr>
-          <p:nvPr/>
-        </p:nvPicPr>
-        <p:blipFill>
-          <a:blip r:embed="rId3" cstate="print">
-            <a:extLst>
-              <a:ext uri="{28A0092B-C50C-407E-A947-70E740481C1C}">
-                <a14:useLocalDpi xmlns:a14="http://schemas.microsoft.com/office/drawing/2010/main" val="0"/>
-              </a:ext>
-            </a:extLst>
-          </a:blip>
-          <a:srcRect t="15992"/>
-          <a:stretch>
-            <a:fillRect/>
-          </a:stretch>
-        </p:blipFill>
-        <p:spPr>
-          <a:xfrm>
-            <a:off x="899333" y="2970815"/>
-            <a:ext cx="3268133" cy="1601185"/>
-          </a:xfrm>
-          <a:prstGeom prst="rect">
-            <a:avLst/>
-          </a:prstGeom>
-        </p:spPr>
-      </p:pic>
-      <p:pic>
-        <p:nvPicPr>
-          <p:cNvPr id="9" name="Immagine 8" descr="Immagine che contiene testo, Carattere, Elementi grafici, logo&#10;&#10;Il contenuto generato dall'IA potrebbe non essere corretto.">
-            <a:extLst>
-              <a:ext uri="{FF2B5EF4-FFF2-40B4-BE49-F238E27FC236}">
-                <a16:creationId xmlns:a16="http://schemas.microsoft.com/office/drawing/2014/main" id="{46E38BEB-388D-7674-60D2-A4DD7EE93685}"/>
-              </a:ext>
-            </a:extLst>
-          </p:cNvPr>
-          <p:cNvPicPr>
-            <a:picLocks noChangeAspect="1"/>
-          </p:cNvPicPr>
-          <p:nvPr/>
-        </p:nvPicPr>
-        <p:blipFill>
-          <a:blip r:embed="rId4" cstate="print">
-            <a:extLst>
-              <a:ext uri="{28A0092B-C50C-407E-A947-70E740481C1C}">
-                <a14:useLocalDpi xmlns:a14="http://schemas.microsoft.com/office/drawing/2010/main" val="0"/>
-              </a:ext>
-            </a:extLst>
-          </a:blip>
-          <a:srcRect b="7159"/>
-          <a:stretch>
-            <a:fillRect/>
-          </a:stretch>
-        </p:blipFill>
-        <p:spPr>
-          <a:xfrm>
-            <a:off x="7239000" y="3967162"/>
-            <a:ext cx="3784601" cy="1976438"/>
-          </a:xfrm>
-          <a:prstGeom prst="rect">
-            <a:avLst/>
-          </a:prstGeom>
-        </p:spPr>
-      </p:pic>
-    </p:spTree>
-    <p:extLst>
-      <p:ext uri="{BB962C8B-B14F-4D97-AF65-F5344CB8AC3E}">
-        <p14:creationId xmlns:p14="http://schemas.microsoft.com/office/powerpoint/2010/main" val="204895617"/>
-      </p:ext>
-    </p:extLst>
-  </p:cSld>
-  <p:clrMapOvr>
-    <a:masterClrMapping/>
-  </p:clrMapOvr>
-</p:sld>
-</file>
-
-<file path=ppt/slides/slide20.xml><?xml version="1.0" encoding="utf-8"?>
+<file path=ppt/slides/slide21.xml><?xml version="1.0" encoding="utf-8"?>
 <p:sld xmlns:a="http://schemas.openxmlformats.org/drawingml/2006/main" xmlns:r="http://schemas.openxmlformats.org/officeDocument/2006/relationships" xmlns:p="http://schemas.openxmlformats.org/presentationml/2006/main">
   <p:cSld>
     <p:spTree>
@@ -4782,7 +4876,7 @@
 </p:sld>
 </file>
 
-<file path=ppt/slides/slide21.xml><?xml version="1.0" encoding="utf-8"?>
+<file path=ppt/slides/slide22.xml><?xml version="1.0" encoding="utf-8"?>
 <p:sld xmlns:a="http://schemas.openxmlformats.org/drawingml/2006/main" xmlns:r="http://schemas.openxmlformats.org/officeDocument/2006/relationships" xmlns:p="http://schemas.openxmlformats.org/presentationml/2006/main">
   <p:cSld>
     <p:spTree>
@@ -4851,8 +4945,8 @@
           </a:p>
         </p:txBody>
       </p:sp>
-      <mc:AlternateContent xmlns:mc="http://schemas.openxmlformats.org/markup-compatibility/2006">
-        <mc:Choice xmlns:a14="http://schemas.microsoft.com/office/drawing/2010/main" Requires="a14">
+      <mc:AlternateContent xmlns:mc="http://schemas.openxmlformats.org/markup-compatibility/2006" xmlns:a14="http://schemas.microsoft.com/office/drawing/2010/main">
+        <mc:Choice Requires="a14">
           <p:sp>
             <p:nvSpPr>
               <p:cNvPr id="8" name="CasellaDiTesto 7">
@@ -4881,7 +4975,6 @@
               </a:bodyPr>
               <a:lstStyle/>
               <a:p>
-                <a:pPr/>
                 <a14:m>
                   <m:oMath xmlns:m="http://schemas.openxmlformats.org/officeDocument/2006/math">
                     <m:sSup>
@@ -4922,7 +5015,7 @@
             </p:txBody>
           </p:sp>
         </mc:Choice>
-        <mc:Fallback>
+        <mc:Fallback xmlns="">
           <p:sp>
             <p:nvSpPr>
               <p:cNvPr id="8" name="CasellaDiTesto 7">
@@ -5052,7 +5145,7 @@
 </p:sld>
 </file>
 
-<file path=ppt/slides/slide22.xml><?xml version="1.0" encoding="utf-8"?>
+<file path=ppt/slides/slide23.xml><?xml version="1.0" encoding="utf-8"?>
 <p:sld xmlns:a="http://schemas.openxmlformats.org/drawingml/2006/main" xmlns:r="http://schemas.openxmlformats.org/officeDocument/2006/relationships" xmlns:p="http://schemas.openxmlformats.org/presentationml/2006/main">
   <p:cSld>
     <p:spTree>
@@ -5121,8 +5214,8 @@
           </a:p>
         </p:txBody>
       </p:sp>
-      <mc:AlternateContent xmlns:mc="http://schemas.openxmlformats.org/markup-compatibility/2006">
-        <mc:Choice xmlns:a14="http://schemas.microsoft.com/office/drawing/2010/main" Requires="a14">
+      <mc:AlternateContent xmlns:mc="http://schemas.openxmlformats.org/markup-compatibility/2006" xmlns:a14="http://schemas.microsoft.com/office/drawing/2010/main">
+        <mc:Choice Requires="a14">
           <p:sp>
             <p:nvSpPr>
               <p:cNvPr id="2" name="CasellaDiTesto 1">
@@ -5151,7 +5244,6 @@
               </a:bodyPr>
               <a:lstStyle/>
               <a:p>
-                <a:pPr/>
                 <a14:m>
                   <m:oMath xmlns:m="http://schemas.openxmlformats.org/officeDocument/2006/math">
                     <m:sSup>
@@ -5192,7 +5284,7 @@
             </p:txBody>
           </p:sp>
         </mc:Choice>
-        <mc:Fallback>
+        <mc:Fallback xmlns="">
           <p:sp>
             <p:nvSpPr>
               <p:cNvPr id="2" name="CasellaDiTesto 1">
@@ -5265,7 +5357,7 @@
         </p:blipFill>
         <p:spPr>
           <a:xfrm>
-            <a:off x="795867" y="1756620"/>
+            <a:off x="762000" y="1756620"/>
             <a:ext cx="5010922" cy="3575311"/>
           </a:xfrm>
           <a:prstGeom prst="rect">
@@ -5322,7 +5414,7 @@
 </p:sld>
 </file>
 
-<file path=ppt/slides/slide23.xml><?xml version="1.0" encoding="utf-8"?>
+<file path=ppt/slides/slide24.xml><?xml version="1.0" encoding="utf-8"?>
 <p:sld xmlns:a="http://schemas.openxmlformats.org/drawingml/2006/main" xmlns:r="http://schemas.openxmlformats.org/officeDocument/2006/relationships" xmlns:p="http://schemas.openxmlformats.org/presentationml/2006/main">
   <p:cSld>
     <p:spTree>
@@ -5391,8 +5483,8 @@
           </a:p>
         </p:txBody>
       </p:sp>
-      <mc:AlternateContent xmlns:mc="http://schemas.openxmlformats.org/markup-compatibility/2006">
-        <mc:Choice xmlns:a14="http://schemas.microsoft.com/office/drawing/2010/main" Requires="a14">
+      <mc:AlternateContent xmlns:mc="http://schemas.openxmlformats.org/markup-compatibility/2006" xmlns:a14="http://schemas.microsoft.com/office/drawing/2010/main">
+        <mc:Choice Requires="a14">
           <p:sp>
             <p:nvSpPr>
               <p:cNvPr id="2" name="CasellaDiTesto 1">
@@ -5421,7 +5513,6 @@
               </a:bodyPr>
               <a:lstStyle/>
               <a:p>
-                <a:pPr/>
                 <a14:m>
                   <m:oMath xmlns:m="http://schemas.openxmlformats.org/officeDocument/2006/math">
                     <m:sSup>
@@ -5462,7 +5553,7 @@
             </p:txBody>
           </p:sp>
         </mc:Choice>
-        <mc:Fallback>
+        <mc:Fallback xmlns="">
           <p:sp>
             <p:nvSpPr>
               <p:cNvPr id="2" name="CasellaDiTesto 1">
@@ -5592,7 +5683,7 @@
 </p:sld>
 </file>
 
-<file path=ppt/slides/slide24.xml><?xml version="1.0" encoding="utf-8"?>
+<file path=ppt/slides/slide25.xml><?xml version="1.0" encoding="utf-8"?>
 <p:sld xmlns:a="http://schemas.openxmlformats.org/drawingml/2006/main" xmlns:r="http://schemas.openxmlformats.org/officeDocument/2006/relationships" xmlns:p="http://schemas.openxmlformats.org/presentationml/2006/main">
   <p:cSld>
     <p:spTree>
@@ -5871,7 +5962,2045 @@
 </p:sld>
 </file>
 
+<file path=ppt/slides/slide26.xml><?xml version="1.0" encoding="utf-8"?>
+<p:sld xmlns:a="http://schemas.openxmlformats.org/drawingml/2006/main" xmlns:r="http://schemas.openxmlformats.org/officeDocument/2006/relationships" xmlns:p="http://schemas.openxmlformats.org/presentationml/2006/main">
+  <p:cSld>
+    <p:spTree>
+      <p:nvGrpSpPr>
+        <p:cNvPr id="1" name="">
+          <a:extLst>
+            <a:ext uri="{FF2B5EF4-FFF2-40B4-BE49-F238E27FC236}">
+              <a16:creationId xmlns:a16="http://schemas.microsoft.com/office/drawing/2014/main" id="{497AC74D-1396-BE00-F678-558A7B0FA816}"/>
+            </a:ext>
+          </a:extLst>
+        </p:cNvPr>
+        <p:cNvGrpSpPr/>
+        <p:nvPr/>
+      </p:nvGrpSpPr>
+      <p:grpSpPr>
+        <a:xfrm>
+          <a:off x="0" y="0"/>
+          <a:ext cx="0" cy="0"/>
+          <a:chOff x="0" y="0"/>
+          <a:chExt cx="0" cy="0"/>
+        </a:xfrm>
+      </p:grpSpPr>
+      <p:sp>
+        <p:nvSpPr>
+          <p:cNvPr id="10" name="Titolo 9">
+            <a:extLst>
+              <a:ext uri="{FF2B5EF4-FFF2-40B4-BE49-F238E27FC236}">
+                <a16:creationId xmlns:a16="http://schemas.microsoft.com/office/drawing/2014/main" id="{C216DC3B-F072-2F2F-BC38-0208AF28CEAF}"/>
+              </a:ext>
+            </a:extLst>
+          </p:cNvPr>
+          <p:cNvSpPr>
+            <a:spLocks noGrp="1"/>
+          </p:cNvSpPr>
+          <p:nvPr>
+            <p:ph type="title"/>
+          </p:nvPr>
+        </p:nvSpPr>
+        <p:spPr>
+          <a:xfrm>
+            <a:off x="762000" y="457201"/>
+            <a:ext cx="10515600" cy="538609"/>
+          </a:xfrm>
+        </p:spPr>
+        <p:txBody>
+          <a:bodyPr/>
+          <a:lstStyle/>
+          <a:p>
+            <a:r>
+              <a:rPr lang="en-GB" noProof="0" dirty="0">
+                <a:latin typeface="Arial Black" panose="020B0A04020102020204" pitchFamily="34" charset="0"/>
+              </a:rPr>
+              <a:t>Shrinkage methods</a:t>
+            </a:r>
+          </a:p>
+        </p:txBody>
+      </p:sp>
+      <p:sp>
+        <p:nvSpPr>
+          <p:cNvPr id="5" name="CasellaDiTesto 4">
+            <a:extLst>
+              <a:ext uri="{FF2B5EF4-FFF2-40B4-BE49-F238E27FC236}">
+                <a16:creationId xmlns:a16="http://schemas.microsoft.com/office/drawing/2014/main" id="{F6A94E21-93AD-7FA3-68EC-6C8E3FDA38A3}"/>
+              </a:ext>
+            </a:extLst>
+          </p:cNvPr>
+          <p:cNvSpPr txBox="1"/>
+          <p:nvPr/>
+        </p:nvSpPr>
+        <p:spPr>
+          <a:xfrm>
+            <a:off x="685800" y="1600200"/>
+            <a:ext cx="4876800" cy="4154984"/>
+          </a:xfrm>
+          <a:prstGeom prst="rect">
+            <a:avLst/>
+          </a:prstGeom>
+          <a:noFill/>
+        </p:spPr>
+        <p:txBody>
+          <a:bodyPr wrap="square">
+            <a:spAutoFit/>
+          </a:bodyPr>
+          <a:lstStyle/>
+          <a:p>
+            <a:pPr algn="just"/>
+            <a:r>
+              <a:rPr lang="en-US" sz="2400" noProof="0" dirty="0">
+                <a:latin typeface="Arial" panose="020B0604020202020204" pitchFamily="34" charset="0"/>
+                <a:cs typeface="Arial" panose="020B0604020202020204" pitchFamily="34" charset="0"/>
+              </a:rPr>
+              <a:t>We </a:t>
+            </a:r>
+            <a:r>
+              <a:rPr lang="en-US" sz="2400" dirty="0">
+                <a:latin typeface="Arial" panose="020B0604020202020204" pitchFamily="34" charset="0"/>
+                <a:cs typeface="Arial" panose="020B0604020202020204" pitchFamily="34" charset="0"/>
+              </a:rPr>
+              <a:t>utilize two methods: </a:t>
+            </a:r>
+            <a:r>
+              <a:rPr lang="en-US" sz="2400" b="1" dirty="0">
+                <a:latin typeface="Arial" panose="020B0604020202020204" pitchFamily="34" charset="0"/>
+                <a:cs typeface="Arial" panose="020B0604020202020204" pitchFamily="34" charset="0"/>
+              </a:rPr>
+              <a:t>Ridge </a:t>
+            </a:r>
+            <a:r>
+              <a:rPr lang="en-US" sz="2400" dirty="0">
+                <a:latin typeface="Arial" panose="020B0604020202020204" pitchFamily="34" charset="0"/>
+                <a:cs typeface="Arial" panose="020B0604020202020204" pitchFamily="34" charset="0"/>
+              </a:rPr>
+              <a:t>and </a:t>
+            </a:r>
+            <a:r>
+              <a:rPr lang="en-US" sz="2400" b="1" dirty="0">
+                <a:latin typeface="Arial" panose="020B0604020202020204" pitchFamily="34" charset="0"/>
+                <a:cs typeface="Arial" panose="020B0604020202020204" pitchFamily="34" charset="0"/>
+              </a:rPr>
+              <a:t>Lasso regression</a:t>
+            </a:r>
+            <a:r>
+              <a:rPr lang="en-US" sz="2400" dirty="0">
+                <a:latin typeface="Arial" panose="020B0604020202020204" pitchFamily="34" charset="0"/>
+                <a:cs typeface="Arial" panose="020B0604020202020204" pitchFamily="34" charset="0"/>
+              </a:rPr>
+              <a:t>.</a:t>
+            </a:r>
+          </a:p>
+          <a:p>
+            <a:pPr algn="just"/>
+            <a:endParaRPr lang="en-US" sz="2400" noProof="0" dirty="0">
+              <a:latin typeface="Arial" panose="020B0604020202020204" pitchFamily="34" charset="0"/>
+              <a:cs typeface="Arial" panose="020B0604020202020204" pitchFamily="34" charset="0"/>
+            </a:endParaRPr>
+          </a:p>
+          <a:p>
+            <a:pPr algn="just"/>
+            <a:r>
+              <a:rPr lang="en-US" sz="2400" noProof="0" dirty="0">
+                <a:latin typeface="Arial" panose="020B0604020202020204" pitchFamily="34" charset="0"/>
+                <a:cs typeface="Arial" panose="020B0604020202020204" pitchFamily="34" charset="0"/>
+              </a:rPr>
+              <a:t>For this evaluation, we need to </a:t>
+            </a:r>
+            <a:r>
+              <a:rPr lang="en-GB" sz="2400" noProof="0" dirty="0"/>
+              <a:t>return to a model with </a:t>
+            </a:r>
+            <a:r>
+              <a:rPr lang="en-GB" sz="2400" b="1" noProof="0" dirty="0"/>
+              <a:t>all variables</a:t>
+            </a:r>
+            <a:r>
+              <a:rPr lang="en-GB" sz="2400" noProof="0" dirty="0"/>
+              <a:t>.</a:t>
+            </a:r>
+          </a:p>
+          <a:p>
+            <a:pPr algn="just"/>
+            <a:endParaRPr lang="en-GB" sz="2400" dirty="0">
+              <a:latin typeface="Arial" panose="020B0604020202020204" pitchFamily="34" charset="0"/>
+              <a:cs typeface="Arial" panose="020B0604020202020204" pitchFamily="34" charset="0"/>
+            </a:endParaRPr>
+          </a:p>
+          <a:p>
+            <a:pPr algn="just"/>
+            <a:r>
+              <a:rPr lang="en-GB" sz="2400" noProof="0" dirty="0"/>
+              <a:t>It is also important to </a:t>
+            </a:r>
+            <a:r>
+              <a:rPr lang="en-GB" sz="2400" b="1" noProof="0" dirty="0"/>
+              <a:t>standardize</a:t>
+            </a:r>
+            <a:r>
+              <a:rPr lang="en-GB" sz="2400" noProof="0" dirty="0"/>
+              <a:t> the model, as this ensures all variables are on the same scale.</a:t>
+            </a:r>
+          </a:p>
+          <a:p>
+            <a:pPr algn="just"/>
+            <a:endParaRPr lang="en-US" sz="2400" noProof="0" dirty="0">
+              <a:latin typeface="Arial" panose="020B0604020202020204" pitchFamily="34" charset="0"/>
+              <a:cs typeface="Arial" panose="020B0604020202020204" pitchFamily="34" charset="0"/>
+            </a:endParaRPr>
+          </a:p>
+        </p:txBody>
+      </p:sp>
+      <p:pic>
+        <p:nvPicPr>
+          <p:cNvPr id="3" name="Immagine 2" descr="Immagine che contiene testo, schermata, Carattere, numero&#10;&#10;Il contenuto generato dall'IA potrebbe non essere corretto.">
+            <a:extLst>
+              <a:ext uri="{FF2B5EF4-FFF2-40B4-BE49-F238E27FC236}">
+                <a16:creationId xmlns:a16="http://schemas.microsoft.com/office/drawing/2014/main" id="{6A618ADF-2C82-A65C-B070-5E7266F39BA5}"/>
+              </a:ext>
+            </a:extLst>
+          </p:cNvPr>
+          <p:cNvPicPr>
+            <a:picLocks noChangeAspect="1"/>
+          </p:cNvPicPr>
+          <p:nvPr/>
+        </p:nvPicPr>
+        <p:blipFill>
+          <a:blip r:embed="rId2">
+            <a:extLst>
+              <a:ext uri="{28A0092B-C50C-407E-A947-70E740481C1C}">
+                <a14:useLocalDpi xmlns:a14="http://schemas.microsoft.com/office/drawing/2010/main" val="0"/>
+              </a:ext>
+            </a:extLst>
+          </a:blip>
+          <a:stretch>
+            <a:fillRect/>
+          </a:stretch>
+        </p:blipFill>
+        <p:spPr>
+          <a:xfrm>
+            <a:off x="6629402" y="457201"/>
+            <a:ext cx="4180825" cy="5291357"/>
+          </a:xfrm>
+          <a:prstGeom prst="rect">
+            <a:avLst/>
+          </a:prstGeom>
+        </p:spPr>
+      </p:pic>
+    </p:spTree>
+    <p:extLst>
+      <p:ext uri="{BB962C8B-B14F-4D97-AF65-F5344CB8AC3E}">
+        <p14:creationId xmlns:p14="http://schemas.microsoft.com/office/powerpoint/2010/main" val="3285008964"/>
+      </p:ext>
+    </p:extLst>
+  </p:cSld>
+  <p:clrMapOvr>
+    <a:masterClrMapping/>
+  </p:clrMapOvr>
+</p:sld>
+</file>
+
+<file path=ppt/slides/slide27.xml><?xml version="1.0" encoding="utf-8"?>
+<p:sld xmlns:a="http://schemas.openxmlformats.org/drawingml/2006/main" xmlns:r="http://schemas.openxmlformats.org/officeDocument/2006/relationships" xmlns:p="http://schemas.openxmlformats.org/presentationml/2006/main">
+  <p:cSld>
+    <p:spTree>
+      <p:nvGrpSpPr>
+        <p:cNvPr id="1" name=""/>
+        <p:cNvGrpSpPr/>
+        <p:nvPr/>
+      </p:nvGrpSpPr>
+      <p:grpSpPr>
+        <a:xfrm>
+          <a:off x="0" y="0"/>
+          <a:ext cx="0" cy="0"/>
+          <a:chOff x="0" y="0"/>
+          <a:chExt cx="0" cy="0"/>
+        </a:xfrm>
+      </p:grpSpPr>
+      <p:sp>
+        <p:nvSpPr>
+          <p:cNvPr id="3" name="Segnaposto testo 2">
+            <a:extLst>
+              <a:ext uri="{FF2B5EF4-FFF2-40B4-BE49-F238E27FC236}">
+                <a16:creationId xmlns:a16="http://schemas.microsoft.com/office/drawing/2014/main" id="{0BEB441B-84B4-7010-A71A-7DAB3561EEA2}"/>
+              </a:ext>
+            </a:extLst>
+          </p:cNvPr>
+          <p:cNvSpPr>
+            <a:spLocks noGrp="1"/>
+          </p:cNvSpPr>
+          <p:nvPr>
+            <p:ph type="body" idx="1"/>
+          </p:nvPr>
+        </p:nvSpPr>
+        <p:spPr>
+          <a:xfrm>
+            <a:off x="7611534" y="1447800"/>
+            <a:ext cx="3810000" cy="3693319"/>
+          </a:xfrm>
+        </p:spPr>
+        <p:txBody>
+          <a:bodyPr/>
+          <a:lstStyle/>
+          <a:p>
+            <a:pPr algn="just"/>
+            <a:r>
+              <a:rPr lang="en-GB" sz="2400" dirty="0">
+                <a:latin typeface="Arial" panose="020B0604020202020204" pitchFamily="34" charset="0"/>
+                <a:cs typeface="Arial" panose="020B0604020202020204" pitchFamily="34" charset="0"/>
+              </a:rPr>
+              <a:t>We begin by splitting the database into train and test sets, and we search for the optimal lambda for ridge regression, using 10-fold cross-validation.</a:t>
+            </a:r>
+          </a:p>
+          <a:p>
+            <a:endParaRPr lang="it-IT" sz="2400" dirty="0">
+              <a:latin typeface="Arial" panose="020B0604020202020204" pitchFamily="34" charset="0"/>
+              <a:cs typeface="Arial" panose="020B0604020202020204" pitchFamily="34" charset="0"/>
+            </a:endParaRPr>
+          </a:p>
+          <a:p>
+            <a:endParaRPr lang="it-IT" sz="2400" dirty="0">
+              <a:latin typeface="Arial" panose="020B0604020202020204" pitchFamily="34" charset="0"/>
+              <a:cs typeface="Arial" panose="020B0604020202020204" pitchFamily="34" charset="0"/>
+            </a:endParaRPr>
+          </a:p>
+          <a:p>
+            <a:endParaRPr lang="it-IT" sz="2400" dirty="0">
+              <a:latin typeface="Arial" panose="020B0604020202020204" pitchFamily="34" charset="0"/>
+              <a:cs typeface="Arial" panose="020B0604020202020204" pitchFamily="34" charset="0"/>
+            </a:endParaRPr>
+          </a:p>
+          <a:p>
+            <a:r>
+              <a:rPr lang="it-IT" sz="2400" dirty="0">
+                <a:latin typeface="Arial" panose="020B0604020202020204" pitchFamily="34" charset="0"/>
+                <a:cs typeface="Arial" panose="020B0604020202020204" pitchFamily="34" charset="0"/>
+              </a:rPr>
+              <a:t>Best Ridge Lambda:  5.359</a:t>
+            </a:r>
+          </a:p>
+        </p:txBody>
+      </p:sp>
+      <p:sp>
+        <p:nvSpPr>
+          <p:cNvPr id="4" name="Titolo 9">
+            <a:extLst>
+              <a:ext uri="{FF2B5EF4-FFF2-40B4-BE49-F238E27FC236}">
+                <a16:creationId xmlns:a16="http://schemas.microsoft.com/office/drawing/2014/main" id="{8A2CADCF-74E9-34AF-0F2A-81D2C7AFD5D8}"/>
+              </a:ext>
+            </a:extLst>
+          </p:cNvPr>
+          <p:cNvSpPr txBox="1">
+            <a:spLocks/>
+          </p:cNvSpPr>
+          <p:nvPr/>
+        </p:nvSpPr>
+        <p:spPr>
+          <a:xfrm>
+            <a:off x="762000" y="457201"/>
+            <a:ext cx="10515600" cy="538609"/>
+          </a:xfrm>
+          <a:prstGeom prst="rect">
+            <a:avLst/>
+          </a:prstGeom>
+        </p:spPr>
+        <p:txBody>
+          <a:bodyPr wrap="square" lIns="0" tIns="0" rIns="0" bIns="0">
+            <a:spAutoFit/>
+          </a:bodyPr>
+          <a:lstStyle>
+            <a:lvl1pPr>
+              <a:defRPr sz="3500" b="1" i="0">
+                <a:solidFill>
+                  <a:schemeClr val="tx1"/>
+                </a:solidFill>
+                <a:latin typeface="Trebuchet MS"/>
+                <a:ea typeface="+mj-ea"/>
+                <a:cs typeface="Trebuchet MS"/>
+              </a:defRPr>
+            </a:lvl1pPr>
+          </a:lstStyle>
+          <a:p>
+            <a:r>
+              <a:rPr lang="en-GB">
+                <a:latin typeface="Arial Black" panose="020B0A04020102020204" pitchFamily="34" charset="0"/>
+              </a:rPr>
+              <a:t>Ridge regression</a:t>
+            </a:r>
+            <a:endParaRPr lang="en-GB" dirty="0">
+              <a:latin typeface="Arial Black" panose="020B0A04020102020204" pitchFamily="34" charset="0"/>
+            </a:endParaRPr>
+          </a:p>
+        </p:txBody>
+      </p:sp>
+      <p:pic>
+        <p:nvPicPr>
+          <p:cNvPr id="7" name="Immagine 6" descr="Immagine che contiene testo, linea, schermata, Diagramma&#10;&#10;Il contenuto generato dall'IA potrebbe non essere corretto.">
+            <a:extLst>
+              <a:ext uri="{FF2B5EF4-FFF2-40B4-BE49-F238E27FC236}">
+                <a16:creationId xmlns:a16="http://schemas.microsoft.com/office/drawing/2014/main" id="{A2C94F57-334C-3712-73A7-07717F75EA1F}"/>
+              </a:ext>
+            </a:extLst>
+          </p:cNvPr>
+          <p:cNvPicPr>
+            <a:picLocks noChangeAspect="1"/>
+          </p:cNvPicPr>
+          <p:nvPr/>
+        </p:nvPicPr>
+        <p:blipFill>
+          <a:blip r:embed="rId2">
+            <a:extLst>
+              <a:ext uri="{28A0092B-C50C-407E-A947-70E740481C1C}">
+                <a14:useLocalDpi xmlns:a14="http://schemas.microsoft.com/office/drawing/2010/main" val="0"/>
+              </a:ext>
+            </a:extLst>
+          </a:blip>
+          <a:stretch>
+            <a:fillRect/>
+          </a:stretch>
+        </p:blipFill>
+        <p:spPr>
+          <a:xfrm>
+            <a:off x="761999" y="1190542"/>
+            <a:ext cx="6712751" cy="4295858"/>
+          </a:xfrm>
+          <a:prstGeom prst="rect">
+            <a:avLst/>
+          </a:prstGeom>
+        </p:spPr>
+      </p:pic>
+    </p:spTree>
+    <p:extLst>
+      <p:ext uri="{BB962C8B-B14F-4D97-AF65-F5344CB8AC3E}">
+        <p14:creationId xmlns:p14="http://schemas.microsoft.com/office/powerpoint/2010/main" val="3993545540"/>
+      </p:ext>
+    </p:extLst>
+  </p:cSld>
+  <p:clrMapOvr>
+    <a:masterClrMapping/>
+  </p:clrMapOvr>
+</p:sld>
+</file>
+
+<file path=ppt/slides/slide28.xml><?xml version="1.0" encoding="utf-8"?>
+<p:sld xmlns:a="http://schemas.openxmlformats.org/drawingml/2006/main" xmlns:r="http://schemas.openxmlformats.org/officeDocument/2006/relationships" xmlns:p="http://schemas.openxmlformats.org/presentationml/2006/main">
+  <p:cSld>
+    <p:spTree>
+      <p:nvGrpSpPr>
+        <p:cNvPr id="1" name="">
+          <a:extLst>
+            <a:ext uri="{FF2B5EF4-FFF2-40B4-BE49-F238E27FC236}">
+              <a16:creationId xmlns:a16="http://schemas.microsoft.com/office/drawing/2014/main" id="{1FD493E4-EC9A-B642-5A4F-E0FB5AF97F39}"/>
+            </a:ext>
+          </a:extLst>
+        </p:cNvPr>
+        <p:cNvGrpSpPr/>
+        <p:nvPr/>
+      </p:nvGrpSpPr>
+      <p:grpSpPr>
+        <a:xfrm>
+          <a:off x="0" y="0"/>
+          <a:ext cx="0" cy="0"/>
+          <a:chOff x="0" y="0"/>
+          <a:chExt cx="0" cy="0"/>
+        </a:xfrm>
+      </p:grpSpPr>
+      <p:sp>
+        <p:nvSpPr>
+          <p:cNvPr id="10" name="Titolo 9">
+            <a:extLst>
+              <a:ext uri="{FF2B5EF4-FFF2-40B4-BE49-F238E27FC236}">
+                <a16:creationId xmlns:a16="http://schemas.microsoft.com/office/drawing/2014/main" id="{2F089B75-5482-71E4-AA67-9361BCBF2E12}"/>
+              </a:ext>
+            </a:extLst>
+          </p:cNvPr>
+          <p:cNvSpPr>
+            <a:spLocks noGrp="1"/>
+          </p:cNvSpPr>
+          <p:nvPr>
+            <p:ph type="title"/>
+          </p:nvPr>
+        </p:nvSpPr>
+        <p:spPr>
+          <a:xfrm>
+            <a:off x="762000" y="457201"/>
+            <a:ext cx="10515600" cy="538609"/>
+          </a:xfrm>
+        </p:spPr>
+        <p:txBody>
+          <a:bodyPr/>
+          <a:lstStyle/>
+          <a:p>
+            <a:r>
+              <a:rPr lang="en-GB" noProof="0" dirty="0">
+                <a:latin typeface="Arial Black" panose="020B0A04020102020204" pitchFamily="34" charset="0"/>
+              </a:rPr>
+              <a:t>Ridge regression</a:t>
+            </a:r>
+          </a:p>
+        </p:txBody>
+      </p:sp>
+      <p:sp>
+        <p:nvSpPr>
+          <p:cNvPr id="5" name="CasellaDiTesto 4">
+            <a:extLst>
+              <a:ext uri="{FF2B5EF4-FFF2-40B4-BE49-F238E27FC236}">
+                <a16:creationId xmlns:a16="http://schemas.microsoft.com/office/drawing/2014/main" id="{72825D67-2930-5760-91B9-9DEBD6E98B78}"/>
+              </a:ext>
+            </a:extLst>
+          </p:cNvPr>
+          <p:cNvSpPr txBox="1"/>
+          <p:nvPr/>
+        </p:nvSpPr>
+        <p:spPr>
+          <a:xfrm>
+            <a:off x="685800" y="1577876"/>
+            <a:ext cx="4876800" cy="3046988"/>
+          </a:xfrm>
+          <a:prstGeom prst="rect">
+            <a:avLst/>
+          </a:prstGeom>
+          <a:noFill/>
+        </p:spPr>
+        <p:txBody>
+          <a:bodyPr wrap="square">
+            <a:spAutoFit/>
+          </a:bodyPr>
+          <a:lstStyle/>
+          <a:p>
+            <a:pPr marL="0" indent="0" algn="just">
+              <a:buNone/>
+            </a:pPr>
+            <a:r>
+              <a:rPr lang="en-US" sz="2400" dirty="0"/>
+              <a:t>We see that the less significant variables have coefficients very close to zero for ridge regression.</a:t>
+            </a:r>
+            <a:endParaRPr lang="en-GB" sz="2400" dirty="0">
+              <a:latin typeface="Arial" panose="020B0604020202020204" pitchFamily="34" charset="0"/>
+              <a:cs typeface="Arial" panose="020B0604020202020204" pitchFamily="34" charset="0"/>
+            </a:endParaRPr>
+          </a:p>
+          <a:p>
+            <a:pPr marL="0" indent="0" algn="just">
+              <a:buNone/>
+            </a:pPr>
+            <a:endParaRPr lang="en-GB" sz="2400" noProof="0" dirty="0">
+              <a:latin typeface="Arial" panose="020B0604020202020204" pitchFamily="34" charset="0"/>
+              <a:cs typeface="Arial" panose="020B0604020202020204" pitchFamily="34" charset="0"/>
+            </a:endParaRPr>
+          </a:p>
+          <a:p>
+            <a:pPr marL="0" indent="0" algn="just">
+              <a:buNone/>
+            </a:pPr>
+            <a:endParaRPr lang="en-GB" sz="2400" noProof="0" dirty="0">
+              <a:latin typeface="Arial" panose="020B0604020202020204" pitchFamily="34" charset="0"/>
+              <a:cs typeface="Arial" panose="020B0604020202020204" pitchFamily="34" charset="0"/>
+            </a:endParaRPr>
+          </a:p>
+          <a:p>
+            <a:pPr marL="0" indent="0" algn="l">
+              <a:buNone/>
+            </a:pPr>
+            <a:br>
+              <a:rPr lang="en-GB" sz="2400" noProof="0" dirty="0">
+                <a:latin typeface="Arial" panose="020B0604020202020204" pitchFamily="34" charset="0"/>
+                <a:cs typeface="Arial" panose="020B0604020202020204" pitchFamily="34" charset="0"/>
+              </a:rPr>
+            </a:br>
+            <a:endParaRPr lang="en-GB" sz="2400" noProof="0" dirty="0">
+              <a:latin typeface="Arial" panose="020B0604020202020204" pitchFamily="34" charset="0"/>
+              <a:cs typeface="Arial" panose="020B0604020202020204" pitchFamily="34" charset="0"/>
+            </a:endParaRPr>
+          </a:p>
+          <a:p>
+            <a:pPr algn="just"/>
+            <a:endParaRPr lang="en-US" sz="2400" noProof="0" dirty="0">
+              <a:latin typeface="Arial" panose="020B0604020202020204" pitchFamily="34" charset="0"/>
+              <a:cs typeface="Arial" panose="020B0604020202020204" pitchFamily="34" charset="0"/>
+            </a:endParaRPr>
+          </a:p>
+        </p:txBody>
+      </p:sp>
+      <p:pic>
+        <p:nvPicPr>
+          <p:cNvPr id="6" name="Immagine 5" descr="Immagine che contiene testo, schermata, Carattere, numero&#10;&#10;Il contenuto generato dall'IA potrebbe non essere corretto.">
+            <a:extLst>
+              <a:ext uri="{FF2B5EF4-FFF2-40B4-BE49-F238E27FC236}">
+                <a16:creationId xmlns:a16="http://schemas.microsoft.com/office/drawing/2014/main" id="{EDB30D71-7692-5C7B-4AB9-EC91D65A8BC6}"/>
+              </a:ext>
+            </a:extLst>
+          </p:cNvPr>
+          <p:cNvPicPr>
+            <a:picLocks noChangeAspect="1"/>
+          </p:cNvPicPr>
+          <p:nvPr/>
+        </p:nvPicPr>
+        <p:blipFill>
+          <a:blip r:embed="rId2">
+            <a:extLst>
+              <a:ext uri="{28A0092B-C50C-407E-A947-70E740481C1C}">
+                <a14:useLocalDpi xmlns:a14="http://schemas.microsoft.com/office/drawing/2010/main" val="0"/>
+              </a:ext>
+            </a:extLst>
+          </a:blip>
+          <a:stretch>
+            <a:fillRect/>
+          </a:stretch>
+        </p:blipFill>
+        <p:spPr>
+          <a:xfrm>
+            <a:off x="6629402" y="838199"/>
+            <a:ext cx="2695916" cy="5143839"/>
+          </a:xfrm>
+          <a:prstGeom prst="rect">
+            <a:avLst/>
+          </a:prstGeom>
+        </p:spPr>
+      </p:pic>
+      <p:pic>
+        <p:nvPicPr>
+          <p:cNvPr id="8" name="Immagine 7">
+            <a:extLst>
+              <a:ext uri="{FF2B5EF4-FFF2-40B4-BE49-F238E27FC236}">
+                <a16:creationId xmlns:a16="http://schemas.microsoft.com/office/drawing/2014/main" id="{A8B099C0-2033-37A4-616C-187D7C643BE4}"/>
+              </a:ext>
+            </a:extLst>
+          </p:cNvPr>
+          <p:cNvPicPr>
+            <a:picLocks noChangeAspect="1"/>
+          </p:cNvPicPr>
+          <p:nvPr/>
+        </p:nvPicPr>
+        <p:blipFill>
+          <a:blip r:embed="rId3">
+            <a:extLst>
+              <a:ext uri="{28A0092B-C50C-407E-A947-70E740481C1C}">
+                <a14:useLocalDpi xmlns:a14="http://schemas.microsoft.com/office/drawing/2010/main" val="0"/>
+              </a:ext>
+            </a:extLst>
+          </a:blip>
+          <a:stretch>
+            <a:fillRect/>
+          </a:stretch>
+        </p:blipFill>
+        <p:spPr>
+          <a:xfrm>
+            <a:off x="685800" y="3048000"/>
+            <a:ext cx="1672632" cy="693162"/>
+          </a:xfrm>
+          <a:prstGeom prst="rect">
+            <a:avLst/>
+          </a:prstGeom>
+        </p:spPr>
+      </p:pic>
+    </p:spTree>
+    <p:extLst>
+      <p:ext uri="{BB962C8B-B14F-4D97-AF65-F5344CB8AC3E}">
+        <p14:creationId xmlns:p14="http://schemas.microsoft.com/office/powerpoint/2010/main" val="599749062"/>
+      </p:ext>
+    </p:extLst>
+  </p:cSld>
+  <p:clrMapOvr>
+    <a:masterClrMapping/>
+  </p:clrMapOvr>
+</p:sld>
+</file>
+
+<file path=ppt/slides/slide29.xml><?xml version="1.0" encoding="utf-8"?>
+<p:sld xmlns:a="http://schemas.openxmlformats.org/drawingml/2006/main" xmlns:r="http://schemas.openxmlformats.org/officeDocument/2006/relationships" xmlns:p="http://schemas.openxmlformats.org/presentationml/2006/main">
+  <p:cSld>
+    <p:spTree>
+      <p:nvGrpSpPr>
+        <p:cNvPr id="1" name="">
+          <a:extLst>
+            <a:ext uri="{FF2B5EF4-FFF2-40B4-BE49-F238E27FC236}">
+              <a16:creationId xmlns:a16="http://schemas.microsoft.com/office/drawing/2014/main" id="{6AB5C021-CC0C-A742-F7D4-8E5D79C807ED}"/>
+            </a:ext>
+          </a:extLst>
+        </p:cNvPr>
+        <p:cNvGrpSpPr/>
+        <p:nvPr/>
+      </p:nvGrpSpPr>
+      <p:grpSpPr>
+        <a:xfrm>
+          <a:off x="0" y="0"/>
+          <a:ext cx="0" cy="0"/>
+          <a:chOff x="0" y="0"/>
+          <a:chExt cx="0" cy="0"/>
+        </a:xfrm>
+      </p:grpSpPr>
+      <p:sp>
+        <p:nvSpPr>
+          <p:cNvPr id="10" name="Titolo 9">
+            <a:extLst>
+              <a:ext uri="{FF2B5EF4-FFF2-40B4-BE49-F238E27FC236}">
+                <a16:creationId xmlns:a16="http://schemas.microsoft.com/office/drawing/2014/main" id="{F22377CB-E863-8C7C-8778-AD500CBCBDB3}"/>
+              </a:ext>
+            </a:extLst>
+          </p:cNvPr>
+          <p:cNvSpPr>
+            <a:spLocks noGrp="1"/>
+          </p:cNvSpPr>
+          <p:nvPr>
+            <p:ph type="title"/>
+          </p:nvPr>
+        </p:nvSpPr>
+        <p:spPr>
+          <a:xfrm>
+            <a:off x="762000" y="457201"/>
+            <a:ext cx="10515600" cy="538609"/>
+          </a:xfrm>
+        </p:spPr>
+        <p:txBody>
+          <a:bodyPr/>
+          <a:lstStyle/>
+          <a:p>
+            <a:r>
+              <a:rPr lang="en-GB" noProof="0" dirty="0">
+                <a:latin typeface="Arial Black" panose="020B0A04020102020204" pitchFamily="34" charset="0"/>
+              </a:rPr>
+              <a:t>Ridge regression</a:t>
+            </a:r>
+          </a:p>
+        </p:txBody>
+      </p:sp>
+      <p:pic>
+        <p:nvPicPr>
+          <p:cNvPr id="3" name="Immagine 2" descr="Immagine che contiene linea, testo, Diagramma, diagramma&#10;&#10;Il contenuto generato dall'IA potrebbe non essere corretto.">
+            <a:extLst>
+              <a:ext uri="{FF2B5EF4-FFF2-40B4-BE49-F238E27FC236}">
+                <a16:creationId xmlns:a16="http://schemas.microsoft.com/office/drawing/2014/main" id="{1AF75830-6A9A-72C7-0EDC-6C07887A4698}"/>
+              </a:ext>
+            </a:extLst>
+          </p:cNvPr>
+          <p:cNvPicPr>
+            <a:picLocks noChangeAspect="1"/>
+          </p:cNvPicPr>
+          <p:nvPr/>
+        </p:nvPicPr>
+        <p:blipFill>
+          <a:blip r:embed="rId2">
+            <a:extLst>
+              <a:ext uri="{28A0092B-C50C-407E-A947-70E740481C1C}">
+                <a14:useLocalDpi xmlns:a14="http://schemas.microsoft.com/office/drawing/2010/main" val="0"/>
+              </a:ext>
+            </a:extLst>
+          </a:blip>
+          <a:stretch>
+            <a:fillRect/>
+          </a:stretch>
+        </p:blipFill>
+        <p:spPr>
+          <a:xfrm>
+            <a:off x="762000" y="1143000"/>
+            <a:ext cx="7239000" cy="4117214"/>
+          </a:xfrm>
+          <a:prstGeom prst="rect">
+            <a:avLst/>
+          </a:prstGeom>
+        </p:spPr>
+      </p:pic>
+      <p:pic>
+        <p:nvPicPr>
+          <p:cNvPr id="7" name="Immagine 6" descr="Immagine che contiene testo, schermata, Carattere, linea&#10;&#10;Il contenuto generato dall'IA potrebbe non essere corretto.">
+            <a:extLst>
+              <a:ext uri="{FF2B5EF4-FFF2-40B4-BE49-F238E27FC236}">
+                <a16:creationId xmlns:a16="http://schemas.microsoft.com/office/drawing/2014/main" id="{97010617-0352-FCAD-DEE7-F0B878ACF11F}"/>
+              </a:ext>
+            </a:extLst>
+          </p:cNvPr>
+          <p:cNvPicPr>
+            <a:picLocks noChangeAspect="1"/>
+          </p:cNvPicPr>
+          <p:nvPr/>
+        </p:nvPicPr>
+        <p:blipFill>
+          <a:blip r:embed="rId3">
+            <a:extLst>
+              <a:ext uri="{28A0092B-C50C-407E-A947-70E740481C1C}">
+                <a14:useLocalDpi xmlns:a14="http://schemas.microsoft.com/office/drawing/2010/main" val="0"/>
+              </a:ext>
+            </a:extLst>
+          </a:blip>
+          <a:srcRect t="13953" b="10886"/>
+          <a:stretch>
+            <a:fillRect/>
+          </a:stretch>
+        </p:blipFill>
+        <p:spPr>
+          <a:xfrm>
+            <a:off x="876300" y="5257418"/>
+            <a:ext cx="7010400" cy="764796"/>
+          </a:xfrm>
+          <a:prstGeom prst="rect">
+            <a:avLst/>
+          </a:prstGeom>
+        </p:spPr>
+      </p:pic>
+    </p:spTree>
+    <p:extLst>
+      <p:ext uri="{BB962C8B-B14F-4D97-AF65-F5344CB8AC3E}">
+        <p14:creationId xmlns:p14="http://schemas.microsoft.com/office/powerpoint/2010/main" val="2497971794"/>
+      </p:ext>
+    </p:extLst>
+  </p:cSld>
+  <p:clrMapOvr>
+    <a:masterClrMapping/>
+  </p:clrMapOvr>
+</p:sld>
+</file>
+
 <file path=ppt/slides/slide3.xml><?xml version="1.0" encoding="utf-8"?>
+<p:sld xmlns:a="http://schemas.openxmlformats.org/drawingml/2006/main" xmlns:r="http://schemas.openxmlformats.org/officeDocument/2006/relationships" xmlns:p="http://schemas.openxmlformats.org/presentationml/2006/main">
+  <p:cSld>
+    <p:spTree>
+      <p:nvGrpSpPr>
+        <p:cNvPr id="1" name="">
+          <a:extLst>
+            <a:ext uri="{FF2B5EF4-FFF2-40B4-BE49-F238E27FC236}">
+              <a16:creationId xmlns:a16="http://schemas.microsoft.com/office/drawing/2014/main" id="{D9178864-40E2-AE35-E227-0E4BF1D82362}"/>
+            </a:ext>
+          </a:extLst>
+        </p:cNvPr>
+        <p:cNvGrpSpPr/>
+        <p:nvPr/>
+      </p:nvGrpSpPr>
+      <p:grpSpPr>
+        <a:xfrm>
+          <a:off x="0" y="0"/>
+          <a:ext cx="0" cy="0"/>
+          <a:chOff x="0" y="0"/>
+          <a:chExt cx="0" cy="0"/>
+        </a:xfrm>
+      </p:grpSpPr>
+      <p:sp>
+        <p:nvSpPr>
+          <p:cNvPr id="10" name="Titolo 9">
+            <a:extLst>
+              <a:ext uri="{FF2B5EF4-FFF2-40B4-BE49-F238E27FC236}">
+                <a16:creationId xmlns:a16="http://schemas.microsoft.com/office/drawing/2014/main" id="{0899A537-9AFA-917F-62DE-A21FD9521606}"/>
+              </a:ext>
+            </a:extLst>
+          </p:cNvPr>
+          <p:cNvSpPr>
+            <a:spLocks noGrp="1"/>
+          </p:cNvSpPr>
+          <p:nvPr>
+            <p:ph type="title"/>
+          </p:nvPr>
+        </p:nvSpPr>
+        <p:spPr>
+          <a:xfrm>
+            <a:off x="762000" y="457200"/>
+            <a:ext cx="8991600" cy="538609"/>
+          </a:xfrm>
+        </p:spPr>
+        <p:txBody>
+          <a:bodyPr/>
+          <a:lstStyle/>
+          <a:p>
+            <a:r>
+              <a:rPr lang="en-GB" noProof="0" dirty="0">
+                <a:latin typeface="Arial Black" panose="020B0A04020102020204" pitchFamily="34" charset="0"/>
+              </a:rPr>
+              <a:t>Problem setting – food delivery</a:t>
+            </a:r>
+          </a:p>
+        </p:txBody>
+      </p:sp>
+      <p:sp>
+        <p:nvSpPr>
+          <p:cNvPr id="4" name="CasellaDiTesto 3">
+            <a:extLst>
+              <a:ext uri="{FF2B5EF4-FFF2-40B4-BE49-F238E27FC236}">
+                <a16:creationId xmlns:a16="http://schemas.microsoft.com/office/drawing/2014/main" id="{D453E658-10AA-ABDE-4303-1B3984A036ED}"/>
+              </a:ext>
+            </a:extLst>
+          </p:cNvPr>
+          <p:cNvSpPr txBox="1"/>
+          <p:nvPr/>
+        </p:nvSpPr>
+        <p:spPr>
+          <a:xfrm>
+            <a:off x="762000" y="1676400"/>
+            <a:ext cx="10287000" cy="1200329"/>
+          </a:xfrm>
+          <a:prstGeom prst="rect">
+            <a:avLst/>
+          </a:prstGeom>
+          <a:noFill/>
+        </p:spPr>
+        <p:txBody>
+          <a:bodyPr wrap="square">
+            <a:spAutoFit/>
+          </a:bodyPr>
+          <a:lstStyle/>
+          <a:p>
+            <a:pPr algn="just"/>
+            <a:r>
+              <a:rPr lang="en-GB" sz="2400" noProof="0" dirty="0">
+                <a:latin typeface="Arial" panose="020B0604020202020204" pitchFamily="34" charset="0"/>
+                <a:cs typeface="Arial" panose="020B0604020202020204" pitchFamily="34" charset="0"/>
+              </a:rPr>
+              <a:t>In the current market for</a:t>
+            </a:r>
+            <a:r>
+              <a:rPr lang="en-GB" sz="2400" dirty="0">
+                <a:latin typeface="Arial" panose="020B0604020202020204" pitchFamily="34" charset="0"/>
+                <a:cs typeface="Arial" panose="020B0604020202020204" pitchFamily="34" charset="0"/>
+              </a:rPr>
+              <a:t> food delivery, full of already established services, it is paramount to find new ways to differentiate, to ensure a wider range of consumers.</a:t>
+            </a:r>
+          </a:p>
+        </p:txBody>
+      </p:sp>
+      <p:pic>
+        <p:nvPicPr>
+          <p:cNvPr id="3" name="Immagine 2" descr="Immagine che contiene Elementi grafici, grafica, schermata, logo&#10;&#10;Il contenuto generato dall'IA potrebbe non essere corretto.">
+            <a:extLst>
+              <a:ext uri="{FF2B5EF4-FFF2-40B4-BE49-F238E27FC236}">
+                <a16:creationId xmlns:a16="http://schemas.microsoft.com/office/drawing/2014/main" id="{9099EFAC-A1EC-67F2-4C65-109AB7B58EB4}"/>
+              </a:ext>
+            </a:extLst>
+          </p:cNvPr>
+          <p:cNvPicPr>
+            <a:picLocks noChangeAspect="1"/>
+          </p:cNvPicPr>
+          <p:nvPr/>
+        </p:nvPicPr>
+        <p:blipFill>
+          <a:blip r:embed="rId2">
+            <a:extLst>
+              <a:ext uri="{28A0092B-C50C-407E-A947-70E740481C1C}">
+                <a14:useLocalDpi xmlns:a14="http://schemas.microsoft.com/office/drawing/2010/main" val="0"/>
+              </a:ext>
+            </a:extLst>
+          </a:blip>
+          <a:stretch>
+            <a:fillRect/>
+          </a:stretch>
+        </p:blipFill>
+        <p:spPr>
+          <a:xfrm>
+            <a:off x="4343400" y="2876729"/>
+            <a:ext cx="2631649" cy="2552700"/>
+          </a:xfrm>
+          <a:prstGeom prst="rect">
+            <a:avLst/>
+          </a:prstGeom>
+        </p:spPr>
+      </p:pic>
+      <p:pic>
+        <p:nvPicPr>
+          <p:cNvPr id="6" name="Immagine 5" descr="Immagine che contiene Carattere, logo, Elementi grafici, testo&#10;&#10;Il contenuto generato dall'IA potrebbe non essere corretto.">
+            <a:extLst>
+              <a:ext uri="{FF2B5EF4-FFF2-40B4-BE49-F238E27FC236}">
+                <a16:creationId xmlns:a16="http://schemas.microsoft.com/office/drawing/2014/main" id="{1E2347B5-D8DD-97A7-240E-F2ECBAEA4DB9}"/>
+              </a:ext>
+            </a:extLst>
+          </p:cNvPr>
+          <p:cNvPicPr>
+            <a:picLocks noChangeAspect="1"/>
+          </p:cNvPicPr>
+          <p:nvPr/>
+        </p:nvPicPr>
+        <p:blipFill>
+          <a:blip r:embed="rId3" cstate="print">
+            <a:extLst>
+              <a:ext uri="{28A0092B-C50C-407E-A947-70E740481C1C}">
+                <a14:useLocalDpi xmlns:a14="http://schemas.microsoft.com/office/drawing/2010/main" val="0"/>
+              </a:ext>
+            </a:extLst>
+          </a:blip>
+          <a:srcRect t="15992"/>
+          <a:stretch>
+            <a:fillRect/>
+          </a:stretch>
+        </p:blipFill>
+        <p:spPr>
+          <a:xfrm>
+            <a:off x="899333" y="2970815"/>
+            <a:ext cx="3268133" cy="1601185"/>
+          </a:xfrm>
+          <a:prstGeom prst="rect">
+            <a:avLst/>
+          </a:prstGeom>
+        </p:spPr>
+      </p:pic>
+      <p:pic>
+        <p:nvPicPr>
+          <p:cNvPr id="9" name="Immagine 8" descr="Immagine che contiene testo, Carattere, Elementi grafici, logo&#10;&#10;Il contenuto generato dall'IA potrebbe non essere corretto.">
+            <a:extLst>
+              <a:ext uri="{FF2B5EF4-FFF2-40B4-BE49-F238E27FC236}">
+                <a16:creationId xmlns:a16="http://schemas.microsoft.com/office/drawing/2014/main" id="{46E38BEB-388D-7674-60D2-A4DD7EE93685}"/>
+              </a:ext>
+            </a:extLst>
+          </p:cNvPr>
+          <p:cNvPicPr>
+            <a:picLocks noChangeAspect="1"/>
+          </p:cNvPicPr>
+          <p:nvPr/>
+        </p:nvPicPr>
+        <p:blipFill>
+          <a:blip r:embed="rId4" cstate="print">
+            <a:extLst>
+              <a:ext uri="{28A0092B-C50C-407E-A947-70E740481C1C}">
+                <a14:useLocalDpi xmlns:a14="http://schemas.microsoft.com/office/drawing/2010/main" val="0"/>
+              </a:ext>
+            </a:extLst>
+          </a:blip>
+          <a:srcRect b="7159"/>
+          <a:stretch>
+            <a:fillRect/>
+          </a:stretch>
+        </p:blipFill>
+        <p:spPr>
+          <a:xfrm>
+            <a:off x="7239000" y="3967162"/>
+            <a:ext cx="3784601" cy="1976438"/>
+          </a:xfrm>
+          <a:prstGeom prst="rect">
+            <a:avLst/>
+          </a:prstGeom>
+        </p:spPr>
+      </p:pic>
+    </p:spTree>
+    <p:extLst>
+      <p:ext uri="{BB962C8B-B14F-4D97-AF65-F5344CB8AC3E}">
+        <p14:creationId xmlns:p14="http://schemas.microsoft.com/office/powerpoint/2010/main" val="204895617"/>
+      </p:ext>
+    </p:extLst>
+  </p:cSld>
+  <p:clrMapOvr>
+    <a:masterClrMapping/>
+  </p:clrMapOvr>
+</p:sld>
+</file>
+
+<file path=ppt/slides/slide30.xml><?xml version="1.0" encoding="utf-8"?>
+<p:sld xmlns:a="http://schemas.openxmlformats.org/drawingml/2006/main" xmlns:r="http://schemas.openxmlformats.org/officeDocument/2006/relationships" xmlns:p="http://schemas.openxmlformats.org/presentationml/2006/main">
+  <p:cSld>
+    <p:spTree>
+      <p:nvGrpSpPr>
+        <p:cNvPr id="1" name="">
+          <a:extLst>
+            <a:ext uri="{FF2B5EF4-FFF2-40B4-BE49-F238E27FC236}">
+              <a16:creationId xmlns:a16="http://schemas.microsoft.com/office/drawing/2014/main" id="{AF21667F-B2AE-5D61-C995-DA4B68417815}"/>
+            </a:ext>
+          </a:extLst>
+        </p:cNvPr>
+        <p:cNvGrpSpPr/>
+        <p:nvPr/>
+      </p:nvGrpSpPr>
+      <p:grpSpPr>
+        <a:xfrm>
+          <a:off x="0" y="0"/>
+          <a:ext cx="0" cy="0"/>
+          <a:chOff x="0" y="0"/>
+          <a:chExt cx="0" cy="0"/>
+        </a:xfrm>
+      </p:grpSpPr>
+      <p:sp>
+        <p:nvSpPr>
+          <p:cNvPr id="10" name="Titolo 9">
+            <a:extLst>
+              <a:ext uri="{FF2B5EF4-FFF2-40B4-BE49-F238E27FC236}">
+                <a16:creationId xmlns:a16="http://schemas.microsoft.com/office/drawing/2014/main" id="{B3999717-5722-ED83-C668-DD5F955F7A42}"/>
+              </a:ext>
+            </a:extLst>
+          </p:cNvPr>
+          <p:cNvSpPr>
+            <a:spLocks noGrp="1"/>
+          </p:cNvSpPr>
+          <p:nvPr>
+            <p:ph type="title"/>
+          </p:nvPr>
+        </p:nvSpPr>
+        <p:spPr>
+          <a:xfrm>
+            <a:off x="762000" y="457201"/>
+            <a:ext cx="10515600" cy="538609"/>
+          </a:xfrm>
+        </p:spPr>
+        <p:txBody>
+          <a:bodyPr/>
+          <a:lstStyle/>
+          <a:p>
+            <a:r>
+              <a:rPr lang="en-GB" noProof="0" dirty="0">
+                <a:latin typeface="Arial Black" panose="020B0A04020102020204" pitchFamily="34" charset="0"/>
+              </a:rPr>
+              <a:t>Lasso regression</a:t>
+            </a:r>
+          </a:p>
+        </p:txBody>
+      </p:sp>
+      <p:sp>
+        <p:nvSpPr>
+          <p:cNvPr id="5" name="CasellaDiTesto 4">
+            <a:extLst>
+              <a:ext uri="{FF2B5EF4-FFF2-40B4-BE49-F238E27FC236}">
+                <a16:creationId xmlns:a16="http://schemas.microsoft.com/office/drawing/2014/main" id="{31E5BDAE-6FE9-1F44-BCE8-3AB52C859F1E}"/>
+              </a:ext>
+            </a:extLst>
+          </p:cNvPr>
+          <p:cNvSpPr txBox="1"/>
+          <p:nvPr/>
+        </p:nvSpPr>
+        <p:spPr>
+          <a:xfrm>
+            <a:off x="7467600" y="1513344"/>
+            <a:ext cx="4038600" cy="2677656"/>
+          </a:xfrm>
+          <a:prstGeom prst="rect">
+            <a:avLst/>
+          </a:prstGeom>
+          <a:noFill/>
+        </p:spPr>
+        <p:txBody>
+          <a:bodyPr wrap="square">
+            <a:spAutoFit/>
+          </a:bodyPr>
+          <a:lstStyle/>
+          <a:p>
+            <a:pPr marL="0" marR="0" lvl="0" indent="0" algn="l" defTabSz="914400" rtl="0" eaLnBrk="0" fontAlgn="base" latinLnBrk="0" hangingPunct="0">
+              <a:lnSpc>
+                <a:spcPct val="100000"/>
+              </a:lnSpc>
+              <a:spcBef>
+                <a:spcPct val="0"/>
+              </a:spcBef>
+              <a:spcAft>
+                <a:spcPct val="0"/>
+              </a:spcAft>
+              <a:buClrTx/>
+              <a:buSzTx/>
+              <a:buFontTx/>
+              <a:buNone/>
+              <a:tabLst/>
+            </a:pPr>
+            <a:r>
+              <a:rPr lang="en-GB" sz="2400" noProof="0" dirty="0"/>
+              <a:t>We proceed in the same manner with lasso regression.</a:t>
+            </a:r>
+          </a:p>
+          <a:p>
+            <a:pPr marL="0" indent="0" algn="just">
+              <a:buNone/>
+            </a:pPr>
+            <a:endParaRPr lang="en-GB" sz="2400" noProof="0" dirty="0"/>
+          </a:p>
+          <a:p>
+            <a:pPr marL="0" indent="0" algn="l">
+              <a:buNone/>
+            </a:pPr>
+            <a:r>
+              <a:rPr lang="en-GB" sz="2400" b="1" noProof="0" dirty="0"/>
+              <a:t>Best Lasso lambda</a:t>
+            </a:r>
+            <a:r>
+              <a:rPr lang="en-GB" sz="2400" noProof="0" dirty="0"/>
+              <a:t>: 0.146</a:t>
+            </a:r>
+            <a:br>
+              <a:rPr lang="en-GB" sz="2400" noProof="0" dirty="0"/>
+            </a:br>
+            <a:endParaRPr lang="en-GB" sz="2400" noProof="0" dirty="0"/>
+          </a:p>
+          <a:p>
+            <a:pPr algn="just"/>
+            <a:endParaRPr lang="en-US" sz="2400" noProof="0" dirty="0">
+              <a:latin typeface="Arial" panose="020B0604020202020204" pitchFamily="34" charset="0"/>
+              <a:cs typeface="Arial" panose="020B0604020202020204" pitchFamily="34" charset="0"/>
+            </a:endParaRPr>
+          </a:p>
+        </p:txBody>
+      </p:sp>
+      <p:pic>
+        <p:nvPicPr>
+          <p:cNvPr id="3" name="Immagine 2" descr="Immagine che contiene testo, linea, schermata, Diagramma&#10;&#10;Il contenuto generato dall'IA potrebbe non essere corretto.">
+            <a:extLst>
+              <a:ext uri="{FF2B5EF4-FFF2-40B4-BE49-F238E27FC236}">
+                <a16:creationId xmlns:a16="http://schemas.microsoft.com/office/drawing/2014/main" id="{F791FE7A-DFDC-4C87-DC84-B64329BC9A50}"/>
+              </a:ext>
+            </a:extLst>
+          </p:cNvPr>
+          <p:cNvPicPr>
+            <a:picLocks noChangeAspect="1"/>
+          </p:cNvPicPr>
+          <p:nvPr/>
+        </p:nvPicPr>
+        <p:blipFill>
+          <a:blip r:embed="rId2">
+            <a:extLst>
+              <a:ext uri="{28A0092B-C50C-407E-A947-70E740481C1C}">
+                <a14:useLocalDpi xmlns:a14="http://schemas.microsoft.com/office/drawing/2010/main" val="0"/>
+              </a:ext>
+            </a:extLst>
+          </a:blip>
+          <a:stretch>
+            <a:fillRect/>
+          </a:stretch>
+        </p:blipFill>
+        <p:spPr>
+          <a:xfrm>
+            <a:off x="762000" y="1258977"/>
+            <a:ext cx="6781800" cy="4340046"/>
+          </a:xfrm>
+          <a:prstGeom prst="rect">
+            <a:avLst/>
+          </a:prstGeom>
+        </p:spPr>
+      </p:pic>
+    </p:spTree>
+    <p:extLst>
+      <p:ext uri="{BB962C8B-B14F-4D97-AF65-F5344CB8AC3E}">
+        <p14:creationId xmlns:p14="http://schemas.microsoft.com/office/powerpoint/2010/main" val="1140103554"/>
+      </p:ext>
+    </p:extLst>
+  </p:cSld>
+  <p:clrMapOvr>
+    <a:masterClrMapping/>
+  </p:clrMapOvr>
+</p:sld>
+</file>
+
+<file path=ppt/slides/slide31.xml><?xml version="1.0" encoding="utf-8"?>
+<p:sld xmlns:a="http://schemas.openxmlformats.org/drawingml/2006/main" xmlns:r="http://schemas.openxmlformats.org/officeDocument/2006/relationships" xmlns:p="http://schemas.openxmlformats.org/presentationml/2006/main">
+  <p:cSld>
+    <p:spTree>
+      <p:nvGrpSpPr>
+        <p:cNvPr id="1" name="">
+          <a:extLst>
+            <a:ext uri="{FF2B5EF4-FFF2-40B4-BE49-F238E27FC236}">
+              <a16:creationId xmlns:a16="http://schemas.microsoft.com/office/drawing/2014/main" id="{634A1969-A2BE-42FC-3210-6215CA5667AD}"/>
+            </a:ext>
+          </a:extLst>
+        </p:cNvPr>
+        <p:cNvGrpSpPr/>
+        <p:nvPr/>
+      </p:nvGrpSpPr>
+      <p:grpSpPr>
+        <a:xfrm>
+          <a:off x="0" y="0"/>
+          <a:ext cx="0" cy="0"/>
+          <a:chOff x="0" y="0"/>
+          <a:chExt cx="0" cy="0"/>
+        </a:xfrm>
+      </p:grpSpPr>
+      <p:sp>
+        <p:nvSpPr>
+          <p:cNvPr id="10" name="Titolo 9">
+            <a:extLst>
+              <a:ext uri="{FF2B5EF4-FFF2-40B4-BE49-F238E27FC236}">
+                <a16:creationId xmlns:a16="http://schemas.microsoft.com/office/drawing/2014/main" id="{492440B4-64DB-E6BE-BB11-30F07A62978A}"/>
+              </a:ext>
+            </a:extLst>
+          </p:cNvPr>
+          <p:cNvSpPr>
+            <a:spLocks noGrp="1"/>
+          </p:cNvSpPr>
+          <p:nvPr>
+            <p:ph type="title"/>
+          </p:nvPr>
+        </p:nvSpPr>
+        <p:spPr>
+          <a:xfrm>
+            <a:off x="762000" y="457201"/>
+            <a:ext cx="10515600" cy="538609"/>
+          </a:xfrm>
+        </p:spPr>
+        <p:txBody>
+          <a:bodyPr/>
+          <a:lstStyle/>
+          <a:p>
+            <a:r>
+              <a:rPr lang="en-GB" dirty="0">
+                <a:latin typeface="Arial Black" panose="020B0A04020102020204" pitchFamily="34" charset="0"/>
+              </a:rPr>
+              <a:t>Lasso</a:t>
+            </a:r>
+            <a:r>
+              <a:rPr lang="en-GB" noProof="0" dirty="0">
+                <a:latin typeface="Arial Black" panose="020B0A04020102020204" pitchFamily="34" charset="0"/>
+              </a:rPr>
+              <a:t> regression</a:t>
+            </a:r>
+          </a:p>
+        </p:txBody>
+      </p:sp>
+      <p:sp>
+        <p:nvSpPr>
+          <p:cNvPr id="5" name="CasellaDiTesto 4">
+            <a:extLst>
+              <a:ext uri="{FF2B5EF4-FFF2-40B4-BE49-F238E27FC236}">
+                <a16:creationId xmlns:a16="http://schemas.microsoft.com/office/drawing/2014/main" id="{5988FDC8-C63A-C898-A95F-108115F8DD4B}"/>
+              </a:ext>
+            </a:extLst>
+          </p:cNvPr>
+          <p:cNvSpPr txBox="1"/>
+          <p:nvPr/>
+        </p:nvSpPr>
+        <p:spPr>
+          <a:xfrm>
+            <a:off x="685800" y="1600200"/>
+            <a:ext cx="5715000" cy="1938992"/>
+          </a:xfrm>
+          <a:prstGeom prst="rect">
+            <a:avLst/>
+          </a:prstGeom>
+          <a:noFill/>
+        </p:spPr>
+        <p:txBody>
+          <a:bodyPr wrap="square">
+            <a:spAutoFit/>
+          </a:bodyPr>
+          <a:lstStyle/>
+          <a:p>
+            <a:pPr marL="0" indent="0" algn="just">
+              <a:buNone/>
+            </a:pPr>
+            <a:r>
+              <a:rPr lang="en-GB" sz="2400" noProof="0" dirty="0"/>
+              <a:t>With lasso regression, the less significant variables are driven exactly to zero, allowing for model simplification.</a:t>
+            </a:r>
+            <a:br>
+              <a:rPr lang="en-GB" sz="2400" noProof="0" dirty="0"/>
+            </a:br>
+            <a:endParaRPr lang="en-GB" sz="2400" noProof="0" dirty="0"/>
+          </a:p>
+          <a:p>
+            <a:pPr algn="just"/>
+            <a:endParaRPr lang="en-US" sz="2400" noProof="0" dirty="0">
+              <a:latin typeface="Arial" panose="020B0604020202020204" pitchFamily="34" charset="0"/>
+              <a:cs typeface="Arial" panose="020B0604020202020204" pitchFamily="34" charset="0"/>
+            </a:endParaRPr>
+          </a:p>
+        </p:txBody>
+      </p:sp>
+      <p:pic>
+        <p:nvPicPr>
+          <p:cNvPr id="3" name="Immagine 2" descr="Immagine che contiene testo, schermata, Carattere, numero&#10;&#10;Il contenuto generato dall'IA potrebbe non essere corretto.">
+            <a:extLst>
+              <a:ext uri="{FF2B5EF4-FFF2-40B4-BE49-F238E27FC236}">
+                <a16:creationId xmlns:a16="http://schemas.microsoft.com/office/drawing/2014/main" id="{BD8616D7-36AF-97EE-6A9D-0F1395C88BE9}"/>
+              </a:ext>
+            </a:extLst>
+          </p:cNvPr>
+          <p:cNvPicPr>
+            <a:picLocks noChangeAspect="1"/>
+          </p:cNvPicPr>
+          <p:nvPr/>
+        </p:nvPicPr>
+        <p:blipFill>
+          <a:blip r:embed="rId2">
+            <a:extLst>
+              <a:ext uri="{28A0092B-C50C-407E-A947-70E740481C1C}">
+                <a14:useLocalDpi xmlns:a14="http://schemas.microsoft.com/office/drawing/2010/main" val="0"/>
+              </a:ext>
+            </a:extLst>
+          </a:blip>
+          <a:stretch>
+            <a:fillRect/>
+          </a:stretch>
+        </p:blipFill>
+        <p:spPr>
+          <a:xfrm>
+            <a:off x="6553200" y="798975"/>
+            <a:ext cx="2743200" cy="5260489"/>
+          </a:xfrm>
+          <a:prstGeom prst="rect">
+            <a:avLst/>
+          </a:prstGeom>
+        </p:spPr>
+      </p:pic>
+      <p:pic>
+        <p:nvPicPr>
+          <p:cNvPr id="7" name="Immagine 6" descr="Immagine che contiene testo, Carattere, design&#10;&#10;Il contenuto generato dall'IA potrebbe non essere corretto.">
+            <a:extLst>
+              <a:ext uri="{FF2B5EF4-FFF2-40B4-BE49-F238E27FC236}">
+                <a16:creationId xmlns:a16="http://schemas.microsoft.com/office/drawing/2014/main" id="{207000CD-D46B-5293-A113-D15C89E11E2E}"/>
+              </a:ext>
+            </a:extLst>
+          </p:cNvPr>
+          <p:cNvPicPr>
+            <a:picLocks noChangeAspect="1"/>
+          </p:cNvPicPr>
+          <p:nvPr/>
+        </p:nvPicPr>
+        <p:blipFill>
+          <a:blip r:embed="rId3">
+            <a:extLst>
+              <a:ext uri="{28A0092B-C50C-407E-A947-70E740481C1C}">
+                <a14:useLocalDpi xmlns:a14="http://schemas.microsoft.com/office/drawing/2010/main" val="0"/>
+              </a:ext>
+            </a:extLst>
+          </a:blip>
+          <a:stretch>
+            <a:fillRect/>
+          </a:stretch>
+        </p:blipFill>
+        <p:spPr>
+          <a:xfrm>
+            <a:off x="762000" y="3086100"/>
+            <a:ext cx="1506069" cy="685800"/>
+          </a:xfrm>
+          <a:prstGeom prst="rect">
+            <a:avLst/>
+          </a:prstGeom>
+        </p:spPr>
+      </p:pic>
+    </p:spTree>
+    <p:extLst>
+      <p:ext uri="{BB962C8B-B14F-4D97-AF65-F5344CB8AC3E}">
+        <p14:creationId xmlns:p14="http://schemas.microsoft.com/office/powerpoint/2010/main" val="2839230759"/>
+      </p:ext>
+    </p:extLst>
+  </p:cSld>
+  <p:clrMapOvr>
+    <a:masterClrMapping/>
+  </p:clrMapOvr>
+</p:sld>
+</file>
+
+<file path=ppt/slides/slide32.xml><?xml version="1.0" encoding="utf-8"?>
+<p:sld xmlns:a="http://schemas.openxmlformats.org/drawingml/2006/main" xmlns:r="http://schemas.openxmlformats.org/officeDocument/2006/relationships" xmlns:p="http://schemas.openxmlformats.org/presentationml/2006/main">
+  <p:cSld>
+    <p:spTree>
+      <p:nvGrpSpPr>
+        <p:cNvPr id="1" name="">
+          <a:extLst>
+            <a:ext uri="{FF2B5EF4-FFF2-40B4-BE49-F238E27FC236}">
+              <a16:creationId xmlns:a16="http://schemas.microsoft.com/office/drawing/2014/main" id="{DC76CBCF-0DE4-8144-CB01-728110A252EF}"/>
+            </a:ext>
+          </a:extLst>
+        </p:cNvPr>
+        <p:cNvGrpSpPr/>
+        <p:nvPr/>
+      </p:nvGrpSpPr>
+      <p:grpSpPr>
+        <a:xfrm>
+          <a:off x="0" y="0"/>
+          <a:ext cx="0" cy="0"/>
+          <a:chOff x="0" y="0"/>
+          <a:chExt cx="0" cy="0"/>
+        </a:xfrm>
+      </p:grpSpPr>
+      <p:sp>
+        <p:nvSpPr>
+          <p:cNvPr id="10" name="Titolo 9">
+            <a:extLst>
+              <a:ext uri="{FF2B5EF4-FFF2-40B4-BE49-F238E27FC236}">
+                <a16:creationId xmlns:a16="http://schemas.microsoft.com/office/drawing/2014/main" id="{493ABA26-5E11-8CE2-686B-FBCEC3BBDA8A}"/>
+              </a:ext>
+            </a:extLst>
+          </p:cNvPr>
+          <p:cNvSpPr>
+            <a:spLocks noGrp="1"/>
+          </p:cNvSpPr>
+          <p:nvPr>
+            <p:ph type="title"/>
+          </p:nvPr>
+        </p:nvSpPr>
+        <p:spPr>
+          <a:xfrm>
+            <a:off x="762000" y="457201"/>
+            <a:ext cx="10515600" cy="538609"/>
+          </a:xfrm>
+        </p:spPr>
+        <p:txBody>
+          <a:bodyPr/>
+          <a:lstStyle/>
+          <a:p>
+            <a:r>
+              <a:rPr lang="en-GB" dirty="0">
+                <a:latin typeface="Arial Black" panose="020B0A04020102020204" pitchFamily="34" charset="0"/>
+              </a:rPr>
+              <a:t>Lasso</a:t>
+            </a:r>
+            <a:r>
+              <a:rPr lang="en-GB" noProof="0" dirty="0">
+                <a:latin typeface="Arial Black" panose="020B0A04020102020204" pitchFamily="34" charset="0"/>
+              </a:rPr>
+              <a:t> regression</a:t>
+            </a:r>
+          </a:p>
+        </p:txBody>
+      </p:sp>
+      <p:pic>
+        <p:nvPicPr>
+          <p:cNvPr id="7" name="Immagine 6" descr="Immagine che contiene testo, schermata, Carattere, linea&#10;&#10;Il contenuto generato dall'IA potrebbe non essere corretto.">
+            <a:extLst>
+              <a:ext uri="{FF2B5EF4-FFF2-40B4-BE49-F238E27FC236}">
+                <a16:creationId xmlns:a16="http://schemas.microsoft.com/office/drawing/2014/main" id="{A0B8AF5A-C137-5790-763E-2741EEDF3FDF}"/>
+              </a:ext>
+            </a:extLst>
+          </p:cNvPr>
+          <p:cNvPicPr>
+            <a:picLocks noChangeAspect="1"/>
+          </p:cNvPicPr>
+          <p:nvPr/>
+        </p:nvPicPr>
+        <p:blipFill>
+          <a:blip r:embed="rId2">
+            <a:extLst>
+              <a:ext uri="{28A0092B-C50C-407E-A947-70E740481C1C}">
+                <a14:useLocalDpi xmlns:a14="http://schemas.microsoft.com/office/drawing/2010/main" val="0"/>
+              </a:ext>
+            </a:extLst>
+          </a:blip>
+          <a:srcRect t="13953" b="10886"/>
+          <a:stretch>
+            <a:fillRect/>
+          </a:stretch>
+        </p:blipFill>
+        <p:spPr>
+          <a:xfrm>
+            <a:off x="876300" y="5257418"/>
+            <a:ext cx="7010400" cy="764796"/>
+          </a:xfrm>
+          <a:prstGeom prst="rect">
+            <a:avLst/>
+          </a:prstGeom>
+        </p:spPr>
+      </p:pic>
+      <p:pic>
+        <p:nvPicPr>
+          <p:cNvPr id="4" name="Immagine 3" descr="Immagine che contiene testo, linea, diagramma, schermata&#10;&#10;Il contenuto generato dall'IA potrebbe non essere corretto.">
+            <a:extLst>
+              <a:ext uri="{FF2B5EF4-FFF2-40B4-BE49-F238E27FC236}">
+                <a16:creationId xmlns:a16="http://schemas.microsoft.com/office/drawing/2014/main" id="{0DDEACA7-F3B0-3828-5D4C-D8712F0D11F9}"/>
+              </a:ext>
+            </a:extLst>
+          </p:cNvPr>
+          <p:cNvPicPr>
+            <a:picLocks noChangeAspect="1"/>
+          </p:cNvPicPr>
+          <p:nvPr/>
+        </p:nvPicPr>
+        <p:blipFill>
+          <a:blip r:embed="rId3">
+            <a:extLst>
+              <a:ext uri="{28A0092B-C50C-407E-A947-70E740481C1C}">
+                <a14:useLocalDpi xmlns:a14="http://schemas.microsoft.com/office/drawing/2010/main" val="0"/>
+              </a:ext>
+            </a:extLst>
+          </a:blip>
+          <a:stretch>
+            <a:fillRect/>
+          </a:stretch>
+        </p:blipFill>
+        <p:spPr>
+          <a:xfrm>
+            <a:off x="685800" y="1143000"/>
+            <a:ext cx="7315200" cy="4160552"/>
+          </a:xfrm>
+          <a:prstGeom prst="rect">
+            <a:avLst/>
+          </a:prstGeom>
+        </p:spPr>
+      </p:pic>
+    </p:spTree>
+    <p:extLst>
+      <p:ext uri="{BB962C8B-B14F-4D97-AF65-F5344CB8AC3E}">
+        <p14:creationId xmlns:p14="http://schemas.microsoft.com/office/powerpoint/2010/main" val="2182071278"/>
+      </p:ext>
+    </p:extLst>
+  </p:cSld>
+  <p:clrMapOvr>
+    <a:masterClrMapping/>
+  </p:clrMapOvr>
+</p:sld>
+</file>
+
+<file path=ppt/slides/slide33.xml><?xml version="1.0" encoding="utf-8"?>
+<p:sld xmlns:a="http://schemas.openxmlformats.org/drawingml/2006/main" xmlns:r="http://schemas.openxmlformats.org/officeDocument/2006/relationships" xmlns:p="http://schemas.openxmlformats.org/presentationml/2006/main">
+  <p:cSld>
+    <p:spTree>
+      <p:nvGrpSpPr>
+        <p:cNvPr id="1" name="">
+          <a:extLst>
+            <a:ext uri="{FF2B5EF4-FFF2-40B4-BE49-F238E27FC236}">
+              <a16:creationId xmlns:a16="http://schemas.microsoft.com/office/drawing/2014/main" id="{BC818BCF-3A7F-BE86-EF20-D4DCA4713538}"/>
+            </a:ext>
+          </a:extLst>
+        </p:cNvPr>
+        <p:cNvGrpSpPr/>
+        <p:nvPr/>
+      </p:nvGrpSpPr>
+      <p:grpSpPr>
+        <a:xfrm>
+          <a:off x="0" y="0"/>
+          <a:ext cx="0" cy="0"/>
+          <a:chOff x="0" y="0"/>
+          <a:chExt cx="0" cy="0"/>
+        </a:xfrm>
+      </p:grpSpPr>
+      <p:sp>
+        <p:nvSpPr>
+          <p:cNvPr id="10" name="Titolo 9">
+            <a:extLst>
+              <a:ext uri="{FF2B5EF4-FFF2-40B4-BE49-F238E27FC236}">
+                <a16:creationId xmlns:a16="http://schemas.microsoft.com/office/drawing/2014/main" id="{9F9B631B-6AA1-2D79-AE60-26AFAE5DE448}"/>
+              </a:ext>
+            </a:extLst>
+          </p:cNvPr>
+          <p:cNvSpPr>
+            <a:spLocks noGrp="1"/>
+          </p:cNvSpPr>
+          <p:nvPr>
+            <p:ph type="title"/>
+          </p:nvPr>
+        </p:nvSpPr>
+        <p:spPr>
+          <a:xfrm>
+            <a:off x="762000" y="457201"/>
+            <a:ext cx="10515600" cy="538609"/>
+          </a:xfrm>
+        </p:spPr>
+        <p:txBody>
+          <a:bodyPr/>
+          <a:lstStyle/>
+          <a:p>
+            <a:r>
+              <a:rPr lang="en-GB" noProof="0" dirty="0">
+                <a:latin typeface="Arial Black" panose="020B0A04020102020204" pitchFamily="34" charset="0"/>
+              </a:rPr>
+              <a:t>Decision trees</a:t>
+            </a:r>
+          </a:p>
+        </p:txBody>
+      </p:sp>
+      <p:sp>
+        <p:nvSpPr>
+          <p:cNvPr id="5" name="CasellaDiTesto 4">
+            <a:extLst>
+              <a:ext uri="{FF2B5EF4-FFF2-40B4-BE49-F238E27FC236}">
+                <a16:creationId xmlns:a16="http://schemas.microsoft.com/office/drawing/2014/main" id="{125DC9A5-A673-8337-FF6D-57F8CA04AFDF}"/>
+              </a:ext>
+            </a:extLst>
+          </p:cNvPr>
+          <p:cNvSpPr txBox="1"/>
+          <p:nvPr/>
+        </p:nvSpPr>
+        <p:spPr>
+          <a:xfrm>
+            <a:off x="685800" y="1600200"/>
+            <a:ext cx="5257800" cy="4154984"/>
+          </a:xfrm>
+          <a:prstGeom prst="rect">
+            <a:avLst/>
+          </a:prstGeom>
+          <a:noFill/>
+        </p:spPr>
+        <p:txBody>
+          <a:bodyPr wrap="square">
+            <a:spAutoFit/>
+          </a:bodyPr>
+          <a:lstStyle/>
+          <a:p>
+            <a:pPr algn="just"/>
+            <a:r>
+              <a:rPr lang="en-US" sz="2400" dirty="0"/>
+              <a:t>We return to a non-normalized model, as normalization is not needed.</a:t>
+            </a:r>
+          </a:p>
+          <a:p>
+            <a:pPr algn="just"/>
+            <a:endParaRPr lang="en-US" sz="2400" dirty="0"/>
+          </a:p>
+          <a:p>
+            <a:pPr algn="just"/>
+            <a:r>
+              <a:rPr lang="en-US" sz="2400" dirty="0"/>
+              <a:t>Decision trees use binary splits on the regressors to classify expected value ranges.</a:t>
+            </a:r>
+          </a:p>
+          <a:p>
+            <a:pPr algn="just"/>
+            <a:endParaRPr lang="en-US" sz="2400" dirty="0"/>
+          </a:p>
+          <a:p>
+            <a:pPr algn="just"/>
+            <a:r>
+              <a:rPr lang="en-US" sz="2400" dirty="0"/>
+              <a:t>Here are the importance rate of all the variables according to our first decision tree attempt.</a:t>
+            </a:r>
+          </a:p>
+        </p:txBody>
+      </p:sp>
+      <p:pic>
+        <p:nvPicPr>
+          <p:cNvPr id="4" name="Immagine 3" descr="Immagine che contiene testo, schermata, Carattere, documento&#10;&#10;Il contenuto generato dall'IA potrebbe non essere corretto.">
+            <a:extLst>
+              <a:ext uri="{FF2B5EF4-FFF2-40B4-BE49-F238E27FC236}">
+                <a16:creationId xmlns:a16="http://schemas.microsoft.com/office/drawing/2014/main" id="{DC5D3BE3-C86D-93B4-A2D4-D4E4FD513F10}"/>
+              </a:ext>
+            </a:extLst>
+          </p:cNvPr>
+          <p:cNvPicPr>
+            <a:picLocks noChangeAspect="1"/>
+          </p:cNvPicPr>
+          <p:nvPr/>
+        </p:nvPicPr>
+        <p:blipFill>
+          <a:blip r:embed="rId2">
+            <a:extLst>
+              <a:ext uri="{28A0092B-C50C-407E-A947-70E740481C1C}">
+                <a14:useLocalDpi xmlns:a14="http://schemas.microsoft.com/office/drawing/2010/main" val="0"/>
+              </a:ext>
+            </a:extLst>
+          </a:blip>
+          <a:stretch>
+            <a:fillRect/>
+          </a:stretch>
+        </p:blipFill>
+        <p:spPr>
+          <a:xfrm>
+            <a:off x="7467600" y="726505"/>
+            <a:ext cx="2819400" cy="5171585"/>
+          </a:xfrm>
+          <a:prstGeom prst="rect">
+            <a:avLst/>
+          </a:prstGeom>
+        </p:spPr>
+      </p:pic>
+    </p:spTree>
+    <p:extLst>
+      <p:ext uri="{BB962C8B-B14F-4D97-AF65-F5344CB8AC3E}">
+        <p14:creationId xmlns:p14="http://schemas.microsoft.com/office/powerpoint/2010/main" val="1430077566"/>
+      </p:ext>
+    </p:extLst>
+  </p:cSld>
+  <p:clrMapOvr>
+    <a:masterClrMapping/>
+  </p:clrMapOvr>
+</p:sld>
+</file>
+
+<file path=ppt/slides/slide34.xml><?xml version="1.0" encoding="utf-8"?>
+<p:sld xmlns:a="http://schemas.openxmlformats.org/drawingml/2006/main" xmlns:r="http://schemas.openxmlformats.org/officeDocument/2006/relationships" xmlns:p="http://schemas.openxmlformats.org/presentationml/2006/main">
+  <p:cSld>
+    <p:spTree>
+      <p:nvGrpSpPr>
+        <p:cNvPr id="1" name="">
+          <a:extLst>
+            <a:ext uri="{FF2B5EF4-FFF2-40B4-BE49-F238E27FC236}">
+              <a16:creationId xmlns:a16="http://schemas.microsoft.com/office/drawing/2014/main" id="{321D4DE0-E2F4-2583-866E-46B20E7F1779}"/>
+            </a:ext>
+          </a:extLst>
+        </p:cNvPr>
+        <p:cNvGrpSpPr/>
+        <p:nvPr/>
+      </p:nvGrpSpPr>
+      <p:grpSpPr>
+        <a:xfrm>
+          <a:off x="0" y="0"/>
+          <a:ext cx="0" cy="0"/>
+          <a:chOff x="0" y="0"/>
+          <a:chExt cx="0" cy="0"/>
+        </a:xfrm>
+      </p:grpSpPr>
+      <p:sp>
+        <p:nvSpPr>
+          <p:cNvPr id="10" name="Titolo 9">
+            <a:extLst>
+              <a:ext uri="{FF2B5EF4-FFF2-40B4-BE49-F238E27FC236}">
+                <a16:creationId xmlns:a16="http://schemas.microsoft.com/office/drawing/2014/main" id="{39BCA619-D809-A798-8844-5ADF1D7D8176}"/>
+              </a:ext>
+            </a:extLst>
+          </p:cNvPr>
+          <p:cNvSpPr>
+            <a:spLocks noGrp="1"/>
+          </p:cNvSpPr>
+          <p:nvPr>
+            <p:ph type="title"/>
+          </p:nvPr>
+        </p:nvSpPr>
+        <p:spPr>
+          <a:xfrm>
+            <a:off x="762000" y="457201"/>
+            <a:ext cx="10515600" cy="538609"/>
+          </a:xfrm>
+        </p:spPr>
+        <p:txBody>
+          <a:bodyPr/>
+          <a:lstStyle/>
+          <a:p>
+            <a:r>
+              <a:rPr lang="en-GB" dirty="0">
+                <a:latin typeface="Arial Black" panose="020B0A04020102020204" pitchFamily="34" charset="0"/>
+              </a:rPr>
+              <a:t>Decision trees – first attempt</a:t>
+            </a:r>
+            <a:endParaRPr lang="en-GB" noProof="0" dirty="0">
+              <a:latin typeface="Arial Black" panose="020B0A04020102020204" pitchFamily="34" charset="0"/>
+            </a:endParaRPr>
+          </a:p>
+        </p:txBody>
+      </p:sp>
+      <p:pic>
+        <p:nvPicPr>
+          <p:cNvPr id="4" name="Immagine 3" descr="Immagine che contiene testo, schermata, Carattere, documento&#10;&#10;Il contenuto generato dall'IA potrebbe non essere corretto.">
+            <a:extLst>
+              <a:ext uri="{FF2B5EF4-FFF2-40B4-BE49-F238E27FC236}">
+                <a16:creationId xmlns:a16="http://schemas.microsoft.com/office/drawing/2014/main" id="{50F7EBED-78E1-3CAF-159C-0B0301C8CF42}"/>
+              </a:ext>
+            </a:extLst>
+          </p:cNvPr>
+          <p:cNvPicPr>
+            <a:picLocks noChangeAspect="1"/>
+          </p:cNvPicPr>
+          <p:nvPr/>
+        </p:nvPicPr>
+        <p:blipFill>
+          <a:blip r:embed="rId2" cstate="print">
+            <a:extLst>
+              <a:ext uri="{28A0092B-C50C-407E-A947-70E740481C1C}">
+                <a14:useLocalDpi xmlns:a14="http://schemas.microsoft.com/office/drawing/2010/main" val="0"/>
+              </a:ext>
+            </a:extLst>
+          </a:blip>
+          <a:stretch>
+            <a:fillRect/>
+          </a:stretch>
+        </p:blipFill>
+        <p:spPr>
+          <a:xfrm>
+            <a:off x="762000" y="1208378"/>
+            <a:ext cx="4972226" cy="4735222"/>
+          </a:xfrm>
+          <a:prstGeom prst="rect">
+            <a:avLst/>
+          </a:prstGeom>
+        </p:spPr>
+      </p:pic>
+      <p:sp>
+        <p:nvSpPr>
+          <p:cNvPr id="6" name="CasellaDiTesto 5">
+            <a:extLst>
+              <a:ext uri="{FF2B5EF4-FFF2-40B4-BE49-F238E27FC236}">
+                <a16:creationId xmlns:a16="http://schemas.microsoft.com/office/drawing/2014/main" id="{8262EFCC-9525-1C4B-0A37-D010B1D4AEB2}"/>
+              </a:ext>
+            </a:extLst>
+          </p:cNvPr>
+          <p:cNvSpPr txBox="1"/>
+          <p:nvPr/>
+        </p:nvSpPr>
+        <p:spPr>
+          <a:xfrm>
+            <a:off x="6019800" y="1641627"/>
+            <a:ext cx="5257800" cy="4154984"/>
+          </a:xfrm>
+          <a:prstGeom prst="rect">
+            <a:avLst/>
+          </a:prstGeom>
+          <a:noFill/>
+        </p:spPr>
+        <p:txBody>
+          <a:bodyPr wrap="square">
+            <a:spAutoFit/>
+          </a:bodyPr>
+          <a:lstStyle/>
+          <a:p>
+            <a:pPr algn="just"/>
+            <a:r>
+              <a:rPr lang="en-US" sz="2400" dirty="0">
+                <a:latin typeface="Arial" panose="020B0604020202020204" pitchFamily="34" charset="0"/>
+                <a:cs typeface="Arial" panose="020B0604020202020204" pitchFamily="34" charset="0"/>
+              </a:rPr>
+              <a:t>First attempt is way too complex, and the resulting model is poor.</a:t>
+            </a:r>
+          </a:p>
+          <a:p>
+            <a:pPr algn="just"/>
+            <a:endParaRPr lang="en-US" sz="2400" dirty="0">
+              <a:latin typeface="Arial" panose="020B0604020202020204" pitchFamily="34" charset="0"/>
+              <a:cs typeface="Arial" panose="020B0604020202020204" pitchFamily="34" charset="0"/>
+            </a:endParaRPr>
+          </a:p>
+          <a:p>
+            <a:pPr algn="just" rtl="0"/>
+            <a:r>
+              <a:rPr kumimoji="0" lang="it-IT" altLang="it-IT" sz="2400" b="0" i="0" u="none" strike="noStrike" cap="none" normalizeH="0" baseline="0" dirty="0">
+                <a:ln>
+                  <a:noFill/>
+                </a:ln>
+                <a:solidFill>
+                  <a:schemeClr val="tx1"/>
+                </a:solidFill>
+                <a:effectLst/>
+                <a:latin typeface="Arial" panose="020B0604020202020204" pitchFamily="34" charset="0"/>
+                <a:cs typeface="Arial" panose="020B0604020202020204" pitchFamily="34" charset="0"/>
+              </a:rPr>
+              <a:t>R2: 0.518 </a:t>
+            </a:r>
+          </a:p>
+          <a:p>
+            <a:pPr algn="just" rtl="0"/>
+            <a:r>
+              <a:rPr kumimoji="0" lang="it-IT" altLang="it-IT" sz="2400" b="0" i="0" u="none" strike="noStrike" cap="none" normalizeH="0" baseline="0" dirty="0">
+                <a:ln>
+                  <a:noFill/>
+                </a:ln>
+                <a:solidFill>
+                  <a:schemeClr val="tx1"/>
+                </a:solidFill>
+                <a:effectLst/>
+                <a:latin typeface="Arial" panose="020B0604020202020204" pitchFamily="34" charset="0"/>
+                <a:cs typeface="Arial" panose="020B0604020202020204" pitchFamily="34" charset="0"/>
+              </a:rPr>
+              <a:t>MSE: 214.495 </a:t>
+            </a:r>
+          </a:p>
+          <a:p>
+            <a:pPr algn="just" rtl="0"/>
+            <a:r>
+              <a:rPr kumimoji="0" lang="it-IT" altLang="it-IT" sz="2400" b="0" i="0" u="none" strike="noStrike" cap="none" normalizeH="0" baseline="0" dirty="0">
+                <a:ln>
+                  <a:noFill/>
+                </a:ln>
+                <a:solidFill>
+                  <a:schemeClr val="tx1"/>
+                </a:solidFill>
+                <a:effectLst/>
+                <a:latin typeface="Arial" panose="020B0604020202020204" pitchFamily="34" charset="0"/>
+                <a:cs typeface="Arial" panose="020B0604020202020204" pitchFamily="34" charset="0"/>
+              </a:rPr>
+              <a:t>RMSE: 14.646 </a:t>
+            </a:r>
+          </a:p>
+          <a:p>
+            <a:pPr algn="just"/>
+            <a:endParaRPr lang="en-US" sz="2400" dirty="0">
+              <a:latin typeface="Arial" panose="020B0604020202020204" pitchFamily="34" charset="0"/>
+              <a:cs typeface="Arial" panose="020B0604020202020204" pitchFamily="34" charset="0"/>
+            </a:endParaRPr>
+          </a:p>
+          <a:p>
+            <a:pPr algn="just"/>
+            <a:endParaRPr lang="en-US" sz="2400" dirty="0">
+              <a:latin typeface="Arial" panose="020B0604020202020204" pitchFamily="34" charset="0"/>
+              <a:cs typeface="Arial" panose="020B0604020202020204" pitchFamily="34" charset="0"/>
+            </a:endParaRPr>
+          </a:p>
+          <a:p>
+            <a:pPr algn="just"/>
+            <a:r>
+              <a:rPr lang="en-US" sz="2400" dirty="0">
+                <a:latin typeface="Arial" panose="020B0604020202020204" pitchFamily="34" charset="0"/>
+                <a:cs typeface="Arial" panose="020B0604020202020204" pitchFamily="34" charset="0"/>
+              </a:rPr>
+              <a:t>We proceed to prune the decision tree, in hopes of improving the model quality.</a:t>
+            </a:r>
+          </a:p>
+        </p:txBody>
+      </p:sp>
+      <p:sp>
+        <p:nvSpPr>
+          <p:cNvPr id="7" name="Rectangle 1">
+            <a:extLst>
+              <a:ext uri="{FF2B5EF4-FFF2-40B4-BE49-F238E27FC236}">
+                <a16:creationId xmlns:a16="http://schemas.microsoft.com/office/drawing/2014/main" id="{229A14C6-05FA-4255-7A67-47D2B58830CC}"/>
+              </a:ext>
+            </a:extLst>
+          </p:cNvPr>
+          <p:cNvSpPr>
+            <a:spLocks noChangeArrowheads="1"/>
+          </p:cNvSpPr>
+          <p:nvPr/>
+        </p:nvSpPr>
+        <p:spPr bwMode="auto">
+          <a:xfrm>
+            <a:off x="0" y="90100"/>
+            <a:ext cx="65" cy="276999"/>
+          </a:xfrm>
+          <a:prstGeom prst="rect">
+            <a:avLst/>
+          </a:prstGeom>
+          <a:solidFill>
+            <a:srgbClr val="FFFFFF"/>
+          </a:solidFill>
+          <a:ln>
+            <a:noFill/>
+          </a:ln>
+          <a:effectLst/>
+          <a:extLst>
+            <a:ext uri="{91240B29-F687-4F45-9708-019B960494DF}">
+              <a14:hiddenLine xmlns:a14="http://schemas.microsoft.com/office/drawing/2010/main" w="9525">
+                <a:solidFill>
+                  <a:schemeClr val="tx1"/>
+                </a:solidFill>
+                <a:miter lim="800000"/>
+                <a:headEnd/>
+                <a:tailEnd/>
+              </a14:hiddenLine>
+            </a:ext>
+            <a:ext uri="{AF507438-7753-43E0-B8FC-AC1667EBCBE1}">
+              <a14:hiddenEffects xmlns:a14="http://schemas.microsoft.com/office/drawing/2010/main">
+                <a:effectLst>
+                  <a:outerShdw dist="35921" dir="2700000" algn="ctr" rotWithShape="0">
+                    <a:schemeClr val="bg2"/>
+                  </a:outerShdw>
+                </a:effectLst>
+              </a14:hiddenEffects>
+            </a:ext>
+          </a:extLst>
+        </p:spPr>
+        <p:txBody>
+          <a:bodyPr vert="horz" wrap="none" lIns="0" tIns="0" rIns="0" bIns="0" numCol="1" anchor="ctr" anchorCtr="0" compatLnSpc="1">
+            <a:prstTxWarp prst="textNoShape">
+              <a:avLst/>
+            </a:prstTxWarp>
+            <a:spAutoFit/>
+          </a:bodyPr>
+          <a:lstStyle/>
+          <a:p>
+            <a:pPr marL="0" marR="0" lvl="0" indent="0" algn="l" defTabSz="914400" rtl="0" eaLnBrk="0" fontAlgn="base" latinLnBrk="0" hangingPunct="0">
+              <a:lnSpc>
+                <a:spcPct val="100000"/>
+              </a:lnSpc>
+              <a:spcBef>
+                <a:spcPct val="0"/>
+              </a:spcBef>
+              <a:spcAft>
+                <a:spcPct val="0"/>
+              </a:spcAft>
+              <a:buClrTx/>
+              <a:buSzTx/>
+              <a:buFontTx/>
+              <a:buNone/>
+              <a:tabLst/>
+            </a:pPr>
+            <a:endParaRPr kumimoji="0" lang="it-IT" altLang="it-IT" sz="1800" b="0" i="0" u="none" strike="noStrike" cap="none" normalizeH="0" baseline="0" dirty="0">
+              <a:ln>
+                <a:noFill/>
+              </a:ln>
+              <a:solidFill>
+                <a:schemeClr val="tx1"/>
+              </a:solidFill>
+              <a:effectLst/>
+              <a:latin typeface="Arial" panose="020B0604020202020204" pitchFamily="34" charset="0"/>
+            </a:endParaRPr>
+          </a:p>
+        </p:txBody>
+      </p:sp>
+    </p:spTree>
+    <p:extLst>
+      <p:ext uri="{BB962C8B-B14F-4D97-AF65-F5344CB8AC3E}">
+        <p14:creationId xmlns:p14="http://schemas.microsoft.com/office/powerpoint/2010/main" val="64091549"/>
+      </p:ext>
+    </p:extLst>
+  </p:cSld>
+  <p:clrMapOvr>
+    <a:masterClrMapping/>
+  </p:clrMapOvr>
+</p:sld>
+</file>
+
+<file path=ppt/slides/slide4.xml><?xml version="1.0" encoding="utf-8"?>
 <p:sld xmlns:a="http://schemas.openxmlformats.org/drawingml/2006/main" xmlns:r="http://schemas.openxmlformats.org/officeDocument/2006/relationships" xmlns:p="http://schemas.openxmlformats.org/presentationml/2006/main">
   <p:cSld>
     <p:spTree>
@@ -6096,7 +8225,7 @@
 </p:sld>
 </file>
 
-<file path=ppt/slides/slide4.xml><?xml version="1.0" encoding="utf-8"?>
+<file path=ppt/slides/slide5.xml><?xml version="1.0" encoding="utf-8"?>
 <p:sld xmlns:a="http://schemas.openxmlformats.org/drawingml/2006/main" xmlns:r="http://schemas.openxmlformats.org/officeDocument/2006/relationships" xmlns:p="http://schemas.openxmlformats.org/presentationml/2006/main">
   <p:cSld>
     <p:spTree>
@@ -6283,7 +8412,7 @@
 </p:sld>
 </file>
 
-<file path=ppt/slides/slide5.xml><?xml version="1.0" encoding="utf-8"?>
+<file path=ppt/slides/slide6.xml><?xml version="1.0" encoding="utf-8"?>
 <p:sld xmlns:a="http://schemas.openxmlformats.org/drawingml/2006/main" xmlns:r="http://schemas.openxmlformats.org/officeDocument/2006/relationships" xmlns:p="http://schemas.openxmlformats.org/presentationml/2006/main">
   <p:cSld>
     <p:spTree>
@@ -6700,7 +8829,7 @@
 </p:sld>
 </file>
 
-<file path=ppt/slides/slide6.xml><?xml version="1.0" encoding="utf-8"?>
+<file path=ppt/slides/slide7.xml><?xml version="1.0" encoding="utf-8"?>
 <p:sld xmlns:a="http://schemas.openxmlformats.org/drawingml/2006/main" xmlns:r="http://schemas.openxmlformats.org/officeDocument/2006/relationships" xmlns:p="http://schemas.openxmlformats.org/presentationml/2006/main">
   <p:cSld>
     <p:spTree>
@@ -6886,7 +9015,7 @@
 </p:sld>
 </file>
 
-<file path=ppt/slides/slide7.xml><?xml version="1.0" encoding="utf-8"?>
+<file path=ppt/slides/slide8.xml><?xml version="1.0" encoding="utf-8"?>
 <p:sld xmlns:a="http://schemas.openxmlformats.org/drawingml/2006/main" xmlns:r="http://schemas.openxmlformats.org/officeDocument/2006/relationships" xmlns:p="http://schemas.openxmlformats.org/presentationml/2006/main">
   <p:cSld>
     <p:spTree>
@@ -7048,7 +9177,7 @@
 </p:sld>
 </file>
 
-<file path=ppt/slides/slide8.xml><?xml version="1.0" encoding="utf-8"?>
+<file path=ppt/slides/slide9.xml><?xml version="1.0" encoding="utf-8"?>
 <p:sld xmlns:a="http://schemas.openxmlformats.org/drawingml/2006/main" xmlns:r="http://schemas.openxmlformats.org/officeDocument/2006/relationships" xmlns:p="http://schemas.openxmlformats.org/presentationml/2006/main">
   <p:cSld>
     <p:spTree>
@@ -7201,181 +9330,6 @@
     <p:extLst>
       <p:ext uri="{BB962C8B-B14F-4D97-AF65-F5344CB8AC3E}">
         <p14:creationId xmlns:p14="http://schemas.microsoft.com/office/powerpoint/2010/main" val="3900675229"/>
-      </p:ext>
-    </p:extLst>
-  </p:cSld>
-  <p:clrMapOvr>
-    <a:masterClrMapping/>
-  </p:clrMapOvr>
-</p:sld>
-</file>
-
-<file path=ppt/slides/slide9.xml><?xml version="1.0" encoding="utf-8"?>
-<p:sld xmlns:a="http://schemas.openxmlformats.org/drawingml/2006/main" xmlns:r="http://schemas.openxmlformats.org/officeDocument/2006/relationships" xmlns:p="http://schemas.openxmlformats.org/presentationml/2006/main">
-  <p:cSld>
-    <p:spTree>
-      <p:nvGrpSpPr>
-        <p:cNvPr id="1" name="">
-          <a:extLst>
-            <a:ext uri="{FF2B5EF4-FFF2-40B4-BE49-F238E27FC236}">
-              <a16:creationId xmlns:a16="http://schemas.microsoft.com/office/drawing/2014/main" id="{BA6FD53E-49CA-D830-B50B-627F7455BEE0}"/>
-            </a:ext>
-          </a:extLst>
-        </p:cNvPr>
-        <p:cNvGrpSpPr/>
-        <p:nvPr/>
-      </p:nvGrpSpPr>
-      <p:grpSpPr>
-        <a:xfrm>
-          <a:off x="0" y="0"/>
-          <a:ext cx="0" cy="0"/>
-          <a:chOff x="0" y="0"/>
-          <a:chExt cx="0" cy="0"/>
-        </a:xfrm>
-      </p:grpSpPr>
-      <p:sp>
-        <p:nvSpPr>
-          <p:cNvPr id="10" name="Titolo 9">
-            <a:extLst>
-              <a:ext uri="{FF2B5EF4-FFF2-40B4-BE49-F238E27FC236}">
-                <a16:creationId xmlns:a16="http://schemas.microsoft.com/office/drawing/2014/main" id="{424E2423-362E-3208-896E-568C379717FA}"/>
-              </a:ext>
-            </a:extLst>
-          </p:cNvPr>
-          <p:cNvSpPr>
-            <a:spLocks noGrp="1"/>
-          </p:cNvSpPr>
-          <p:nvPr>
-            <p:ph type="title"/>
-          </p:nvPr>
-        </p:nvSpPr>
-        <p:spPr>
-          <a:xfrm>
-            <a:off x="762000" y="457200"/>
-            <a:ext cx="10668000" cy="538609"/>
-          </a:xfrm>
-        </p:spPr>
-        <p:txBody>
-          <a:bodyPr/>
-          <a:lstStyle/>
-          <a:p>
-            <a:r>
-              <a:rPr lang="en-GB" noProof="0" dirty="0">
-                <a:latin typeface="Arial Black" panose="020B0A04020102020204" pitchFamily="34" charset="0"/>
-              </a:rPr>
-              <a:t>Data </a:t>
-            </a:r>
-            <a:r>
-              <a:rPr lang="en-GB" noProof="0" dirty="0" err="1">
-                <a:latin typeface="Arial Black" panose="020B0A04020102020204" pitchFamily="34" charset="0"/>
-              </a:rPr>
-              <a:t>Distribuition</a:t>
-            </a:r>
-            <a:r>
-              <a:rPr lang="en-GB" noProof="0" dirty="0">
-                <a:latin typeface="Arial Black" panose="020B0A04020102020204" pitchFamily="34" charset="0"/>
-              </a:rPr>
-              <a:t> – </a:t>
-            </a:r>
-            <a:r>
-              <a:rPr lang="en-GB" noProof="0" dirty="0">
-                <a:latin typeface="Arial" panose="020B0604020202020204" pitchFamily="34" charset="0"/>
-                <a:cs typeface="Arial" panose="020B0604020202020204" pitchFamily="34" charset="0"/>
-              </a:rPr>
-              <a:t>categorical</a:t>
-            </a:r>
-            <a:r>
-              <a:rPr lang="en-GB" noProof="0" dirty="0">
-                <a:latin typeface="Arial Black" panose="020B0A04020102020204" pitchFamily="34" charset="0"/>
-              </a:rPr>
-              <a:t> </a:t>
-            </a:r>
-            <a:r>
-              <a:rPr lang="en-GB" noProof="0" dirty="0">
-                <a:latin typeface="Arial" panose="020B0604020202020204" pitchFamily="34" charset="0"/>
-                <a:cs typeface="Arial" panose="020B0604020202020204" pitchFamily="34" charset="0"/>
-              </a:rPr>
-              <a:t>variables</a:t>
-            </a:r>
-          </a:p>
-        </p:txBody>
-      </p:sp>
-      <p:pic>
-        <p:nvPicPr>
-          <p:cNvPr id="3" name="Immagine 2" descr="Immagine che contiene testo, schermata, diagramma, linea&#10;&#10;Il contenuto generato dall'IA potrebbe non essere corretto.">
-            <a:extLst>
-              <a:ext uri="{FF2B5EF4-FFF2-40B4-BE49-F238E27FC236}">
-                <a16:creationId xmlns:a16="http://schemas.microsoft.com/office/drawing/2014/main" id="{142869E7-5E74-04C5-FF3D-01D89840F45C}"/>
-              </a:ext>
-            </a:extLst>
-          </p:cNvPr>
-          <p:cNvPicPr>
-            <a:picLocks noChangeAspect="1"/>
-          </p:cNvPicPr>
-          <p:nvPr/>
-        </p:nvPicPr>
-        <p:blipFill>
-          <a:blip r:embed="rId2">
-            <a:extLst>
-              <a:ext uri="{28A0092B-C50C-407E-A947-70E740481C1C}">
-                <a14:useLocalDpi xmlns:a14="http://schemas.microsoft.com/office/drawing/2010/main" val="0"/>
-              </a:ext>
-            </a:extLst>
-          </a:blip>
-          <a:stretch>
-            <a:fillRect/>
-          </a:stretch>
-        </p:blipFill>
-        <p:spPr>
-          <a:xfrm>
-            <a:off x="762000" y="1545654"/>
-            <a:ext cx="5043534" cy="3766691"/>
-          </a:xfrm>
-          <a:prstGeom prst="rect">
-            <a:avLst/>
-          </a:prstGeom>
-        </p:spPr>
-      </p:pic>
-      <p:pic>
-        <p:nvPicPr>
-          <p:cNvPr id="5" name="Immagine 4" descr="Immagine che contiene testo, schermata, diagramma, Diagramma&#10;&#10;Il contenuto generato dall'IA potrebbe non essere corretto.">
-            <a:extLst>
-              <a:ext uri="{FF2B5EF4-FFF2-40B4-BE49-F238E27FC236}">
-                <a16:creationId xmlns:a16="http://schemas.microsoft.com/office/drawing/2014/main" id="{EAD0AAE0-21E8-513C-AD44-6E073A81ED24}"/>
-              </a:ext>
-            </a:extLst>
-          </p:cNvPr>
-          <p:cNvPicPr>
-            <a:picLocks noChangeAspect="1"/>
-          </p:cNvPicPr>
-          <p:nvPr/>
-        </p:nvPicPr>
-        <p:blipFill>
-          <a:blip r:embed="rId3">
-            <a:extLst>
-              <a:ext uri="{28A0092B-C50C-407E-A947-70E740481C1C}">
-                <a14:useLocalDpi xmlns:a14="http://schemas.microsoft.com/office/drawing/2010/main" val="0"/>
-              </a:ext>
-            </a:extLst>
-          </a:blip>
-          <a:stretch>
-            <a:fillRect/>
-          </a:stretch>
-        </p:blipFill>
-        <p:spPr>
-          <a:xfrm>
-            <a:off x="6096000" y="1545654"/>
-            <a:ext cx="5043535" cy="3766691"/>
-          </a:xfrm>
-          <a:prstGeom prst="rect">
-            <a:avLst/>
-          </a:prstGeom>
-        </p:spPr>
-      </p:pic>
-    </p:spTree>
-    <p:extLst>
-      <p:ext uri="{BB962C8B-B14F-4D97-AF65-F5344CB8AC3E}">
-        <p14:creationId xmlns:p14="http://schemas.microsoft.com/office/powerpoint/2010/main" val="2930566424"/>
       </p:ext>
     </p:extLst>
   </p:cSld>

</xml_diff>

<commit_message>
regression trees aggiunti a presentazione
</commit_message>
<xml_diff>
--- a/Presentazione_Gotti_Mazzoleni.pptx
+++ b/Presentazione_Gotti_Mazzoleni.pptx
@@ -5,7 +5,7 @@
     <p:sldMasterId id="2147483648" r:id="rId1"/>
   </p:sldMasterIdLst>
   <p:notesMasterIdLst>
-    <p:notesMasterId r:id="rId36"/>
+    <p:notesMasterId r:id="rId42"/>
   </p:notesMasterIdLst>
   <p:sldIdLst>
     <p:sldId id="256" r:id="rId2"/>
@@ -42,6 +42,12 @@
     <p:sldId id="341" r:id="rId33"/>
     <p:sldId id="342" r:id="rId34"/>
     <p:sldId id="343" r:id="rId35"/>
+    <p:sldId id="344" r:id="rId36"/>
+    <p:sldId id="345" r:id="rId37"/>
+    <p:sldId id="346" r:id="rId38"/>
+    <p:sldId id="347" r:id="rId39"/>
+    <p:sldId id="348" r:id="rId40"/>
+    <p:sldId id="349" r:id="rId41"/>
   </p:sldIdLst>
   <p:sldSz cx="12192000" cy="6858000"/>
   <p:notesSz cx="12192000" cy="6858000"/>
@@ -151,7 +157,7 @@
           <a:p>
             <a:fld id="{52CF3C78-BFF9-4137-8833-13E3D0B09D8B}" type="datetimeFigureOut">
               <a:rPr lang="it-IT" smtClean="0"/>
-              <a:t>19/06/2025</a:t>
+              <a:t>20/06/2025</a:t>
             </a:fld>
             <a:endParaRPr lang="it-IT"/>
           </a:p>
@@ -569,7 +575,7 @@
           <a:p>
             <a:fld id="{1D8BD707-D9CF-40AE-B4C6-C98DA3205C09}" type="datetimeFigureOut">
               <a:rPr lang="en-US"/>
-              <a:t>6/19/2025</a:t>
+              <a:t>6/20/2025</a:t>
             </a:fld>
             <a:endParaRPr lang="en-US"/>
           </a:p>
@@ -746,7 +752,7 @@
           <a:p>
             <a:fld id="{1D8BD707-D9CF-40AE-B4C6-C98DA3205C09}" type="datetimeFigureOut">
               <a:rPr lang="en-US"/>
-              <a:t>6/19/2025</a:t>
+              <a:t>6/20/2025</a:t>
             </a:fld>
             <a:endParaRPr lang="en-US"/>
           </a:p>
@@ -960,7 +966,7 @@
           <a:p>
             <a:fld id="{1D8BD707-D9CF-40AE-B4C6-C98DA3205C09}" type="datetimeFigureOut">
               <a:rPr lang="en-US"/>
-              <a:t>6/19/2025</a:t>
+              <a:t>6/20/2025</a:t>
             </a:fld>
             <a:endParaRPr lang="en-US"/>
           </a:p>
@@ -1108,7 +1114,7 @@
           <a:p>
             <a:fld id="{1D8BD707-D9CF-40AE-B4C6-C98DA3205C09}" type="datetimeFigureOut">
               <a:rPr lang="en-US"/>
-              <a:t>6/19/2025</a:t>
+              <a:t>6/20/2025</a:t>
             </a:fld>
             <a:endParaRPr lang="en-US"/>
           </a:p>
@@ -1227,7 +1233,7 @@
           <a:p>
             <a:fld id="{1D8BD707-D9CF-40AE-B4C6-C98DA3205C09}" type="datetimeFigureOut">
               <a:rPr lang="en-US"/>
-              <a:t>6/19/2025</a:t>
+              <a:t>6/20/2025</a:t>
             </a:fld>
             <a:endParaRPr lang="en-US"/>
           </a:p>
@@ -1524,7 +1530,7 @@
           <a:p>
             <a:fld id="{1D8BD707-D9CF-40AE-B4C6-C98DA3205C09}" type="datetimeFigureOut">
               <a:rPr lang="en-US"/>
-              <a:t>6/19/2025</a:t>
+              <a:t>6/20/2025</a:t>
             </a:fld>
             <a:endParaRPr lang="en-US"/>
           </a:p>
@@ -1816,16 +1822,6 @@
               </a:lnSpc>
             </a:pPr>
             <a:r>
-              <a:rPr lang="en-GB" sz="1600" dirty="0">
-                <a:solidFill>
-                  <a:srgbClr val="FFFFFF"/>
-                </a:solidFill>
-                <a:latin typeface="Franklin Gothic Medium"/>
-                <a:cs typeface="Franklin Gothic Medium"/>
-              </a:rPr>
-              <a:t>Gotti Daniele -</a:t>
-            </a:r>
-            <a:r>
               <a:rPr lang="en-GB" sz="1600" noProof="0" dirty="0">
                 <a:solidFill>
                   <a:srgbClr val="FFFFFF"/>
@@ -1833,7 +1829,7 @@
                 <a:latin typeface="Franklin Gothic Medium"/>
                 <a:cs typeface="Franklin Gothic Medium"/>
               </a:rPr>
-              <a:t> 1079011</a:t>
+              <a:t>Gotti Daniele - 1079011</a:t>
             </a:r>
             <a:endParaRPr lang="en-GB" sz="1600" noProof="0" dirty="0">
               <a:latin typeface="Franklin Gothic Medium"/>
@@ -1872,7 +1868,7 @@
               </a:spcBef>
             </a:pPr>
             <a:r>
-              <a:rPr lang="en-GB" sz="950" dirty="0">
+              <a:rPr lang="en-GB" sz="950" noProof="0" dirty="0">
                 <a:solidFill>
                   <a:srgbClr val="C96643"/>
                 </a:solidFill>
@@ -1960,7 +1956,7 @@
               </a:rPr>
             </a:br>
             <a:r>
-              <a:rPr lang="en-GB" sz="3600" b="0" dirty="0">
+              <a:rPr lang="en-GB" sz="3600" b="0" noProof="0" dirty="0">
                 <a:solidFill>
                   <a:srgbClr val="FFFFFF"/>
                 </a:solidFill>
@@ -1970,7 +1966,7 @@
               <a:t>food</a:t>
             </a:r>
             <a:r>
-              <a:rPr lang="en-GB" sz="3600" b="0" dirty="0">
+              <a:rPr lang="en-GB" sz="3600" b="0" noProof="0" dirty="0">
                 <a:solidFill>
                   <a:srgbClr val="FFFFFF"/>
                 </a:solidFill>
@@ -1978,7 +1974,7 @@
               </a:rPr>
               <a:t> delivery times</a:t>
             </a:r>
-            <a:endParaRPr lang="en-GB" sz="3200" b="0" dirty="0">
+            <a:endParaRPr lang="en-GB" sz="3200" b="0" noProof="0" dirty="0">
               <a:solidFill>
                 <a:srgbClr val="FFFFFF"/>
               </a:solidFill>
@@ -2073,27 +2069,7 @@
                 <a:latin typeface="Franklin Gothic Medium"/>
                 <a:cs typeface="Franklin Gothic Medium"/>
               </a:rPr>
-              <a:t>Mazzoleni Gabriele </a:t>
-            </a:r>
-            <a:r>
-              <a:rPr lang="en-GB" sz="1600" dirty="0">
-                <a:solidFill>
-                  <a:srgbClr val="FFFFFF"/>
-                </a:solidFill>
-                <a:latin typeface="Franklin Gothic Medium"/>
-                <a:cs typeface="Franklin Gothic Medium"/>
-              </a:rPr>
-              <a:t>-</a:t>
-            </a:r>
-            <a:r>
-              <a:rPr lang="en-GB" sz="1600" noProof="0" dirty="0">
-                <a:solidFill>
-                  <a:srgbClr val="FFFFFF"/>
-                </a:solidFill>
-                <a:latin typeface="Franklin Gothic Medium"/>
-                <a:cs typeface="Franklin Gothic Medium"/>
-              </a:rPr>
-              <a:t> 1079514</a:t>
+              <a:t>Mazzoleni Gabriele - 1079514</a:t>
             </a:r>
             <a:endParaRPr lang="en-GB" sz="1600" noProof="0" dirty="0">
               <a:latin typeface="Franklin Gothic Medium"/>
@@ -2163,19 +2139,7 @@
               <a:rPr lang="en-GB" noProof="0" dirty="0">
                 <a:latin typeface="Arial Black" panose="020B0A04020102020204" pitchFamily="34" charset="0"/>
               </a:rPr>
-              <a:t>Data </a:t>
-            </a:r>
-            <a:r>
-              <a:rPr lang="en-GB" noProof="0" dirty="0" err="1">
-                <a:latin typeface="Arial Black" panose="020B0A04020102020204" pitchFamily="34" charset="0"/>
-              </a:rPr>
-              <a:t>Distribuition</a:t>
-            </a:r>
-            <a:r>
-              <a:rPr lang="en-GB" noProof="0" dirty="0">
-                <a:latin typeface="Arial Black" panose="020B0A04020102020204" pitchFamily="34" charset="0"/>
-              </a:rPr>
-              <a:t> – </a:t>
+              <a:t>Data Distribution – </a:t>
             </a:r>
             <a:r>
               <a:rPr lang="en-GB" noProof="0" dirty="0">
@@ -2338,44 +2302,28 @@
               <a:rPr lang="en-GB" noProof="0" dirty="0">
                 <a:latin typeface="Arial Black" panose="020B0A04020102020204" pitchFamily="34" charset="0"/>
               </a:rPr>
-              <a:t>Data </a:t>
-            </a:r>
-            <a:r>
-              <a:rPr lang="en-GB" noProof="0" dirty="0" err="1">
-                <a:latin typeface="Arial Black" panose="020B0A04020102020204" pitchFamily="34" charset="0"/>
-              </a:rPr>
-              <a:t>Distribuition</a:t>
+              <a:t>Data Distribution - </a:t>
+            </a:r>
+            <a:r>
+              <a:rPr lang="en-GB" noProof="0" dirty="0">
+                <a:latin typeface="Arial" panose="020B0604020202020204" pitchFamily="34" charset="0"/>
+                <a:cs typeface="Arial" panose="020B0604020202020204" pitchFamily="34" charset="0"/>
+              </a:rPr>
+              <a:t>categorical</a:t>
             </a:r>
             <a:r>
               <a:rPr lang="en-GB" noProof="0" dirty="0">
                 <a:latin typeface="Arial Black" panose="020B0A04020102020204" pitchFamily="34" charset="0"/>
               </a:rPr>
-              <a:t> - </a:t>
-            </a:r>
-            <a:r>
-              <a:rPr lang="en-GB" dirty="0">
+              <a:t> </a:t>
+            </a:r>
+            <a:r>
+              <a:rPr lang="en-GB" noProof="0" dirty="0">
                 <a:latin typeface="Arial" panose="020B0604020202020204" pitchFamily="34" charset="0"/>
                 <a:cs typeface="Arial" panose="020B0604020202020204" pitchFamily="34" charset="0"/>
               </a:rPr>
-              <a:t>categorical</a:t>
-            </a:r>
-            <a:r>
-              <a:rPr lang="en-GB" dirty="0">
-                <a:latin typeface="Arial Black" panose="020B0A04020102020204" pitchFamily="34" charset="0"/>
-              </a:rPr>
-              <a:t> </a:t>
-            </a:r>
-            <a:r>
-              <a:rPr lang="en-GB" dirty="0">
-                <a:latin typeface="Arial" panose="020B0604020202020204" pitchFamily="34" charset="0"/>
-                <a:cs typeface="Arial" panose="020B0604020202020204" pitchFamily="34" charset="0"/>
-              </a:rPr>
               <a:t>variables</a:t>
             </a:r>
-            <a:endParaRPr lang="en-GB" noProof="0" dirty="0">
-              <a:latin typeface="Arial" panose="020B0604020202020204" pitchFamily="34" charset="0"/>
-              <a:cs typeface="Arial" panose="020B0604020202020204" pitchFamily="34" charset="0"/>
-            </a:endParaRPr>
           </a:p>
         </p:txBody>
       </p:sp>
@@ -2589,26 +2537,26 @@
           <a:p>
             <a:pPr algn="just"/>
             <a:r>
-              <a:rPr lang="en-GB" sz="2400" dirty="0"/>
+              <a:rPr lang="en-GB" sz="2400" noProof="0" dirty="0"/>
               <a:t>Some numerical variables show a clear linear relationship with delivery time.</a:t>
             </a:r>
           </a:p>
           <a:p>
             <a:pPr algn="just"/>
-            <a:endParaRPr lang="en-GB" sz="2400" dirty="0"/>
+            <a:endParaRPr lang="en-GB" sz="2400" noProof="0" dirty="0"/>
           </a:p>
           <a:p>
             <a:pPr algn="just"/>
             <a:r>
-              <a:rPr lang="en-US" sz="2400" dirty="0"/>
+              <a:rPr lang="en-GB" sz="2400" noProof="0" dirty="0"/>
               <a:t>Even though </a:t>
             </a:r>
             <a:r>
-              <a:rPr lang="en-US" sz="2400" i="1" dirty="0"/>
+              <a:rPr lang="en-GB" sz="2400" i="1" noProof="0" dirty="0"/>
               <a:t>Courier Experience</a:t>
             </a:r>
             <a:r>
-              <a:rPr lang="en-US" sz="2400" dirty="0"/>
+              <a:rPr lang="en-GB" sz="2400" noProof="0" dirty="0"/>
               <a:t> is numerical we will consider it as categorical because the values represent discrete levels of experience.</a:t>
             </a:r>
           </a:p>
@@ -2715,53 +2663,67 @@
           <a:p>
             <a:pPr algn="just"/>
             <a:r>
-              <a:rPr lang="en-US" sz="2400" noProof="0" dirty="0">
+              <a:rPr lang="en-GB" sz="2400" noProof="0" dirty="0">
                 <a:latin typeface="Arial" panose="020B0604020202020204" pitchFamily="34" charset="0"/>
                 <a:cs typeface="Arial" panose="020B0604020202020204" pitchFamily="34" charset="0"/>
               </a:rPr>
               <a:t>The two numerical variables, </a:t>
             </a:r>
             <a:r>
-              <a:rPr lang="en-US" sz="2400" i="1" noProof="0" dirty="0">
+              <a:rPr lang="en-GB" sz="2400" i="1" noProof="0" dirty="0">
                 <a:latin typeface="Arial" panose="020B0604020202020204" pitchFamily="34" charset="0"/>
                 <a:cs typeface="Arial" panose="020B0604020202020204" pitchFamily="34" charset="0"/>
               </a:rPr>
               <a:t>Distance </a:t>
             </a:r>
             <a:r>
-              <a:rPr lang="en-US" sz="2400" noProof="0" dirty="0">
+              <a:rPr lang="en-GB" sz="2400" noProof="0" dirty="0">
                 <a:latin typeface="Arial" panose="020B0604020202020204" pitchFamily="34" charset="0"/>
                 <a:cs typeface="Arial" panose="020B0604020202020204" pitchFamily="34" charset="0"/>
               </a:rPr>
               <a:t>and</a:t>
             </a:r>
             <a:r>
-              <a:rPr lang="en-US" sz="2400" i="1" noProof="0" dirty="0">
+              <a:rPr lang="en-GB" sz="2400" i="1" noProof="0" dirty="0">
                 <a:latin typeface="Arial" panose="020B0604020202020204" pitchFamily="34" charset="0"/>
                 <a:cs typeface="Arial" panose="020B0604020202020204" pitchFamily="34" charset="0"/>
               </a:rPr>
               <a:t> Preparation Time</a:t>
             </a:r>
             <a:r>
-              <a:rPr lang="en-US" sz="2400" noProof="0" dirty="0">
+              <a:rPr lang="en-GB" sz="2400" noProof="0" dirty="0">
                 <a:latin typeface="Arial" panose="020B0604020202020204" pitchFamily="34" charset="0"/>
                 <a:cs typeface="Arial" panose="020B0604020202020204" pitchFamily="34" charset="0"/>
               </a:rPr>
               <a:t>, are selected, and the relationship between each of them and the response variable </a:t>
             </a:r>
             <a:r>
-              <a:rPr lang="en-US" sz="2400" i="1" noProof="0" dirty="0">
+              <a:rPr lang="en-GB" sz="2400" i="1" noProof="0" dirty="0">
                 <a:latin typeface="Arial" panose="020B0604020202020204" pitchFamily="34" charset="0"/>
                 <a:cs typeface="Arial" panose="020B0604020202020204" pitchFamily="34" charset="0"/>
               </a:rPr>
               <a:t>Delivery Time </a:t>
             </a:r>
             <a:r>
-              <a:rPr lang="en-US" sz="2400" noProof="0" dirty="0">
+              <a:rPr lang="en-GB" sz="2400" noProof="0" dirty="0">
                 <a:latin typeface="Arial" panose="020B0604020202020204" pitchFamily="34" charset="0"/>
                 <a:cs typeface="Arial" panose="020B0604020202020204" pitchFamily="34" charset="0"/>
               </a:rPr>
-              <a:t>is analyzed individually.</a:t>
+              <a:t>is </a:t>
+            </a:r>
+            <a:r>
+              <a:rPr lang="en-GB" sz="2400" noProof="0" dirty="0" err="1">
+                <a:latin typeface="Arial" panose="020B0604020202020204" pitchFamily="34" charset="0"/>
+                <a:cs typeface="Arial" panose="020B0604020202020204" pitchFamily="34" charset="0"/>
+              </a:rPr>
+              <a:t>analyzed</a:t>
+            </a:r>
+            <a:r>
+              <a:rPr lang="en-GB" sz="2400" noProof="0" dirty="0">
+                <a:latin typeface="Arial" panose="020B0604020202020204" pitchFamily="34" charset="0"/>
+                <a:cs typeface="Arial" panose="020B0604020202020204" pitchFamily="34" charset="0"/>
+              </a:rPr>
+              <a:t> individually.</a:t>
             </a:r>
           </a:p>
         </p:txBody>
@@ -2867,10 +2829,9 @@
           <a:lstStyle/>
           <a:p>
             <a:r>
-              <a:rPr lang="it-IT" dirty="0" err="1"/>
+              <a:rPr lang="en-GB" noProof="0" dirty="0"/>
               <a:t>Distance</a:t>
             </a:r>
-            <a:endParaRPr lang="it-IT" dirty="0"/>
           </a:p>
         </p:txBody>
       </p:sp>
@@ -2903,12 +2864,8 @@
           <a:lstStyle/>
           <a:p>
             <a:r>
-              <a:rPr lang="it-IT" dirty="0" err="1"/>
-              <a:t>Preparation</a:t>
-            </a:r>
-            <a:r>
-              <a:rPr lang="it-IT" dirty="0"/>
-              <a:t> time</a:t>
+              <a:rPr lang="en-GB" noProof="0" dirty="0"/>
+              <a:t>Preparation time</a:t>
             </a:r>
           </a:p>
         </p:txBody>
@@ -2950,7 +2907,7 @@
               </a:spcAft>
             </a:pPr>
             <a:r>
-              <a:rPr lang="en-US" b="0" i="1" dirty="0">
+              <a:rPr lang="en-GB" b="0" i="1" noProof="0" dirty="0">
                 <a:effectLst/>
                 <a:latin typeface="Arial" panose="020B0604020202020204" pitchFamily="34" charset="0"/>
                 <a:cs typeface="Arial" panose="020B0604020202020204" pitchFamily="34" charset="0"/>
@@ -2958,7 +2915,7 @@
               <a:t>Delivery Time (min)</a:t>
             </a:r>
             <a:r>
-              <a:rPr lang="en-US" b="0" i="0" dirty="0">
+              <a:rPr lang="en-GB" b="0" i="0" noProof="0" dirty="0">
                 <a:effectLst/>
                 <a:latin typeface="Arial" panose="020B0604020202020204" pitchFamily="34" charset="0"/>
                 <a:cs typeface="Arial" panose="020B0604020202020204" pitchFamily="34" charset="0"/>
@@ -2966,7 +2923,7 @@
               <a:t> = </a:t>
             </a:r>
             <a:r>
-              <a:rPr lang="en-US" b="0" i="1" dirty="0">
+              <a:rPr lang="en-GB" b="0" i="1" noProof="0" dirty="0">
                 <a:effectLst/>
                 <a:latin typeface="Arial" panose="020B0604020202020204" pitchFamily="34" charset="0"/>
                 <a:cs typeface="Arial" panose="020B0604020202020204" pitchFamily="34" charset="0"/>
@@ -2974,7 +2931,7 @@
               <a:t>b0</a:t>
             </a:r>
             <a:r>
-              <a:rPr lang="en-US" b="0" i="0" dirty="0">
+              <a:rPr lang="en-GB" b="0" i="0" noProof="0" dirty="0">
                 <a:effectLst/>
                 <a:latin typeface="Arial" panose="020B0604020202020204" pitchFamily="34" charset="0"/>
                 <a:cs typeface="Arial" panose="020B0604020202020204" pitchFamily="34" charset="0"/>
@@ -2982,7 +2939,7 @@
               <a:t> + </a:t>
             </a:r>
             <a:r>
-              <a:rPr lang="en-US" b="0" i="1" dirty="0">
+              <a:rPr lang="en-GB" b="0" i="1" noProof="0" dirty="0">
                 <a:effectLst/>
                 <a:latin typeface="Arial" panose="020B0604020202020204" pitchFamily="34" charset="0"/>
                 <a:cs typeface="Arial" panose="020B0604020202020204" pitchFamily="34" charset="0"/>
@@ -2990,7 +2947,7 @@
               <a:t>b1</a:t>
             </a:r>
             <a:r>
-              <a:rPr lang="en-US" b="0" i="0" dirty="0">
+              <a:rPr lang="en-GB" b="0" i="0" noProof="0" dirty="0">
                 <a:effectLst/>
                 <a:latin typeface="Arial" panose="020B0604020202020204" pitchFamily="34" charset="0"/>
                 <a:cs typeface="Arial" panose="020B0604020202020204" pitchFamily="34" charset="0"/>
@@ -2998,7 +2955,7 @@
               <a:t> * </a:t>
             </a:r>
             <a:r>
-              <a:rPr lang="en-US" b="0" i="1" dirty="0">
+              <a:rPr lang="en-GB" b="0" i="1" noProof="0" dirty="0">
                 <a:effectLst/>
                 <a:latin typeface="Arial" panose="020B0604020202020204" pitchFamily="34" charset="0"/>
                 <a:cs typeface="Arial" panose="020B0604020202020204" pitchFamily="34" charset="0"/>
@@ -3006,7 +2963,7 @@
               <a:t>Variable </a:t>
             </a:r>
             <a:r>
-              <a:rPr lang="en-US" b="0" i="0" dirty="0">
+              <a:rPr lang="en-GB" b="0" i="0" noProof="0" dirty="0">
                 <a:effectLst/>
                 <a:latin typeface="Arial" panose="020B0604020202020204" pitchFamily="34" charset="0"/>
                 <a:cs typeface="Arial" panose="020B0604020202020204" pitchFamily="34" charset="0"/>
@@ -3014,14 +2971,14 @@
               <a:t>+ </a:t>
             </a:r>
             <a:r>
-              <a:rPr lang="en-US" b="0" i="1" dirty="0">
+              <a:rPr lang="en-GB" b="0" i="1" noProof="0" dirty="0">
                 <a:effectLst/>
                 <a:latin typeface="Arial" panose="020B0604020202020204" pitchFamily="34" charset="0"/>
                 <a:cs typeface="Arial" panose="020B0604020202020204" pitchFamily="34" charset="0"/>
               </a:rPr>
               <a:t>e</a:t>
             </a:r>
-            <a:endParaRPr lang="en-US" b="0" i="0" dirty="0">
+            <a:endParaRPr lang="en-GB" b="0" i="0" noProof="0" dirty="0">
               <a:effectLst/>
               <a:latin typeface="Arial" panose="020B0604020202020204" pitchFamily="34" charset="0"/>
               <a:cs typeface="Arial" panose="020B0604020202020204" pitchFamily="34" charset="0"/>
@@ -3095,19 +3052,7 @@
               <a:rPr lang="en-GB" noProof="0" dirty="0">
                 <a:latin typeface="Arial Black" panose="020B0A04020102020204" pitchFamily="34" charset="0"/>
               </a:rPr>
-              <a:t>Simple linear regression</a:t>
-            </a:r>
-            <a:r>
-              <a:rPr lang="en-GB" dirty="0">
-                <a:latin typeface="Arial Black" panose="020B0A04020102020204" pitchFamily="34" charset="0"/>
-              </a:rPr>
-              <a:t> </a:t>
-            </a:r>
-            <a:r>
-              <a:rPr lang="en-GB" noProof="0" dirty="0">
-                <a:latin typeface="Arial Black" panose="020B0A04020102020204" pitchFamily="34" charset="0"/>
-              </a:rPr>
-              <a:t>- Scatterplots</a:t>
+              <a:t>Simple linear regression - Scatterplots</a:t>
             </a:r>
           </a:p>
         </p:txBody>
@@ -3284,10 +3229,9 @@
           <a:lstStyle/>
           <a:p>
             <a:r>
-              <a:rPr lang="it-IT" dirty="0" err="1"/>
+              <a:rPr lang="en-GB" noProof="0" dirty="0"/>
               <a:t>Distance</a:t>
             </a:r>
-            <a:endParaRPr lang="it-IT" dirty="0"/>
           </a:p>
         </p:txBody>
       </p:sp>
@@ -3320,12 +3264,8 @@
           <a:lstStyle/>
           <a:p>
             <a:r>
-              <a:rPr lang="it-IT" dirty="0" err="1"/>
-              <a:t>Preparation</a:t>
-            </a:r>
-            <a:r>
-              <a:rPr lang="it-IT" dirty="0"/>
-              <a:t> time</a:t>
+              <a:rPr lang="en-GB" noProof="0" dirty="0"/>
+              <a:t>Preparation time</a:t>
             </a:r>
           </a:p>
         </p:txBody>
@@ -3502,10 +3442,9 @@
           <a:lstStyle/>
           <a:p>
             <a:r>
-              <a:rPr lang="it-IT" dirty="0" err="1"/>
+              <a:rPr lang="en-GB" noProof="0" dirty="0"/>
               <a:t>Distance</a:t>
             </a:r>
-            <a:endParaRPr lang="it-IT" dirty="0"/>
           </a:p>
         </p:txBody>
       </p:sp>
@@ -3538,12 +3477,8 @@
           <a:lstStyle/>
           <a:p>
             <a:r>
-              <a:rPr lang="it-IT" dirty="0" err="1"/>
-              <a:t>Preparation</a:t>
-            </a:r>
-            <a:r>
-              <a:rPr lang="it-IT" dirty="0"/>
-              <a:t> time</a:t>
+              <a:rPr lang="en-GB" noProof="0" dirty="0"/>
+              <a:t>Preparation time</a:t>
             </a:r>
           </a:p>
         </p:txBody>
@@ -3683,25 +3618,22 @@
           <a:lstStyle/>
           <a:p>
             <a:r>
-              <a:rPr lang="en-US" noProof="0" dirty="0">
+              <a:rPr lang="en-GB" noProof="0" dirty="0">
                 <a:latin typeface="Arial Black" panose="020B0A04020102020204" pitchFamily="34" charset="0"/>
               </a:rPr>
               <a:t>Multiple linear regression -</a:t>
             </a:r>
             <a:br>
-              <a:rPr lang="en-US" noProof="0" dirty="0">
+              <a:rPr lang="en-GB" noProof="0" dirty="0">
                 <a:latin typeface="Arial Black" panose="020B0A04020102020204" pitchFamily="34" charset="0"/>
               </a:rPr>
             </a:br>
             <a:r>
-              <a:rPr lang="en-US" noProof="0" dirty="0">
+              <a:rPr lang="en-GB" noProof="0" dirty="0">
                 <a:latin typeface="Arial Black" panose="020B0A04020102020204" pitchFamily="34" charset="0"/>
               </a:rPr>
               <a:t>using numerical predictors only</a:t>
             </a:r>
-            <a:endParaRPr lang="en-GB" noProof="0" dirty="0">
-              <a:latin typeface="Arial Black" panose="020B0A04020102020204" pitchFamily="34" charset="0"/>
-            </a:endParaRPr>
           </a:p>
         </p:txBody>
       </p:sp>
@@ -3735,7 +3667,7 @@
           <a:p>
             <a:pPr algn="just"/>
             <a:r>
-              <a:rPr lang="en-GB" sz="2400" dirty="0">
+              <a:rPr lang="en-GB" sz="2400" noProof="0" dirty="0">
                 <a:latin typeface="Arial" panose="020B0604020202020204" pitchFamily="34" charset="0"/>
                 <a:cs typeface="Arial" panose="020B0604020202020204" pitchFamily="34" charset="0"/>
               </a:rPr>
@@ -3751,7 +3683,7 @@
           </a:p>
           <a:p>
             <a:pPr algn="just"/>
-            <a:endParaRPr lang="en-GB" sz="2400" dirty="0">
+            <a:endParaRPr lang="en-GB" sz="2400" noProof="0" dirty="0">
               <a:latin typeface="Arial" panose="020B0604020202020204" pitchFamily="34" charset="0"/>
               <a:cs typeface="Arial" panose="020B0604020202020204" pitchFamily="34" charset="0"/>
             </a:endParaRPr>
@@ -3765,7 +3697,7 @@
           </a:p>
           <a:p>
             <a:pPr algn="just"/>
-            <a:endParaRPr lang="en-GB" sz="2400" dirty="0">
+            <a:endParaRPr lang="en-GB" sz="2400" noProof="0" dirty="0">
               <a:latin typeface="Arial" panose="020B0604020202020204" pitchFamily="34" charset="0"/>
               <a:cs typeface="Arial" panose="020B0604020202020204" pitchFamily="34" charset="0"/>
             </a:endParaRPr>
@@ -3779,7 +3711,7 @@
           </a:p>
           <a:p>
             <a:pPr algn="just"/>
-            <a:endParaRPr lang="en-GB" sz="2400" dirty="0">
+            <a:endParaRPr lang="en-GB" sz="2400" noProof="0" dirty="0">
               <a:latin typeface="Arial" panose="020B0604020202020204" pitchFamily="34" charset="0"/>
               <a:cs typeface="Arial" panose="020B0604020202020204" pitchFamily="34" charset="0"/>
             </a:endParaRPr>
@@ -3804,7 +3736,7 @@
               <a:rPr lang="en-GB" sz="2400" noProof="0" dirty="0"/>
               <a:t>Overall, the model performs well.</a:t>
             </a:r>
-            <a:endParaRPr lang="en-US" sz="2400" noProof="0" dirty="0">
+            <a:endParaRPr lang="en-GB" sz="2400" noProof="0" dirty="0">
               <a:latin typeface="Arial" panose="020B0604020202020204" pitchFamily="34" charset="0"/>
               <a:cs typeface="Arial" panose="020B0604020202020204" pitchFamily="34" charset="0"/>
             </a:endParaRPr>
@@ -3983,18 +3915,18 @@
           <a:lstStyle/>
           <a:p>
             <a:r>
-              <a:rPr lang="en-GB" dirty="0">
+              <a:rPr lang="en-GB" noProof="0" dirty="0">
                 <a:latin typeface="Arial Black" panose="020B0A04020102020204" pitchFamily="34" charset="0"/>
               </a:rPr>
               <a:t>Multiple linear regression -</a:t>
             </a:r>
             <a:br>
-              <a:rPr lang="en-GB" dirty="0">
+              <a:rPr lang="en-GB" noProof="0" dirty="0">
                 <a:latin typeface="Arial Black" panose="020B0A04020102020204" pitchFamily="34" charset="0"/>
               </a:rPr>
             </a:br>
             <a:r>
-              <a:rPr lang="en-GB" dirty="0">
+              <a:rPr lang="en-GB" noProof="0" dirty="0">
                 <a:latin typeface="Arial Black" panose="020B0A04020102020204" pitchFamily="34" charset="0"/>
               </a:rPr>
               <a:t>categorical regressors</a:t>
@@ -4034,12 +3966,8 @@
               <a:buNone/>
             </a:pPr>
             <a:r>
-              <a:rPr lang="en-GB" sz="2400" dirty="0"/>
-              <a:t>W</a:t>
-            </a:r>
-            <a:r>
               <a:rPr lang="en-GB" sz="2400" noProof="0" dirty="0"/>
-              <a:t>e verify that the categorical variables are not strongly correlated with each other.</a:t>
+              <a:t>We verify that the categorical variables are not strongly correlated with each other.</a:t>
             </a:r>
           </a:p>
           <a:p>
@@ -4047,13 +3975,13 @@
               <a:buNone/>
             </a:pPr>
             <a:br>
-              <a:rPr lang="en-GB" sz="2400" dirty="0">
+              <a:rPr lang="en-GB" sz="2400" noProof="0" dirty="0">
                 <a:latin typeface="Arial" panose="020B0604020202020204" pitchFamily="34" charset="0"/>
                 <a:cs typeface="Arial" panose="020B0604020202020204" pitchFamily="34" charset="0"/>
               </a:rPr>
             </a:br>
             <a:r>
-              <a:rPr lang="en-GB" sz="2400" dirty="0">
+              <a:rPr lang="en-GB" sz="2400" noProof="0" dirty="0">
                 <a:latin typeface="Arial" panose="020B0604020202020204" pitchFamily="34" charset="0"/>
                 <a:cs typeface="Arial" panose="020B0604020202020204" pitchFamily="34" charset="0"/>
               </a:rPr>
@@ -4162,18 +4090,18 @@
           <a:lstStyle/>
           <a:p>
             <a:r>
-              <a:rPr lang="en-GB" dirty="0">
+              <a:rPr lang="en-GB" noProof="0" dirty="0">
                 <a:latin typeface="Arial Black" panose="020B0A04020102020204" pitchFamily="34" charset="0"/>
               </a:rPr>
               <a:t>Multiple linear regression -</a:t>
             </a:r>
             <a:br>
-              <a:rPr lang="en-GB" dirty="0">
+              <a:rPr lang="en-GB" noProof="0" dirty="0">
                 <a:latin typeface="Arial Black" panose="020B0A04020102020204" pitchFamily="34" charset="0"/>
               </a:rPr>
             </a:br>
             <a:r>
-              <a:rPr lang="en-GB" dirty="0">
+              <a:rPr lang="en-GB" noProof="0" dirty="0">
                 <a:latin typeface="Arial Black" panose="020B0A04020102020204" pitchFamily="34" charset="0"/>
               </a:rPr>
               <a:t>full model evaluation</a:t>
@@ -4249,7 +4177,7 @@
               <a:buNone/>
             </a:pPr>
             <a:r>
-              <a:rPr lang="en-US" sz="2400" dirty="0">
+              <a:rPr lang="en-GB" sz="2400" noProof="0" dirty="0">
                 <a:latin typeface="Arial" panose="020B0604020202020204" pitchFamily="34" charset="0"/>
                 <a:cs typeface="Arial" panose="020B0604020202020204" pitchFamily="34" charset="0"/>
               </a:rPr>
@@ -4260,54 +4188,50 @@
             <a:pPr marL="0" indent="0">
               <a:buNone/>
             </a:pPr>
-            <a:endParaRPr lang="en-US" sz="2400" noProof="0" dirty="0">
-              <a:latin typeface="Arial" panose="020B0604020202020204" pitchFamily="34" charset="0"/>
-              <a:cs typeface="Arial" panose="020B0604020202020204" pitchFamily="34" charset="0"/>
-            </a:endParaRPr>
-          </a:p>
-          <a:p>
-            <a:pPr marL="0" indent="0">
-              <a:buNone/>
-            </a:pPr>
-            <a:r>
-              <a:rPr lang="en-US" sz="2400" dirty="0">
-                <a:latin typeface="Arial" panose="020B0604020202020204" pitchFamily="34" charset="0"/>
-                <a:cs typeface="Arial" panose="020B0604020202020204" pitchFamily="34" charset="0"/>
-              </a:rPr>
-              <a:t>We notice that the p-values for </a:t>
-            </a:r>
-            <a:r>
-              <a:rPr lang="en-US" sz="2400" i="1" dirty="0">
-                <a:latin typeface="Arial" panose="020B0604020202020204" pitchFamily="34" charset="0"/>
-                <a:cs typeface="Arial" panose="020B0604020202020204" pitchFamily="34" charset="0"/>
-              </a:rPr>
-              <a:t>Vehicle Type</a:t>
-            </a:r>
-            <a:r>
-              <a:rPr lang="en-US" sz="2400" dirty="0">
-                <a:latin typeface="Arial" panose="020B0604020202020204" pitchFamily="34" charset="0"/>
-                <a:cs typeface="Arial" panose="020B0604020202020204" pitchFamily="34" charset="0"/>
-              </a:rPr>
-              <a:t> and </a:t>
-            </a:r>
-            <a:r>
-              <a:rPr lang="en-US" sz="2400" i="1" dirty="0">
-                <a:latin typeface="Arial" panose="020B0604020202020204" pitchFamily="34" charset="0"/>
-                <a:cs typeface="Arial" panose="020B0604020202020204" pitchFamily="34" charset="0"/>
-              </a:rPr>
-              <a:t>Time of Day</a:t>
-            </a:r>
-            <a:r>
-              <a:rPr lang="en-US" sz="2400" dirty="0">
-                <a:latin typeface="Arial" panose="020B0604020202020204" pitchFamily="34" charset="0"/>
-                <a:cs typeface="Arial" panose="020B0604020202020204" pitchFamily="34" charset="0"/>
-              </a:rPr>
-              <a:t> are high, so we choose to remove them. </a:t>
-            </a:r>
             <a:endParaRPr lang="en-GB" sz="2400" noProof="0" dirty="0">
               <a:latin typeface="Arial" panose="020B0604020202020204" pitchFamily="34" charset="0"/>
               <a:cs typeface="Arial" panose="020B0604020202020204" pitchFamily="34" charset="0"/>
             </a:endParaRPr>
+          </a:p>
+          <a:p>
+            <a:pPr marL="0" indent="0">
+              <a:buNone/>
+            </a:pPr>
+            <a:r>
+              <a:rPr lang="en-GB" sz="2400" noProof="0" dirty="0">
+                <a:latin typeface="Arial" panose="020B0604020202020204" pitchFamily="34" charset="0"/>
+                <a:cs typeface="Arial" panose="020B0604020202020204" pitchFamily="34" charset="0"/>
+              </a:rPr>
+              <a:t>We notice that the p-values for </a:t>
+            </a:r>
+            <a:r>
+              <a:rPr lang="en-GB" sz="2400" i="1" noProof="0" dirty="0">
+                <a:latin typeface="Arial" panose="020B0604020202020204" pitchFamily="34" charset="0"/>
+                <a:cs typeface="Arial" panose="020B0604020202020204" pitchFamily="34" charset="0"/>
+              </a:rPr>
+              <a:t>Vehicle Type</a:t>
+            </a:r>
+            <a:r>
+              <a:rPr lang="en-GB" sz="2400" noProof="0" dirty="0">
+                <a:latin typeface="Arial" panose="020B0604020202020204" pitchFamily="34" charset="0"/>
+                <a:cs typeface="Arial" panose="020B0604020202020204" pitchFamily="34" charset="0"/>
+              </a:rPr>
+              <a:t> and </a:t>
+            </a:r>
+            <a:r>
+              <a:rPr lang="en-GB" sz="2400" i="1" noProof="0" dirty="0">
+                <a:latin typeface="Arial" panose="020B0604020202020204" pitchFamily="34" charset="0"/>
+                <a:cs typeface="Arial" panose="020B0604020202020204" pitchFamily="34" charset="0"/>
+              </a:rPr>
+              <a:t>Time of Day</a:t>
+            </a:r>
+            <a:r>
+              <a:rPr lang="en-GB" sz="2400" noProof="0" dirty="0">
+                <a:latin typeface="Arial" panose="020B0604020202020204" pitchFamily="34" charset="0"/>
+                <a:cs typeface="Arial" panose="020B0604020202020204" pitchFamily="34" charset="0"/>
+              </a:rPr>
+              <a:t> are high, so we choose to remove them. </a:t>
+            </a:r>
           </a:p>
         </p:txBody>
       </p:sp>
@@ -4421,7 +4345,7 @@
           </a:p>
           <a:p>
             <a:pPr algn="just"/>
-            <a:endParaRPr lang="en-GB" sz="2400" dirty="0">
+            <a:endParaRPr lang="en-GB" sz="2400" noProof="0" dirty="0">
               <a:latin typeface="Arial" panose="020B0604020202020204" pitchFamily="34" charset="0"/>
               <a:cs typeface="Arial" panose="020B0604020202020204" pitchFamily="34" charset="0"/>
             </a:endParaRPr>
@@ -4429,7 +4353,7 @@
           <a:p>
             <a:pPr algn="just"/>
             <a:r>
-              <a:rPr lang="en-GB" sz="2400" dirty="0">
+              <a:rPr lang="en-GB" sz="2400" noProof="0" dirty="0">
                 <a:latin typeface="Arial" panose="020B0604020202020204" pitchFamily="34" charset="0"/>
                 <a:cs typeface="Arial" panose="020B0604020202020204" pitchFamily="34" charset="0"/>
               </a:rPr>
@@ -4501,18 +4425,18 @@
           <a:lstStyle/>
           <a:p>
             <a:r>
-              <a:rPr lang="en-GB" dirty="0">
+              <a:rPr lang="en-GB" noProof="0" dirty="0">
                 <a:latin typeface="Arial Black" panose="020B0A04020102020204" pitchFamily="34" charset="0"/>
               </a:rPr>
               <a:t>Multiple linear regression -</a:t>
             </a:r>
             <a:br>
-              <a:rPr lang="en-GB" dirty="0">
+              <a:rPr lang="en-GB" noProof="0" dirty="0">
                 <a:latin typeface="Arial Black" panose="020B0A04020102020204" pitchFamily="34" charset="0"/>
               </a:rPr>
             </a:br>
             <a:r>
-              <a:rPr lang="en-GB" dirty="0">
+              <a:rPr lang="en-GB" noProof="0" dirty="0">
                 <a:latin typeface="Arial Black" panose="020B0A04020102020204" pitchFamily="34" charset="0"/>
               </a:rPr>
               <a:t>refined model</a:t>
@@ -4624,7 +4548,7 @@
               <a:buNone/>
             </a:pPr>
             <a:r>
-              <a:rPr lang="en-US" sz="2400" dirty="0"/>
+              <a:rPr lang="en-GB" sz="2400" noProof="0" dirty="0"/>
               <a:t>By removing those two variables, we obtained a simpler and more interpretable model.</a:t>
             </a:r>
           </a:p>
@@ -4633,10 +4557,10 @@
               <a:buNone/>
             </a:pPr>
             <a:br>
-              <a:rPr lang="en-US" sz="2400" dirty="0"/>
+              <a:rPr lang="en-GB" sz="2400" noProof="0" dirty="0"/>
             </a:br>
             <a:r>
-              <a:rPr lang="en-US" sz="2400" dirty="0"/>
+              <a:rPr lang="en-GB" sz="2400" noProof="0" dirty="0"/>
               <a:t>This was achieved without losing the good performance of the previous full model.</a:t>
             </a:r>
             <a:endParaRPr lang="en-GB" sz="2400" noProof="0" dirty="0">
@@ -4709,18 +4633,18 @@
           <a:lstStyle/>
           <a:p>
             <a:r>
-              <a:rPr lang="en-GB" dirty="0">
+              <a:rPr lang="en-GB" noProof="0" dirty="0">
                 <a:latin typeface="Arial Black" panose="020B0A04020102020204" pitchFamily="34" charset="0"/>
               </a:rPr>
               <a:t>Multiple linear regression -</a:t>
             </a:r>
             <a:br>
-              <a:rPr lang="en-GB" dirty="0">
+              <a:rPr lang="en-GB" noProof="0" dirty="0">
                 <a:latin typeface="Arial Black" panose="020B0A04020102020204" pitchFamily="34" charset="0"/>
               </a:rPr>
             </a:br>
             <a:r>
-              <a:rPr lang="en-GB" dirty="0">
+              <a:rPr lang="en-GB" noProof="0" dirty="0">
                 <a:latin typeface="Arial Black" panose="020B0A04020102020204" pitchFamily="34" charset="0"/>
               </a:rPr>
               <a:t>refined model</a:t>
@@ -4829,35 +4753,14 @@
           <a:lstStyle/>
           <a:p>
             <a:r>
-              <a:rPr lang="en-US" dirty="0">
+              <a:rPr lang="en-GB" noProof="0" dirty="0">
                 <a:latin typeface="Arial" panose="020B0604020202020204" pitchFamily="34" charset="0"/>
                 <a:cs typeface="Arial" panose="020B0604020202020204" pitchFamily="34" charset="0"/>
               </a:rPr>
-              <a:t>In the residuals, we can observe a clear cone-shaped pattern, which </a:t>
-            </a:r>
-            <a:r>
-              <a:rPr lang="it-IT" dirty="0" err="1">
-                <a:latin typeface="Arial" panose="020B0604020202020204" pitchFamily="34" charset="0"/>
-                <a:cs typeface="Arial" panose="020B0604020202020204" pitchFamily="34" charset="0"/>
-              </a:rPr>
-              <a:t>indicates</a:t>
-            </a:r>
-            <a:r>
-              <a:rPr lang="it-IT" dirty="0">
-                <a:latin typeface="Arial" panose="020B0604020202020204" pitchFamily="34" charset="0"/>
-                <a:cs typeface="Arial" panose="020B0604020202020204" pitchFamily="34" charset="0"/>
-              </a:rPr>
-              <a:t> </a:t>
-            </a:r>
-            <a:r>
-              <a:rPr lang="it-IT" dirty="0" err="1">
-                <a:latin typeface="Arial" panose="020B0604020202020204" pitchFamily="34" charset="0"/>
-                <a:cs typeface="Arial" panose="020B0604020202020204" pitchFamily="34" charset="0"/>
-              </a:rPr>
-              <a:t>heteroscedasticity</a:t>
-            </a:r>
-            <a:r>
-              <a:rPr lang="it-IT" dirty="0"/>
+              <a:t>In the residuals, we can observe a clear cone-shaped pattern, which indicates heteroscedasticity</a:t>
+            </a:r>
+            <a:r>
+              <a:rPr lang="en-GB" noProof="0" dirty="0"/>
               <a:t>.</a:t>
             </a:r>
           </a:p>
@@ -4926,18 +4829,18 @@
           <a:lstStyle/>
           <a:p>
             <a:r>
-              <a:rPr lang="en-GB" dirty="0">
+              <a:rPr lang="en-GB" noProof="0" dirty="0">
                 <a:latin typeface="Arial Black" panose="020B0A04020102020204" pitchFamily="34" charset="0"/>
               </a:rPr>
               <a:t>Multiple linear regression -</a:t>
             </a:r>
             <a:br>
-              <a:rPr lang="en-GB" dirty="0">
+              <a:rPr lang="en-GB" noProof="0" dirty="0">
                 <a:latin typeface="Arial Black" panose="020B0A04020102020204" pitchFamily="34" charset="0"/>
               </a:rPr>
             </a:br>
             <a:r>
-              <a:rPr lang="en-GB" dirty="0">
+              <a:rPr lang="en-GB" noProof="0" dirty="0">
                 <a:latin typeface="Arial Black" panose="020B0A04020102020204" pitchFamily="34" charset="0"/>
               </a:rPr>
               <a:t>log transformation</a:t>
@@ -4945,8 +4848,8 @@
           </a:p>
         </p:txBody>
       </p:sp>
-      <mc:AlternateContent xmlns:mc="http://schemas.openxmlformats.org/markup-compatibility/2006" xmlns:a14="http://schemas.microsoft.com/office/drawing/2010/main">
-        <mc:Choice Requires="a14">
+      <mc:AlternateContent xmlns:mc="http://schemas.openxmlformats.org/markup-compatibility/2006">
+        <mc:Choice xmlns:a14="http://schemas.microsoft.com/office/drawing/2010/main" Requires="a14">
           <p:sp>
             <p:nvSpPr>
               <p:cNvPr id="8" name="CasellaDiTesto 7">
@@ -4980,7 +4883,7 @@
                     <m:sSup>
                       <m:sSupPr>
                         <m:ctrlPr>
-                          <a:rPr lang="it-IT" i="1" smtClean="0">
+                          <a:rPr lang="en-GB" i="1" noProof="0" smtClean="0">
                             <a:latin typeface="Cambria Math" panose="02040503050406030204" pitchFamily="18" charset="0"/>
                             <a:cs typeface="Arial" panose="020B0604020202020204" pitchFamily="34" charset="0"/>
                           </a:rPr>
@@ -4988,7 +4891,7 @@
                       </m:sSupPr>
                       <m:e>
                         <m:r>
-                          <a:rPr lang="it-IT" b="0" i="1" smtClean="0">
+                          <a:rPr lang="en-GB" b="0" i="1" noProof="0" smtClean="0">
                             <a:latin typeface="Cambria Math" panose="02040503050406030204" pitchFamily="18" charset="0"/>
                             <a:cs typeface="Arial" panose="020B0604020202020204" pitchFamily="34" charset="0"/>
                           </a:rPr>
@@ -4997,7 +4900,7 @@
                       </m:e>
                       <m:sup>
                         <m:r>
-                          <a:rPr lang="it-IT" b="0" i="1" smtClean="0">
+                          <a:rPr lang="en-GB" b="0" i="1" noProof="0" smtClean="0">
                             <a:latin typeface="Cambria Math" panose="02040503050406030204" pitchFamily="18" charset="0"/>
                             <a:cs typeface="Arial" panose="020B0604020202020204" pitchFamily="34" charset="0"/>
                           </a:rPr>
@@ -5008,14 +4911,14 @@
                   </m:oMath>
                 </a14:m>
                 <a:r>
-                  <a:rPr lang="it-IT" dirty="0"/>
+                  <a:rPr lang="en-GB" noProof="0" dirty="0"/>
                   <a:t>: 0.823</a:t>
                 </a:r>
               </a:p>
             </p:txBody>
           </p:sp>
         </mc:Choice>
-        <mc:Fallback xmlns="">
+        <mc:Fallback>
           <p:sp>
             <p:nvSpPr>
               <p:cNvPr id="8" name="CasellaDiTesto 7">
@@ -5195,18 +5098,18 @@
           <a:lstStyle/>
           <a:p>
             <a:r>
-              <a:rPr lang="en-GB" dirty="0">
+              <a:rPr lang="en-GB" noProof="0" dirty="0">
                 <a:latin typeface="Arial Black" panose="020B0A04020102020204" pitchFamily="34" charset="0"/>
               </a:rPr>
               <a:t>Multiple linear regression -</a:t>
             </a:r>
             <a:br>
-              <a:rPr lang="en-GB" dirty="0">
+              <a:rPr lang="en-GB" noProof="0" dirty="0">
                 <a:latin typeface="Arial Black" panose="020B0A04020102020204" pitchFamily="34" charset="0"/>
               </a:rPr>
             </a:br>
             <a:r>
-              <a:rPr lang="en-GB" dirty="0">
+              <a:rPr lang="en-GB" noProof="0" dirty="0">
                 <a:latin typeface="Arial Black" panose="020B0A04020102020204" pitchFamily="34" charset="0"/>
               </a:rPr>
               <a:t>square root transformation</a:t>
@@ -5214,8 +5117,8 @@
           </a:p>
         </p:txBody>
       </p:sp>
-      <mc:AlternateContent xmlns:mc="http://schemas.openxmlformats.org/markup-compatibility/2006" xmlns:a14="http://schemas.microsoft.com/office/drawing/2010/main">
-        <mc:Choice Requires="a14">
+      <mc:AlternateContent xmlns:mc="http://schemas.openxmlformats.org/markup-compatibility/2006">
+        <mc:Choice xmlns:a14="http://schemas.microsoft.com/office/drawing/2010/main" Requires="a14">
           <p:sp>
             <p:nvSpPr>
               <p:cNvPr id="2" name="CasellaDiTesto 1">
@@ -5249,7 +5152,7 @@
                     <m:sSup>
                       <m:sSupPr>
                         <m:ctrlPr>
-                          <a:rPr lang="it-IT" i="1" smtClean="0">
+                          <a:rPr lang="en-GB" i="1" noProof="0" smtClean="0">
                             <a:latin typeface="Cambria Math" panose="02040503050406030204" pitchFamily="18" charset="0"/>
                             <a:cs typeface="Arial" panose="020B0604020202020204" pitchFamily="34" charset="0"/>
                           </a:rPr>
@@ -5257,7 +5160,7 @@
                       </m:sSupPr>
                       <m:e>
                         <m:r>
-                          <a:rPr lang="it-IT" b="0" i="1" smtClean="0">
+                          <a:rPr lang="en-GB" b="0" i="1" noProof="0" smtClean="0">
                             <a:latin typeface="Cambria Math" panose="02040503050406030204" pitchFamily="18" charset="0"/>
                             <a:cs typeface="Arial" panose="020B0604020202020204" pitchFamily="34" charset="0"/>
                           </a:rPr>
@@ -5266,7 +5169,7 @@
                       </m:e>
                       <m:sup>
                         <m:r>
-                          <a:rPr lang="it-IT" b="0" i="1" smtClean="0">
+                          <a:rPr lang="en-GB" b="0" i="1" noProof="0" smtClean="0">
                             <a:latin typeface="Cambria Math" panose="02040503050406030204" pitchFamily="18" charset="0"/>
                             <a:cs typeface="Arial" panose="020B0604020202020204" pitchFamily="34" charset="0"/>
                           </a:rPr>
@@ -5277,14 +5180,14 @@
                   </m:oMath>
                 </a14:m>
                 <a:r>
-                  <a:rPr lang="it-IT" dirty="0"/>
+                  <a:rPr lang="en-GB" noProof="0" dirty="0"/>
                   <a:t>: 0.827</a:t>
                 </a:r>
               </a:p>
             </p:txBody>
           </p:sp>
         </mc:Choice>
-        <mc:Fallback xmlns="">
+        <mc:Fallback>
           <p:sp>
             <p:nvSpPr>
               <p:cNvPr id="2" name="CasellaDiTesto 1">
@@ -5464,18 +5367,18 @@
           <a:lstStyle/>
           <a:p>
             <a:r>
-              <a:rPr lang="en-GB" dirty="0">
+              <a:rPr lang="en-GB" noProof="0" dirty="0">
                 <a:latin typeface="Arial Black" panose="020B0A04020102020204" pitchFamily="34" charset="0"/>
               </a:rPr>
               <a:t>Multiple linear regression -</a:t>
             </a:r>
             <a:br>
-              <a:rPr lang="en-GB" dirty="0">
+              <a:rPr lang="en-GB" noProof="0" dirty="0">
                 <a:latin typeface="Arial Black" panose="020B0A04020102020204" pitchFamily="34" charset="0"/>
               </a:rPr>
             </a:br>
             <a:r>
-              <a:rPr lang="en-GB" dirty="0">
+              <a:rPr lang="en-GB" noProof="0" dirty="0">
                 <a:latin typeface="Arial Black" panose="020B0A04020102020204" pitchFamily="34" charset="0"/>
               </a:rPr>
               <a:t>box cox transformation</a:t>
@@ -5483,8 +5386,8 @@
           </a:p>
         </p:txBody>
       </p:sp>
-      <mc:AlternateContent xmlns:mc="http://schemas.openxmlformats.org/markup-compatibility/2006" xmlns:a14="http://schemas.microsoft.com/office/drawing/2010/main">
-        <mc:Choice Requires="a14">
+      <mc:AlternateContent xmlns:mc="http://schemas.openxmlformats.org/markup-compatibility/2006">
+        <mc:Choice xmlns:a14="http://schemas.microsoft.com/office/drawing/2010/main" Requires="a14">
           <p:sp>
             <p:nvSpPr>
               <p:cNvPr id="2" name="CasellaDiTesto 1">
@@ -5518,7 +5421,7 @@
                     <m:sSup>
                       <m:sSupPr>
                         <m:ctrlPr>
-                          <a:rPr lang="it-IT" i="1" smtClean="0">
+                          <a:rPr lang="en-GB" i="1" noProof="0" smtClean="0">
                             <a:latin typeface="Cambria Math" panose="02040503050406030204" pitchFamily="18" charset="0"/>
                             <a:cs typeface="Arial" panose="020B0604020202020204" pitchFamily="34" charset="0"/>
                           </a:rPr>
@@ -5526,7 +5429,7 @@
                       </m:sSupPr>
                       <m:e>
                         <m:r>
-                          <a:rPr lang="it-IT" b="0" i="1" smtClean="0">
+                          <a:rPr lang="en-GB" b="0" i="1" noProof="0" smtClean="0">
                             <a:latin typeface="Cambria Math" panose="02040503050406030204" pitchFamily="18" charset="0"/>
                             <a:cs typeface="Arial" panose="020B0604020202020204" pitchFamily="34" charset="0"/>
                           </a:rPr>
@@ -5535,7 +5438,7 @@
                       </m:e>
                       <m:sup>
                         <m:r>
-                          <a:rPr lang="it-IT" b="0" i="1" smtClean="0">
+                          <a:rPr lang="en-GB" b="0" i="1" noProof="0" smtClean="0">
                             <a:latin typeface="Cambria Math" panose="02040503050406030204" pitchFamily="18" charset="0"/>
                             <a:cs typeface="Arial" panose="020B0604020202020204" pitchFamily="34" charset="0"/>
                           </a:rPr>
@@ -5546,14 +5449,14 @@
                   </m:oMath>
                 </a14:m>
                 <a:r>
-                  <a:rPr lang="it-IT" dirty="0"/>
+                  <a:rPr lang="en-GB" noProof="0" dirty="0"/>
                   <a:t>: 0.825</a:t>
                 </a:r>
               </a:p>
             </p:txBody>
           </p:sp>
         </mc:Choice>
-        <mc:Fallback xmlns="">
+        <mc:Fallback>
           <p:sp>
             <p:nvSpPr>
               <p:cNvPr id="2" name="CasellaDiTesto 1">
@@ -5771,30 +5674,16 @@
           <a:p>
             <a:pPr algn="just"/>
             <a:r>
-              <a:rPr lang="en-US" sz="2400" noProof="0" dirty="0">
+              <a:rPr lang="en-GB" sz="2400" noProof="0" dirty="0">
                 <a:latin typeface="Arial" panose="020B0604020202020204" pitchFamily="34" charset="0"/>
                 <a:cs typeface="Arial" panose="020B0604020202020204" pitchFamily="34" charset="0"/>
               </a:rPr>
-              <a:t>We split </a:t>
-            </a:r>
-            <a:r>
-              <a:rPr lang="en-US" sz="2400" dirty="0">
-                <a:latin typeface="Arial" panose="020B0604020202020204" pitchFamily="34" charset="0"/>
-                <a:cs typeface="Arial" panose="020B0604020202020204" pitchFamily="34" charset="0"/>
-              </a:rPr>
-              <a:t>the dataset </a:t>
-            </a:r>
-            <a:r>
-              <a:rPr lang="en-US" sz="2400" noProof="0" dirty="0">
-                <a:latin typeface="Arial" panose="020B0604020202020204" pitchFamily="34" charset="0"/>
-                <a:cs typeface="Arial" panose="020B0604020202020204" pitchFamily="34" charset="0"/>
-              </a:rPr>
-              <a:t>to compute three Cross Validation methods on the regression model.</a:t>
+              <a:t>We split the dataset to compute three Cross Validation methods on the regression model.</a:t>
             </a:r>
           </a:p>
           <a:p>
             <a:pPr algn="just"/>
-            <a:endParaRPr lang="en-US" sz="2400" dirty="0">
+            <a:endParaRPr lang="en-GB" sz="2400" noProof="0" dirty="0">
               <a:latin typeface="Arial" panose="020B0604020202020204" pitchFamily="34" charset="0"/>
               <a:cs typeface="Arial" panose="020B0604020202020204" pitchFamily="34" charset="0"/>
             </a:endParaRPr>
@@ -5805,14 +5694,14 @@
               <a:buChar char="•"/>
             </a:pPr>
             <a:r>
-              <a:rPr lang="en-US" sz="2400" b="1" dirty="0">
+              <a:rPr lang="en-GB" sz="2400" b="1" noProof="0" dirty="0">
                 <a:latin typeface="Arial" panose="020B0604020202020204" pitchFamily="34" charset="0"/>
                 <a:cs typeface="Arial" panose="020B0604020202020204" pitchFamily="34" charset="0"/>
               </a:rPr>
               <a:t>Basic Cross Validation</a:t>
             </a:r>
             <a:r>
-              <a:rPr lang="en-US" sz="2400" dirty="0">
+              <a:rPr lang="en-GB" sz="2400" noProof="0" dirty="0">
                 <a:latin typeface="Arial" panose="020B0604020202020204" pitchFamily="34" charset="0"/>
                 <a:cs typeface="Arial" panose="020B0604020202020204" pitchFamily="34" charset="0"/>
               </a:rPr>
@@ -5822,7 +5711,7 @@
           <a:p>
             <a:pPr algn="just"/>
             <a:r>
-              <a:rPr lang="en-US" sz="2400" dirty="0">
+              <a:rPr lang="en-GB" sz="2400" noProof="0" dirty="0">
                 <a:latin typeface="Arial" panose="020B0604020202020204" pitchFamily="34" charset="0"/>
                 <a:cs typeface="Arial" panose="020B0604020202020204" pitchFamily="34" charset="0"/>
               </a:rPr>
@@ -5831,7 +5720,7 @@
           </a:p>
           <a:p>
             <a:pPr algn="just"/>
-            <a:endParaRPr lang="en-US" sz="2400" dirty="0">
+            <a:endParaRPr lang="en-GB" sz="2400" noProof="0" dirty="0">
               <a:latin typeface="Arial" panose="020B0604020202020204" pitchFamily="34" charset="0"/>
               <a:cs typeface="Arial" panose="020B0604020202020204" pitchFamily="34" charset="0"/>
             </a:endParaRPr>
@@ -5842,14 +5731,14 @@
               <a:buChar char="•"/>
             </a:pPr>
             <a:r>
-              <a:rPr lang="en-US" sz="2400" b="1" dirty="0">
+              <a:rPr lang="en-GB" sz="2400" b="1" noProof="0" dirty="0">
                 <a:latin typeface="Arial" panose="020B0604020202020204" pitchFamily="34" charset="0"/>
                 <a:cs typeface="Arial" panose="020B0604020202020204" pitchFamily="34" charset="0"/>
               </a:rPr>
               <a:t>Leave-One-Out Cross Validation</a:t>
             </a:r>
             <a:r>
-              <a:rPr lang="en-US" sz="2400" dirty="0">
+              <a:rPr lang="en-GB" sz="2400" noProof="0" dirty="0">
                 <a:latin typeface="Arial" panose="020B0604020202020204" pitchFamily="34" charset="0"/>
                 <a:cs typeface="Arial" panose="020B0604020202020204" pitchFamily="34" charset="0"/>
               </a:rPr>
@@ -5859,29 +5748,29 @@
           <a:p>
             <a:pPr algn="just"/>
             <a:r>
-              <a:rPr lang="en-US" sz="2400" dirty="0">
+              <a:rPr lang="en-GB" sz="2400" noProof="0" dirty="0">
                 <a:latin typeface="Arial" panose="020B0604020202020204" pitchFamily="34" charset="0"/>
                 <a:cs typeface="Arial" panose="020B0604020202020204" pitchFamily="34" charset="0"/>
               </a:rPr>
               <a:t>	MSE: </a:t>
             </a:r>
             <a:r>
-              <a:rPr lang="it-IT" sz="2400" dirty="0"/>
+              <a:rPr lang="en-GB" sz="2400" noProof="0" dirty="0"/>
               <a:t>89.766</a:t>
             </a:r>
             <a:r>
-              <a:rPr lang="en-US" sz="2400" dirty="0">
+              <a:rPr lang="en-GB" sz="2400" noProof="0" dirty="0">
                 <a:latin typeface="Arial" panose="020B0604020202020204" pitchFamily="34" charset="0"/>
                 <a:cs typeface="Arial" panose="020B0604020202020204" pitchFamily="34" charset="0"/>
               </a:rPr>
               <a:t>		RMSE: </a:t>
             </a:r>
             <a:r>
-              <a:rPr lang="it-IT" sz="2400" dirty="0"/>
+              <a:rPr lang="en-GB" sz="2400" noProof="0" dirty="0"/>
               <a:t>9.474</a:t>
             </a:r>
             <a:r>
-              <a:rPr lang="en-US" sz="2400" noProof="0" dirty="0">
+              <a:rPr lang="en-GB" sz="2400" noProof="0" dirty="0">
                 <a:latin typeface="Arial" panose="020B0604020202020204" pitchFamily="34" charset="0"/>
                 <a:cs typeface="Arial" panose="020B0604020202020204" pitchFamily="34" charset="0"/>
               </a:rPr>
@@ -5893,7 +5782,7 @@
               <a:buFont typeface="Arial" panose="020B0604020202020204" pitchFamily="34" charset="0"/>
               <a:buChar char="•"/>
             </a:pPr>
-            <a:endParaRPr lang="en-US" sz="2400" noProof="0" dirty="0">
+            <a:endParaRPr lang="en-GB" sz="2400" noProof="0" dirty="0">
               <a:latin typeface="Arial" panose="020B0604020202020204" pitchFamily="34" charset="0"/>
               <a:cs typeface="Arial" panose="020B0604020202020204" pitchFamily="34" charset="0"/>
             </a:endParaRPr>
@@ -5904,14 +5793,14 @@
               <a:buChar char="•"/>
             </a:pPr>
             <a:r>
-              <a:rPr lang="en-US" sz="2400" b="1" dirty="0">
+              <a:rPr lang="en-GB" sz="2400" b="1" noProof="0" dirty="0">
                 <a:latin typeface="Arial" panose="020B0604020202020204" pitchFamily="34" charset="0"/>
                 <a:cs typeface="Arial" panose="020B0604020202020204" pitchFamily="34" charset="0"/>
               </a:rPr>
               <a:t>K-Fold Cross Validation</a:t>
             </a:r>
             <a:r>
-              <a:rPr lang="en-US" sz="2400" dirty="0">
+              <a:rPr lang="en-GB" sz="2400" noProof="0" dirty="0">
                 <a:latin typeface="Arial" panose="020B0604020202020204" pitchFamily="34" charset="0"/>
                 <a:cs typeface="Arial" panose="020B0604020202020204" pitchFamily="34" charset="0"/>
               </a:rPr>
@@ -5921,28 +5810,28 @@
           <a:p>
             <a:pPr algn="just"/>
             <a:r>
-              <a:rPr lang="en-US" sz="2400" dirty="0">
+              <a:rPr lang="en-GB" sz="2400" noProof="0" dirty="0">
                 <a:latin typeface="Arial" panose="020B0604020202020204" pitchFamily="34" charset="0"/>
                 <a:cs typeface="Arial" panose="020B0604020202020204" pitchFamily="34" charset="0"/>
               </a:rPr>
               <a:t>	MSE: </a:t>
             </a:r>
             <a:r>
-              <a:rPr lang="it-IT" sz="2400" dirty="0"/>
+              <a:rPr lang="en-GB" sz="2400" noProof="0" dirty="0"/>
               <a:t>89.613	</a:t>
             </a:r>
             <a:r>
-              <a:rPr lang="en-US" sz="2400" dirty="0">
+              <a:rPr lang="en-GB" sz="2400" noProof="0" dirty="0">
                 <a:latin typeface="Arial" panose="020B0604020202020204" pitchFamily="34" charset="0"/>
                 <a:cs typeface="Arial" panose="020B0604020202020204" pitchFamily="34" charset="0"/>
               </a:rPr>
               <a:t>	RMSE: </a:t>
             </a:r>
             <a:r>
-              <a:rPr lang="it-IT" sz="2400" dirty="0"/>
+              <a:rPr lang="en-GB" sz="2400" noProof="0" dirty="0"/>
               <a:t>9.466</a:t>
             </a:r>
-            <a:endParaRPr lang="en-US" sz="2400" dirty="0">
+            <a:endParaRPr lang="en-GB" sz="2400" noProof="0" dirty="0">
               <a:latin typeface="Arial" panose="020B0604020202020204" pitchFamily="34" charset="0"/>
               <a:cs typeface="Arial" panose="020B0604020202020204" pitchFamily="34" charset="0"/>
             </a:endParaRPr>
@@ -6050,51 +5939,44 @@
           <a:p>
             <a:pPr algn="just"/>
             <a:r>
-              <a:rPr lang="en-US" sz="2400" noProof="0" dirty="0">
+              <a:rPr lang="en-GB" sz="2400" noProof="0" dirty="0">
                 <a:latin typeface="Arial" panose="020B0604020202020204" pitchFamily="34" charset="0"/>
                 <a:cs typeface="Arial" panose="020B0604020202020204" pitchFamily="34" charset="0"/>
               </a:rPr>
-              <a:t>We </a:t>
-            </a:r>
-            <a:r>
-              <a:rPr lang="en-US" sz="2400" dirty="0">
+              <a:t>We utilize two methods: </a:t>
+            </a:r>
+            <a:r>
+              <a:rPr lang="en-GB" sz="2400" b="1" noProof="0" dirty="0">
                 <a:latin typeface="Arial" panose="020B0604020202020204" pitchFamily="34" charset="0"/>
                 <a:cs typeface="Arial" panose="020B0604020202020204" pitchFamily="34" charset="0"/>
               </a:rPr>
-              <a:t>utilize two methods: </a:t>
-            </a:r>
-            <a:r>
-              <a:rPr lang="en-US" sz="2400" b="1" dirty="0">
+              <a:t>Ridge </a:t>
+            </a:r>
+            <a:r>
+              <a:rPr lang="en-GB" sz="2400" noProof="0" dirty="0">
                 <a:latin typeface="Arial" panose="020B0604020202020204" pitchFamily="34" charset="0"/>
                 <a:cs typeface="Arial" panose="020B0604020202020204" pitchFamily="34" charset="0"/>
               </a:rPr>
-              <a:t>Ridge </a:t>
-            </a:r>
-            <a:r>
-              <a:rPr lang="en-US" sz="2400" dirty="0">
+              <a:t>and </a:t>
+            </a:r>
+            <a:r>
+              <a:rPr lang="en-GB" sz="2400" b="1" noProof="0" dirty="0">
                 <a:latin typeface="Arial" panose="020B0604020202020204" pitchFamily="34" charset="0"/>
                 <a:cs typeface="Arial" panose="020B0604020202020204" pitchFamily="34" charset="0"/>
               </a:rPr>
-              <a:t>and </a:t>
-            </a:r>
-            <a:r>
-              <a:rPr lang="en-US" sz="2400" b="1" dirty="0">
+              <a:t>Lasso regression</a:t>
+            </a:r>
+            <a:r>
+              <a:rPr lang="en-GB" sz="2400" noProof="0" dirty="0">
                 <a:latin typeface="Arial" panose="020B0604020202020204" pitchFamily="34" charset="0"/>
                 <a:cs typeface="Arial" panose="020B0604020202020204" pitchFamily="34" charset="0"/>
               </a:rPr>
-              <a:t>Lasso regression</a:t>
-            </a:r>
-            <a:r>
-              <a:rPr lang="en-US" sz="2400" dirty="0">
-                <a:latin typeface="Arial" panose="020B0604020202020204" pitchFamily="34" charset="0"/>
-                <a:cs typeface="Arial" panose="020B0604020202020204" pitchFamily="34" charset="0"/>
-              </a:rPr>
               <a:t>.</a:t>
             </a:r>
           </a:p>
           <a:p>
             <a:pPr algn="just"/>
-            <a:endParaRPr lang="en-US" sz="2400" noProof="0" dirty="0">
+            <a:endParaRPr lang="en-GB" sz="2400" noProof="0" dirty="0">
               <a:latin typeface="Arial" panose="020B0604020202020204" pitchFamily="34" charset="0"/>
               <a:cs typeface="Arial" panose="020B0604020202020204" pitchFamily="34" charset="0"/>
             </a:endParaRPr>
@@ -6102,7 +5984,7 @@
           <a:p>
             <a:pPr algn="just"/>
             <a:r>
-              <a:rPr lang="en-US" sz="2400" noProof="0" dirty="0">
+              <a:rPr lang="en-GB" sz="2400" noProof="0" dirty="0">
                 <a:latin typeface="Arial" panose="020B0604020202020204" pitchFamily="34" charset="0"/>
                 <a:cs typeface="Arial" panose="020B0604020202020204" pitchFamily="34" charset="0"/>
               </a:rPr>
@@ -6123,7 +6005,7 @@
           </a:p>
           <a:p>
             <a:pPr algn="just"/>
-            <a:endParaRPr lang="en-GB" sz="2400" dirty="0">
+            <a:endParaRPr lang="en-GB" sz="2400" noProof="0" dirty="0">
               <a:latin typeface="Arial" panose="020B0604020202020204" pitchFamily="34" charset="0"/>
               <a:cs typeface="Arial" panose="020B0604020202020204" pitchFamily="34" charset="0"/>
             </a:endParaRPr>
@@ -6145,7 +6027,7 @@
           </a:p>
           <a:p>
             <a:pPr algn="just"/>
-            <a:endParaRPr lang="en-US" sz="2400" noProof="0" dirty="0">
+            <a:endParaRPr lang="en-GB" sz="2400" noProof="0" dirty="0">
               <a:latin typeface="Arial" panose="020B0604020202020204" pitchFamily="34" charset="0"/>
               <a:cs typeface="Arial" panose="020B0604020202020204" pitchFamily="34" charset="0"/>
             </a:endParaRPr>
@@ -6246,7 +6128,7 @@
           <a:p>
             <a:pPr algn="just"/>
             <a:r>
-              <a:rPr lang="en-GB" sz="2400" dirty="0">
+              <a:rPr lang="en-GB" sz="2400" noProof="0" dirty="0">
                 <a:latin typeface="Arial" panose="020B0604020202020204" pitchFamily="34" charset="0"/>
                 <a:cs typeface="Arial" panose="020B0604020202020204" pitchFamily="34" charset="0"/>
               </a:rPr>
@@ -6254,26 +6136,26 @@
             </a:r>
           </a:p>
           <a:p>
-            <a:endParaRPr lang="it-IT" sz="2400" dirty="0">
+            <a:endParaRPr lang="en-GB" sz="2400" noProof="0" dirty="0">
               <a:latin typeface="Arial" panose="020B0604020202020204" pitchFamily="34" charset="0"/>
               <a:cs typeface="Arial" panose="020B0604020202020204" pitchFamily="34" charset="0"/>
             </a:endParaRPr>
           </a:p>
           <a:p>
-            <a:endParaRPr lang="it-IT" sz="2400" dirty="0">
+            <a:endParaRPr lang="en-GB" sz="2400" noProof="0" dirty="0">
               <a:latin typeface="Arial" panose="020B0604020202020204" pitchFamily="34" charset="0"/>
               <a:cs typeface="Arial" panose="020B0604020202020204" pitchFamily="34" charset="0"/>
             </a:endParaRPr>
           </a:p>
           <a:p>
-            <a:endParaRPr lang="it-IT" sz="2400" dirty="0">
+            <a:endParaRPr lang="en-GB" sz="2400" noProof="0" dirty="0">
               <a:latin typeface="Arial" panose="020B0604020202020204" pitchFamily="34" charset="0"/>
               <a:cs typeface="Arial" panose="020B0604020202020204" pitchFamily="34" charset="0"/>
             </a:endParaRPr>
           </a:p>
           <a:p>
             <a:r>
-              <a:rPr lang="it-IT" sz="2400" dirty="0">
+              <a:rPr lang="en-GB" sz="2400" noProof="0" dirty="0">
                 <a:latin typeface="Arial" panose="020B0604020202020204" pitchFamily="34" charset="0"/>
                 <a:cs typeface="Arial" panose="020B0604020202020204" pitchFamily="34" charset="0"/>
               </a:rPr>
@@ -6323,14 +6205,11 @@
           </a:lstStyle>
           <a:p>
             <a:r>
-              <a:rPr lang="en-GB">
+              <a:rPr lang="en-GB" noProof="0" dirty="0">
                 <a:latin typeface="Arial Black" panose="020B0A04020102020204" pitchFamily="34" charset="0"/>
               </a:rPr>
               <a:t>Ridge regression</a:t>
             </a:r>
-            <a:endParaRPr lang="en-GB" dirty="0">
-              <a:latin typeface="Arial Black" panose="020B0A04020102020204" pitchFamily="34" charset="0"/>
-            </a:endParaRPr>
           </a:p>
         </p:txBody>
       </p:sp>
@@ -6473,10 +6352,10 @@
               <a:buNone/>
             </a:pPr>
             <a:r>
-              <a:rPr lang="en-US" sz="2400" dirty="0"/>
+              <a:rPr lang="en-GB" sz="2400" noProof="0" dirty="0"/>
               <a:t>We see that the less significant variables have coefficients very close to zero for ridge regression.</a:t>
             </a:r>
-            <a:endParaRPr lang="en-GB" sz="2400" dirty="0">
+            <a:endParaRPr lang="en-GB" sz="2400" noProof="0" dirty="0">
               <a:latin typeface="Arial" panose="020B0604020202020204" pitchFamily="34" charset="0"/>
               <a:cs typeface="Arial" panose="020B0604020202020204" pitchFamily="34" charset="0"/>
             </a:endParaRPr>
@@ -6516,7 +6395,7 @@
           </a:p>
           <a:p>
             <a:pPr algn="just"/>
-            <a:endParaRPr lang="en-US" sz="2400" noProof="0" dirty="0">
+            <a:endParaRPr lang="en-GB" sz="2400" noProof="0" dirty="0">
               <a:latin typeface="Arial" panose="020B0604020202020204" pitchFamily="34" charset="0"/>
               <a:cs typeface="Arial" panose="020B0604020202020204" pitchFamily="34" charset="0"/>
             </a:endParaRPr>
@@ -6844,14 +6723,7 @@
                 <a:latin typeface="Arial" panose="020B0604020202020204" pitchFamily="34" charset="0"/>
                 <a:cs typeface="Arial" panose="020B0604020202020204" pitchFamily="34" charset="0"/>
               </a:rPr>
-              <a:t>In the current market for</a:t>
-            </a:r>
-            <a:r>
-              <a:rPr lang="en-GB" sz="2400" dirty="0">
-                <a:latin typeface="Arial" panose="020B0604020202020204" pitchFamily="34" charset="0"/>
-                <a:cs typeface="Arial" panose="020B0604020202020204" pitchFamily="34" charset="0"/>
-              </a:rPr>
-              <a:t> food delivery, full of already established services, it is paramount to find new ways to differentiate, to ensure a wider range of consumers.</a:t>
+              <a:t>In the current market for food delivery, full of already established services, it is paramount to find new ways to differentiate, to ensure a wider range of consumers.</a:t>
             </a:r>
           </a:p>
         </p:txBody>
@@ -7111,7 +6983,7 @@
           </a:p>
           <a:p>
             <a:pPr algn="just"/>
-            <a:endParaRPr lang="en-US" sz="2400" noProof="0" dirty="0">
+            <a:endParaRPr lang="en-GB" sz="2400" noProof="0" dirty="0">
               <a:latin typeface="Arial" panose="020B0604020202020204" pitchFamily="34" charset="0"/>
               <a:cs typeface="Arial" panose="020B0604020202020204" pitchFamily="34" charset="0"/>
             </a:endParaRPr>
@@ -7217,16 +7089,10 @@
           <a:lstStyle/>
           <a:p>
             <a:r>
-              <a:rPr lang="en-GB" dirty="0">
-                <a:latin typeface="Arial Black" panose="020B0A04020102020204" pitchFamily="34" charset="0"/>
-              </a:rPr>
-              <a:t>Lasso</a:t>
-            </a:r>
-            <a:r>
               <a:rPr lang="en-GB" noProof="0" dirty="0">
                 <a:latin typeface="Arial Black" panose="020B0A04020102020204" pitchFamily="34" charset="0"/>
               </a:rPr>
-              <a:t> regression</a:t>
+              <a:t>Lasso regression</a:t>
             </a:r>
           </a:p>
         </p:txBody>
@@ -7273,7 +7139,7 @@
           </a:p>
           <a:p>
             <a:pPr algn="just"/>
-            <a:endParaRPr lang="en-US" sz="2400" noProof="0" dirty="0">
+            <a:endParaRPr lang="en-GB" sz="2400" noProof="0" dirty="0">
               <a:latin typeface="Arial" panose="020B0604020202020204" pitchFamily="34" charset="0"/>
               <a:cs typeface="Arial" panose="020B0604020202020204" pitchFamily="34" charset="0"/>
             </a:endParaRPr>
@@ -7415,16 +7281,10 @@
           <a:lstStyle/>
           <a:p>
             <a:r>
-              <a:rPr lang="en-GB" dirty="0">
-                <a:latin typeface="Arial Black" panose="020B0A04020102020204" pitchFamily="34" charset="0"/>
-              </a:rPr>
-              <a:t>Lasso</a:t>
-            </a:r>
-            <a:r>
               <a:rPr lang="en-GB" noProof="0" dirty="0">
                 <a:latin typeface="Arial Black" panose="020B0A04020102020204" pitchFamily="34" charset="0"/>
               </a:rPr>
-              <a:t> regression</a:t>
+              <a:t>Lasso regression</a:t>
             </a:r>
           </a:p>
         </p:txBody>
@@ -7603,29 +7463,29 @@
           <a:p>
             <a:pPr algn="just"/>
             <a:r>
-              <a:rPr lang="en-US" sz="2400" dirty="0"/>
+              <a:rPr lang="en-GB" sz="2400" noProof="0" dirty="0"/>
               <a:t>We return to a non-normalized model, as normalization is not needed.</a:t>
             </a:r>
           </a:p>
           <a:p>
             <a:pPr algn="just"/>
-            <a:endParaRPr lang="en-US" sz="2400" dirty="0"/>
+            <a:endParaRPr lang="en-GB" sz="2400" noProof="0" dirty="0"/>
           </a:p>
           <a:p>
             <a:pPr algn="just"/>
             <a:r>
-              <a:rPr lang="en-US" sz="2400" dirty="0"/>
+              <a:rPr lang="en-GB" sz="2400" noProof="0" dirty="0"/>
               <a:t>Decision trees use binary splits on the regressors to classify expected value ranges.</a:t>
             </a:r>
           </a:p>
           <a:p>
             <a:pPr algn="just"/>
-            <a:endParaRPr lang="en-US" sz="2400" dirty="0"/>
+            <a:endParaRPr lang="en-GB" sz="2400" noProof="0" dirty="0"/>
           </a:p>
           <a:p>
             <a:pPr algn="just"/>
             <a:r>
-              <a:rPr lang="en-US" sz="2400" dirty="0"/>
+              <a:rPr lang="en-GB" sz="2400" noProof="0" dirty="0"/>
               <a:t>Here are the importance rate of all the variables according to our first decision tree attempt.</a:t>
             </a:r>
           </a:p>
@@ -7730,14 +7590,11 @@
           <a:lstStyle/>
           <a:p>
             <a:r>
-              <a:rPr lang="en-GB" dirty="0">
+              <a:rPr lang="en-GB" noProof="0" dirty="0">
                 <a:latin typeface="Arial Black" panose="020B0A04020102020204" pitchFamily="34" charset="0"/>
               </a:rPr>
-              <a:t>Decision trees – first attempt</a:t>
-            </a:r>
-            <a:endParaRPr lang="en-GB" noProof="0" dirty="0">
-              <a:latin typeface="Arial Black" panose="020B0A04020102020204" pitchFamily="34" charset="0"/>
-            </a:endParaRPr>
+              <a:t>Regression tree – first attempt</a:t>
+            </a:r>
           </a:p>
         </p:txBody>
       </p:sp>
@@ -7777,127 +7634,217 @@
           </a:prstGeom>
         </p:spPr>
       </p:pic>
-      <p:sp>
-        <p:nvSpPr>
-          <p:cNvPr id="6" name="CasellaDiTesto 5">
-            <a:extLst>
-              <a:ext uri="{FF2B5EF4-FFF2-40B4-BE49-F238E27FC236}">
-                <a16:creationId xmlns:a16="http://schemas.microsoft.com/office/drawing/2014/main" id="{8262EFCC-9525-1C4B-0A37-D010B1D4AEB2}"/>
-              </a:ext>
-            </a:extLst>
-          </p:cNvPr>
-          <p:cNvSpPr txBox="1"/>
-          <p:nvPr/>
-        </p:nvSpPr>
-        <p:spPr>
-          <a:xfrm>
-            <a:off x="6019800" y="1641627"/>
-            <a:ext cx="5257800" cy="4154984"/>
-          </a:xfrm>
-          <a:prstGeom prst="rect">
-            <a:avLst/>
-          </a:prstGeom>
-          <a:noFill/>
-        </p:spPr>
-        <p:txBody>
-          <a:bodyPr wrap="square">
-            <a:spAutoFit/>
-          </a:bodyPr>
-          <a:lstStyle/>
-          <a:p>
-            <a:pPr algn="just"/>
-            <a:r>
-              <a:rPr lang="en-US" sz="2400" dirty="0">
-                <a:latin typeface="Arial" panose="020B0604020202020204" pitchFamily="34" charset="0"/>
-                <a:cs typeface="Arial" panose="020B0604020202020204" pitchFamily="34" charset="0"/>
-              </a:rPr>
-              <a:t>First attempt is way too complex, and the resulting model is poor.</a:t>
-            </a:r>
-          </a:p>
-          <a:p>
-            <a:pPr algn="just"/>
-            <a:endParaRPr lang="en-US" sz="2400" dirty="0">
-              <a:latin typeface="Arial" panose="020B0604020202020204" pitchFamily="34" charset="0"/>
-              <a:cs typeface="Arial" panose="020B0604020202020204" pitchFamily="34" charset="0"/>
-            </a:endParaRPr>
-          </a:p>
-          <a:p>
-            <a:pPr algn="just" rtl="0"/>
-            <a:r>
-              <a:rPr kumimoji="0" lang="it-IT" altLang="it-IT" sz="2400" b="0" i="0" u="none" strike="noStrike" cap="none" normalizeH="0" baseline="0" dirty="0">
-                <a:ln>
-                  <a:noFill/>
-                </a:ln>
-                <a:solidFill>
-                  <a:schemeClr val="tx1"/>
-                </a:solidFill>
-                <a:effectLst/>
-                <a:latin typeface="Arial" panose="020B0604020202020204" pitchFamily="34" charset="0"/>
-                <a:cs typeface="Arial" panose="020B0604020202020204" pitchFamily="34" charset="0"/>
-              </a:rPr>
-              <a:t>R2: 0.518 </a:t>
-            </a:r>
-          </a:p>
-          <a:p>
-            <a:pPr algn="just" rtl="0"/>
-            <a:r>
-              <a:rPr kumimoji="0" lang="it-IT" altLang="it-IT" sz="2400" b="0" i="0" u="none" strike="noStrike" cap="none" normalizeH="0" baseline="0" dirty="0">
-                <a:ln>
-                  <a:noFill/>
-                </a:ln>
-                <a:solidFill>
-                  <a:schemeClr val="tx1"/>
-                </a:solidFill>
-                <a:effectLst/>
-                <a:latin typeface="Arial" panose="020B0604020202020204" pitchFamily="34" charset="0"/>
-                <a:cs typeface="Arial" panose="020B0604020202020204" pitchFamily="34" charset="0"/>
-              </a:rPr>
-              <a:t>MSE: 214.495 </a:t>
-            </a:r>
-          </a:p>
-          <a:p>
-            <a:pPr algn="just" rtl="0"/>
-            <a:r>
-              <a:rPr kumimoji="0" lang="it-IT" altLang="it-IT" sz="2400" b="0" i="0" u="none" strike="noStrike" cap="none" normalizeH="0" baseline="0" dirty="0">
-                <a:ln>
-                  <a:noFill/>
-                </a:ln>
-                <a:solidFill>
-                  <a:schemeClr val="tx1"/>
-                </a:solidFill>
-                <a:effectLst/>
-                <a:latin typeface="Arial" panose="020B0604020202020204" pitchFamily="34" charset="0"/>
-                <a:cs typeface="Arial" panose="020B0604020202020204" pitchFamily="34" charset="0"/>
-              </a:rPr>
-              <a:t>RMSE: 14.646 </a:t>
-            </a:r>
-          </a:p>
-          <a:p>
-            <a:pPr algn="just"/>
-            <a:endParaRPr lang="en-US" sz="2400" dirty="0">
-              <a:latin typeface="Arial" panose="020B0604020202020204" pitchFamily="34" charset="0"/>
-              <a:cs typeface="Arial" panose="020B0604020202020204" pitchFamily="34" charset="0"/>
-            </a:endParaRPr>
-          </a:p>
-          <a:p>
-            <a:pPr algn="just"/>
-            <a:endParaRPr lang="en-US" sz="2400" dirty="0">
-              <a:latin typeface="Arial" panose="020B0604020202020204" pitchFamily="34" charset="0"/>
-              <a:cs typeface="Arial" panose="020B0604020202020204" pitchFamily="34" charset="0"/>
-            </a:endParaRPr>
-          </a:p>
-          <a:p>
-            <a:pPr algn="just"/>
-            <a:r>
-              <a:rPr lang="en-US" sz="2400" dirty="0">
-                <a:latin typeface="Arial" panose="020B0604020202020204" pitchFamily="34" charset="0"/>
-                <a:cs typeface="Arial" panose="020B0604020202020204" pitchFamily="34" charset="0"/>
-              </a:rPr>
-              <a:t>We proceed to prune the decision tree, in hopes of improving the model quality.</a:t>
-            </a:r>
-          </a:p>
-        </p:txBody>
-      </p:sp>
+      <mc:AlternateContent xmlns:mc="http://schemas.openxmlformats.org/markup-compatibility/2006">
+        <mc:Choice xmlns:a14="http://schemas.microsoft.com/office/drawing/2010/main" Requires="a14">
+          <p:sp>
+            <p:nvSpPr>
+              <p:cNvPr id="6" name="CasellaDiTesto 5">
+                <a:extLst>
+                  <a:ext uri="{FF2B5EF4-FFF2-40B4-BE49-F238E27FC236}">
+                    <a16:creationId xmlns:a16="http://schemas.microsoft.com/office/drawing/2014/main" id="{8262EFCC-9525-1C4B-0A37-D010B1D4AEB2}"/>
+                  </a:ext>
+                </a:extLst>
+              </p:cNvPr>
+              <p:cNvSpPr txBox="1"/>
+              <p:nvPr/>
+            </p:nvSpPr>
+            <p:spPr>
+              <a:xfrm>
+                <a:off x="6019800" y="1641627"/>
+                <a:ext cx="5257800" cy="4154984"/>
+              </a:xfrm>
+              <a:prstGeom prst="rect">
+                <a:avLst/>
+              </a:prstGeom>
+              <a:noFill/>
+            </p:spPr>
+            <p:txBody>
+              <a:bodyPr wrap="square">
+                <a:spAutoFit/>
+              </a:bodyPr>
+              <a:lstStyle/>
+              <a:p>
+                <a:pPr algn="just"/>
+                <a:r>
+                  <a:rPr lang="en-GB" sz="2400" noProof="0" dirty="0">
+                    <a:latin typeface="Arial" panose="020B0604020202020204" pitchFamily="34" charset="0"/>
+                    <a:cs typeface="Arial" panose="020B0604020202020204" pitchFamily="34" charset="0"/>
+                  </a:rPr>
+                  <a:t>First attempt is way too complex, and the resulting model is poor.</a:t>
+                </a:r>
+              </a:p>
+              <a:p>
+                <a:pPr algn="just"/>
+                <a:endParaRPr lang="en-GB" sz="2400" noProof="0" dirty="0">
+                  <a:latin typeface="Arial" panose="020B0604020202020204" pitchFamily="34" charset="0"/>
+                  <a:cs typeface="Arial" panose="020B0604020202020204" pitchFamily="34" charset="0"/>
+                </a:endParaRPr>
+              </a:p>
+              <a:p>
+                <a:pPr algn="just" rtl="0"/>
+                <a14:m>
+                  <m:oMath xmlns:m="http://schemas.openxmlformats.org/officeDocument/2006/math">
+                    <m:sSup>
+                      <m:sSupPr>
+                        <m:ctrlPr>
+                          <a:rPr lang="en-GB" sz="2400" b="0" i="1" noProof="0" smtClean="0">
+                            <a:effectLst/>
+                            <a:latin typeface="Cambria Math" panose="02040503050406030204" pitchFamily="18" charset="0"/>
+                            <a:cs typeface="Arial" panose="020B0604020202020204" pitchFamily="34" charset="0"/>
+                          </a:rPr>
+                        </m:ctrlPr>
+                      </m:sSupPr>
+                      <m:e>
+                        <m:r>
+                          <a:rPr lang="en-GB" sz="2400" b="0" i="1" noProof="0" smtClean="0">
+                            <a:effectLst/>
+                            <a:latin typeface="Cambria Math" panose="02040503050406030204" pitchFamily="18" charset="0"/>
+                            <a:cs typeface="Arial" panose="020B0604020202020204" pitchFamily="34" charset="0"/>
+                          </a:rPr>
+                          <m:t>𝑅</m:t>
+                        </m:r>
+                      </m:e>
+                      <m:sup>
+                        <m:r>
+                          <a:rPr lang="en-GB" sz="2400" b="0" i="1" noProof="0" smtClean="0">
+                            <a:effectLst/>
+                            <a:latin typeface="Cambria Math" panose="02040503050406030204" pitchFamily="18" charset="0"/>
+                            <a:cs typeface="Arial" panose="020B0604020202020204" pitchFamily="34" charset="0"/>
+                          </a:rPr>
+                          <m:t>2</m:t>
+                        </m:r>
+                      </m:sup>
+                    </m:sSup>
+                  </m:oMath>
+                </a14:m>
+                <a:r>
+                  <a:rPr lang="en-GB" sz="2400" noProof="0" dirty="0">
+                    <a:latin typeface="Arial" panose="020B0604020202020204" pitchFamily="34" charset="0"/>
+                    <a:cs typeface="Arial" panose="020B0604020202020204" pitchFamily="34" charset="0"/>
+                  </a:rPr>
+                  <a:t> </a:t>
+                </a:r>
+                <a:r>
+                  <a:rPr kumimoji="0" lang="en-GB" sz="2400" b="0" i="0" u="none" strike="noStrike" cap="none" normalizeH="0" baseline="0" noProof="0" dirty="0">
+                    <a:ln>
+                      <a:noFill/>
+                    </a:ln>
+                    <a:solidFill>
+                      <a:schemeClr val="tx1"/>
+                    </a:solidFill>
+                    <a:effectLst/>
+                    <a:latin typeface="Arial" panose="020B0604020202020204" pitchFamily="34" charset="0"/>
+                    <a:cs typeface="Arial" panose="020B0604020202020204" pitchFamily="34" charset="0"/>
+                  </a:rPr>
+                  <a:t>: 0.518 </a:t>
+                </a:r>
+              </a:p>
+              <a:p>
+                <a:pPr algn="just" rtl="0"/>
+                <a:r>
+                  <a:rPr kumimoji="0" lang="en-GB" sz="2400" b="0" i="0" u="none" strike="noStrike" cap="none" normalizeH="0" baseline="0" noProof="0" dirty="0">
+                    <a:ln>
+                      <a:noFill/>
+                    </a:ln>
+                    <a:solidFill>
+                      <a:schemeClr val="tx1"/>
+                    </a:solidFill>
+                    <a:effectLst/>
+                    <a:latin typeface="Arial" panose="020B0604020202020204" pitchFamily="34" charset="0"/>
+                    <a:cs typeface="Arial" panose="020B0604020202020204" pitchFamily="34" charset="0"/>
+                  </a:rPr>
+                  <a:t>MSE: 214.495 </a:t>
+                </a:r>
+              </a:p>
+              <a:p>
+                <a:pPr algn="just" rtl="0"/>
+                <a:r>
+                  <a:rPr kumimoji="0" lang="en-GB" sz="2400" b="0" i="0" u="none" strike="noStrike" cap="none" normalizeH="0" baseline="0" noProof="0" dirty="0">
+                    <a:ln>
+                      <a:noFill/>
+                    </a:ln>
+                    <a:solidFill>
+                      <a:schemeClr val="tx1"/>
+                    </a:solidFill>
+                    <a:effectLst/>
+                    <a:latin typeface="Arial" panose="020B0604020202020204" pitchFamily="34" charset="0"/>
+                    <a:cs typeface="Arial" panose="020B0604020202020204" pitchFamily="34" charset="0"/>
+                  </a:rPr>
+                  <a:t>RMSE: 14.646 </a:t>
+                </a:r>
+              </a:p>
+              <a:p>
+                <a:pPr algn="just"/>
+                <a:endParaRPr lang="en-GB" sz="2400" noProof="0" dirty="0">
+                  <a:latin typeface="Arial" panose="020B0604020202020204" pitchFamily="34" charset="0"/>
+                  <a:cs typeface="Arial" panose="020B0604020202020204" pitchFamily="34" charset="0"/>
+                </a:endParaRPr>
+              </a:p>
+              <a:p>
+                <a:pPr algn="just"/>
+                <a:endParaRPr lang="en-GB" sz="2400" noProof="0" dirty="0">
+                  <a:latin typeface="Arial" panose="020B0604020202020204" pitchFamily="34" charset="0"/>
+                  <a:cs typeface="Arial" panose="020B0604020202020204" pitchFamily="34" charset="0"/>
+                </a:endParaRPr>
+              </a:p>
+              <a:p>
+                <a:pPr algn="just"/>
+                <a:r>
+                  <a:rPr lang="en-GB" sz="2400" noProof="0" dirty="0">
+                    <a:latin typeface="Arial" panose="020B0604020202020204" pitchFamily="34" charset="0"/>
+                    <a:cs typeface="Arial" panose="020B0604020202020204" pitchFamily="34" charset="0"/>
+                  </a:rPr>
+                  <a:t>We proceed to prune the regression tree, in hopes of improving the model quality.</a:t>
+                </a:r>
+              </a:p>
+            </p:txBody>
+          </p:sp>
+        </mc:Choice>
+        <mc:Fallback>
+          <p:sp>
+            <p:nvSpPr>
+              <p:cNvPr id="6" name="CasellaDiTesto 5">
+                <a:extLst>
+                  <a:ext uri="{FF2B5EF4-FFF2-40B4-BE49-F238E27FC236}">
+                    <a16:creationId xmlns:a16="http://schemas.microsoft.com/office/drawing/2014/main" id="{8262EFCC-9525-1C4B-0A37-D010B1D4AEB2}"/>
+                  </a:ext>
+                </a:extLst>
+              </p:cNvPr>
+              <p:cNvSpPr txBox="1">
+                <a:spLocks noRot="1" noChangeAspect="1" noMove="1" noResize="1" noEditPoints="1" noAdjustHandles="1" noChangeArrowheads="1" noChangeShapeType="1" noTextEdit="1"/>
+              </p:cNvSpPr>
+              <p:nvPr/>
+            </p:nvSpPr>
+            <p:spPr>
+              <a:xfrm>
+                <a:off x="6019800" y="1641627"/>
+                <a:ext cx="5257800" cy="4154984"/>
+              </a:xfrm>
+              <a:prstGeom prst="rect">
+                <a:avLst/>
+              </a:prstGeom>
+              <a:blipFill>
+                <a:blip r:embed="rId3"/>
+                <a:stretch>
+                  <a:fillRect l="-1856" t="-1026" r="-1740" b="-2493"/>
+                </a:stretch>
+              </a:blipFill>
+            </p:spPr>
+            <p:txBody>
+              <a:bodyPr/>
+              <a:lstStyle/>
+              <a:p>
+                <a:r>
+                  <a:rPr lang="it-IT">
+                    <a:noFill/>
+                  </a:rPr>
+                  <a:t> </a:t>
+                </a:r>
+              </a:p>
+            </p:txBody>
+          </p:sp>
+        </mc:Fallback>
+      </mc:AlternateContent>
       <p:sp>
         <p:nvSpPr>
           <p:cNvPr id="7" name="Rectangle 1">
@@ -7974,7 +7921,7 @@
               <a:buNone/>
               <a:tabLst/>
             </a:pPr>
-            <a:endParaRPr kumimoji="0" lang="it-IT" altLang="it-IT" sz="1800" b="0" i="0" u="none" strike="noStrike" cap="none" normalizeH="0" baseline="0" dirty="0">
+            <a:endParaRPr kumimoji="0" lang="en-GB" sz="1800" b="0" i="0" u="none" strike="noStrike" cap="none" normalizeH="0" baseline="0" noProof="0" dirty="0">
               <a:ln>
                 <a:noFill/>
               </a:ln>
@@ -7991,6 +7938,1752 @@
     <p:extLst>
       <p:ext uri="{BB962C8B-B14F-4D97-AF65-F5344CB8AC3E}">
         <p14:creationId xmlns:p14="http://schemas.microsoft.com/office/powerpoint/2010/main" val="64091549"/>
+      </p:ext>
+    </p:extLst>
+  </p:cSld>
+  <p:clrMapOvr>
+    <a:masterClrMapping/>
+  </p:clrMapOvr>
+</p:sld>
+</file>
+
+<file path=ppt/slides/slide35.xml><?xml version="1.0" encoding="utf-8"?>
+<p:sld xmlns:a="http://schemas.openxmlformats.org/drawingml/2006/main" xmlns:r="http://schemas.openxmlformats.org/officeDocument/2006/relationships" xmlns:p="http://schemas.openxmlformats.org/presentationml/2006/main">
+  <p:cSld>
+    <p:spTree>
+      <p:nvGrpSpPr>
+        <p:cNvPr id="1" name="">
+          <a:extLst>
+            <a:ext uri="{FF2B5EF4-FFF2-40B4-BE49-F238E27FC236}">
+              <a16:creationId xmlns:a16="http://schemas.microsoft.com/office/drawing/2014/main" id="{FD4BB3E2-5D9A-C152-CEA6-F8479CB5E15C}"/>
+            </a:ext>
+          </a:extLst>
+        </p:cNvPr>
+        <p:cNvGrpSpPr/>
+        <p:nvPr/>
+      </p:nvGrpSpPr>
+      <p:grpSpPr>
+        <a:xfrm>
+          <a:off x="0" y="0"/>
+          <a:ext cx="0" cy="0"/>
+          <a:chOff x="0" y="0"/>
+          <a:chExt cx="0" cy="0"/>
+        </a:xfrm>
+      </p:grpSpPr>
+      <p:sp>
+        <p:nvSpPr>
+          <p:cNvPr id="10" name="Titolo 9">
+            <a:extLst>
+              <a:ext uri="{FF2B5EF4-FFF2-40B4-BE49-F238E27FC236}">
+                <a16:creationId xmlns:a16="http://schemas.microsoft.com/office/drawing/2014/main" id="{FA4D004A-15F3-3F77-14C3-C637A7D5CC53}"/>
+              </a:ext>
+            </a:extLst>
+          </p:cNvPr>
+          <p:cNvSpPr>
+            <a:spLocks noGrp="1"/>
+          </p:cNvSpPr>
+          <p:nvPr>
+            <p:ph type="title"/>
+          </p:nvPr>
+        </p:nvSpPr>
+        <p:spPr>
+          <a:xfrm>
+            <a:off x="762000" y="457201"/>
+            <a:ext cx="10515600" cy="538609"/>
+          </a:xfrm>
+        </p:spPr>
+        <p:txBody>
+          <a:bodyPr/>
+          <a:lstStyle/>
+          <a:p>
+            <a:r>
+              <a:rPr lang="en-GB" noProof="0" dirty="0">
+                <a:latin typeface="Arial Black" panose="020B0A04020102020204" pitchFamily="34" charset="0"/>
+              </a:rPr>
+              <a:t>Regression tree – best depth</a:t>
+            </a:r>
+          </a:p>
+        </p:txBody>
+      </p:sp>
+      <mc:AlternateContent xmlns:mc="http://schemas.openxmlformats.org/markup-compatibility/2006">
+        <mc:Choice xmlns:a14="http://schemas.microsoft.com/office/drawing/2010/main" Requires="a14">
+          <p:sp>
+            <p:nvSpPr>
+              <p:cNvPr id="6" name="CasellaDiTesto 5">
+                <a:extLst>
+                  <a:ext uri="{FF2B5EF4-FFF2-40B4-BE49-F238E27FC236}">
+                    <a16:creationId xmlns:a16="http://schemas.microsoft.com/office/drawing/2014/main" id="{2E3AC863-56BB-863D-240E-9DE688E6C5D5}"/>
+                  </a:ext>
+                </a:extLst>
+              </p:cNvPr>
+              <p:cNvSpPr txBox="1"/>
+              <p:nvPr/>
+            </p:nvSpPr>
+            <p:spPr>
+              <a:xfrm>
+                <a:off x="7239000" y="1641626"/>
+                <a:ext cx="4038600" cy="1938992"/>
+              </a:xfrm>
+              <a:prstGeom prst="rect">
+                <a:avLst/>
+              </a:prstGeom>
+              <a:noFill/>
+            </p:spPr>
+            <p:txBody>
+              <a:bodyPr wrap="square">
+                <a:spAutoFit/>
+              </a:bodyPr>
+              <a:lstStyle/>
+              <a:p>
+                <a:pPr marL="0" indent="0" algn="just">
+                  <a:buNone/>
+                </a:pPr>
+                <a:r>
+                  <a:rPr lang="en-GB" sz="2400" noProof="0" dirty="0">
+                    <a:latin typeface="Arial" panose="020B0604020202020204" pitchFamily="34" charset="0"/>
+                    <a:cs typeface="Arial" panose="020B0604020202020204" pitchFamily="34" charset="0"/>
+                  </a:rPr>
+                  <a:t>The optimal depth seems to be 3, as this is where </a:t>
+                </a:r>
+                <a14:m>
+                  <m:oMath xmlns:m="http://schemas.openxmlformats.org/officeDocument/2006/math">
+                    <m:sSup>
+                      <m:sSupPr>
+                        <m:ctrlPr>
+                          <a:rPr lang="en-GB" sz="2400" b="0" i="1" noProof="0" smtClean="0">
+                            <a:effectLst/>
+                            <a:latin typeface="Cambria Math" panose="02040503050406030204" pitchFamily="18" charset="0"/>
+                            <a:cs typeface="Arial" panose="020B0604020202020204" pitchFamily="34" charset="0"/>
+                          </a:rPr>
+                        </m:ctrlPr>
+                      </m:sSupPr>
+                      <m:e>
+                        <m:r>
+                          <a:rPr lang="en-GB" sz="2400" b="0" i="1" noProof="0" smtClean="0">
+                            <a:effectLst/>
+                            <a:latin typeface="Cambria Math" panose="02040503050406030204" pitchFamily="18" charset="0"/>
+                            <a:cs typeface="Arial" panose="020B0604020202020204" pitchFamily="34" charset="0"/>
+                          </a:rPr>
+                          <m:t>𝑅</m:t>
+                        </m:r>
+                      </m:e>
+                      <m:sup>
+                        <m:r>
+                          <a:rPr lang="en-GB" sz="2400" b="0" i="1" noProof="0" smtClean="0">
+                            <a:effectLst/>
+                            <a:latin typeface="Cambria Math" panose="02040503050406030204" pitchFamily="18" charset="0"/>
+                            <a:cs typeface="Arial" panose="020B0604020202020204" pitchFamily="34" charset="0"/>
+                          </a:rPr>
+                          <m:t>2</m:t>
+                        </m:r>
+                      </m:sup>
+                    </m:sSup>
+                  </m:oMath>
+                </a14:m>
+                <a:r>
+                  <a:rPr lang="en-GB" sz="2400" noProof="0" dirty="0">
+                    <a:latin typeface="Arial" panose="020B0604020202020204" pitchFamily="34" charset="0"/>
+                    <a:cs typeface="Arial" panose="020B0604020202020204" pitchFamily="34" charset="0"/>
+                  </a:rPr>
+                  <a:t> is maximum.</a:t>
+                </a:r>
+              </a:p>
+              <a:p>
+                <a:pPr marL="0" indent="0" algn="just">
+                  <a:buNone/>
+                </a:pPr>
+                <a:endParaRPr lang="en-GB" sz="2400" noProof="0" dirty="0">
+                  <a:latin typeface="Arial" panose="020B0604020202020204" pitchFamily="34" charset="0"/>
+                  <a:cs typeface="Arial" panose="020B0604020202020204" pitchFamily="34" charset="0"/>
+                </a:endParaRPr>
+              </a:p>
+              <a:p>
+                <a:pPr marL="0" indent="0" algn="just">
+                  <a:buNone/>
+                </a:pPr>
+                <a:r>
+                  <a:rPr lang="en-GB" sz="2400" noProof="0" dirty="0">
+                    <a:latin typeface="Arial" panose="020B0604020202020204" pitchFamily="34" charset="0"/>
+                    <a:cs typeface="Arial" panose="020B0604020202020204" pitchFamily="34" charset="0"/>
+                  </a:rPr>
+                  <a:t>We can now prune the tree.</a:t>
+                </a:r>
+              </a:p>
+            </p:txBody>
+          </p:sp>
+        </mc:Choice>
+        <mc:Fallback>
+          <p:sp>
+            <p:nvSpPr>
+              <p:cNvPr id="6" name="CasellaDiTesto 5">
+                <a:extLst>
+                  <a:ext uri="{FF2B5EF4-FFF2-40B4-BE49-F238E27FC236}">
+                    <a16:creationId xmlns:a16="http://schemas.microsoft.com/office/drawing/2014/main" id="{2E3AC863-56BB-863D-240E-9DE688E6C5D5}"/>
+                  </a:ext>
+                </a:extLst>
+              </p:cNvPr>
+              <p:cNvSpPr txBox="1">
+                <a:spLocks noRot="1" noChangeAspect="1" noMove="1" noResize="1" noEditPoints="1" noAdjustHandles="1" noChangeArrowheads="1" noChangeShapeType="1" noTextEdit="1"/>
+              </p:cNvSpPr>
+              <p:nvPr/>
+            </p:nvSpPr>
+            <p:spPr>
+              <a:xfrm>
+                <a:off x="7239000" y="1641626"/>
+                <a:ext cx="4038600" cy="1938992"/>
+              </a:xfrm>
+              <a:prstGeom prst="rect">
+                <a:avLst/>
+              </a:prstGeom>
+              <a:blipFill>
+                <a:blip r:embed="rId2"/>
+                <a:stretch>
+                  <a:fillRect l="-2417" t="-2201" r="-2266" b="-6604"/>
+                </a:stretch>
+              </a:blipFill>
+            </p:spPr>
+            <p:txBody>
+              <a:bodyPr/>
+              <a:lstStyle/>
+              <a:p>
+                <a:r>
+                  <a:rPr lang="it-IT">
+                    <a:noFill/>
+                  </a:rPr>
+                  <a:t> </a:t>
+                </a:r>
+              </a:p>
+            </p:txBody>
+          </p:sp>
+        </mc:Fallback>
+      </mc:AlternateContent>
+      <p:sp>
+        <p:nvSpPr>
+          <p:cNvPr id="7" name="Rectangle 1">
+            <a:extLst>
+              <a:ext uri="{FF2B5EF4-FFF2-40B4-BE49-F238E27FC236}">
+                <a16:creationId xmlns:a16="http://schemas.microsoft.com/office/drawing/2014/main" id="{6D58CA8F-4D5A-21B5-3A1E-BB82E7A23EC3}"/>
+              </a:ext>
+            </a:extLst>
+          </p:cNvPr>
+          <p:cNvSpPr>
+            <a:spLocks noChangeArrowheads="1"/>
+          </p:cNvSpPr>
+          <p:nvPr/>
+        </p:nvSpPr>
+        <p:spPr bwMode="auto">
+          <a:xfrm>
+            <a:off x="0" y="90100"/>
+            <a:ext cx="65" cy="276999"/>
+          </a:xfrm>
+          <a:prstGeom prst="rect">
+            <a:avLst/>
+          </a:prstGeom>
+          <a:solidFill>
+            <a:srgbClr val="FFFFFF"/>
+          </a:solidFill>
+          <a:ln>
+            <a:noFill/>
+          </a:ln>
+          <a:effectLst/>
+          <a:extLst>
+            <a:ext uri="{91240B29-F687-4F45-9708-019B960494DF}">
+              <a14:hiddenLine xmlns:a14="http://schemas.microsoft.com/office/drawing/2010/main" w="9525">
+                <a:solidFill>
+                  <a:schemeClr val="tx1"/>
+                </a:solidFill>
+                <a:miter lim="800000"/>
+                <a:headEnd/>
+                <a:tailEnd/>
+              </a14:hiddenLine>
+            </a:ext>
+            <a:ext uri="{AF507438-7753-43E0-B8FC-AC1667EBCBE1}">
+              <a14:hiddenEffects xmlns:a14="http://schemas.microsoft.com/office/drawing/2010/main">
+                <a:effectLst>
+                  <a:outerShdw dist="35921" dir="2700000" algn="ctr" rotWithShape="0">
+                    <a:schemeClr val="bg2"/>
+                  </a:outerShdw>
+                </a:effectLst>
+              </a14:hiddenEffects>
+            </a:ext>
+          </a:extLst>
+        </p:spPr>
+        <p:txBody>
+          <a:bodyPr vert="horz" wrap="none" lIns="0" tIns="0" rIns="0" bIns="0" numCol="1" anchor="ctr" anchorCtr="0" compatLnSpc="1">
+            <a:prstTxWarp prst="textNoShape">
+              <a:avLst/>
+            </a:prstTxWarp>
+            <a:spAutoFit/>
+          </a:bodyPr>
+          <a:lstStyle/>
+          <a:p>
+            <a:pPr marL="0" marR="0" lvl="0" indent="0" algn="l" defTabSz="914400" rtl="0" eaLnBrk="0" fontAlgn="base" latinLnBrk="0" hangingPunct="0">
+              <a:lnSpc>
+                <a:spcPct val="100000"/>
+              </a:lnSpc>
+              <a:spcBef>
+                <a:spcPct val="0"/>
+              </a:spcBef>
+              <a:spcAft>
+                <a:spcPct val="0"/>
+              </a:spcAft>
+              <a:buClrTx/>
+              <a:buSzTx/>
+              <a:buFontTx/>
+              <a:buNone/>
+              <a:tabLst/>
+            </a:pPr>
+            <a:endParaRPr kumimoji="0" lang="en-GB" sz="1800" b="0" i="0" u="none" strike="noStrike" cap="none" normalizeH="0" baseline="0" noProof="0" dirty="0">
+              <a:ln>
+                <a:noFill/>
+              </a:ln>
+              <a:solidFill>
+                <a:schemeClr val="tx1"/>
+              </a:solidFill>
+              <a:effectLst/>
+              <a:latin typeface="Arial" panose="020B0604020202020204" pitchFamily="34" charset="0"/>
+            </a:endParaRPr>
+          </a:p>
+        </p:txBody>
+      </p:sp>
+      <p:pic>
+        <p:nvPicPr>
+          <p:cNvPr id="3" name="Immagine 2">
+            <a:extLst>
+              <a:ext uri="{FF2B5EF4-FFF2-40B4-BE49-F238E27FC236}">
+                <a16:creationId xmlns:a16="http://schemas.microsoft.com/office/drawing/2014/main" id="{79A85906-A5BF-3DE4-1369-F70517928D81}"/>
+              </a:ext>
+            </a:extLst>
+          </p:cNvPr>
+          <p:cNvPicPr>
+            <a:picLocks noChangeAspect="1"/>
+          </p:cNvPicPr>
+          <p:nvPr/>
+        </p:nvPicPr>
+        <p:blipFill>
+          <a:blip r:embed="rId3">
+            <a:extLst>
+              <a:ext uri="{28A0092B-C50C-407E-A947-70E740481C1C}">
+                <a14:useLocalDpi xmlns:a14="http://schemas.microsoft.com/office/drawing/2010/main" val="0"/>
+              </a:ext>
+            </a:extLst>
+          </a:blip>
+          <a:stretch>
+            <a:fillRect/>
+          </a:stretch>
+        </p:blipFill>
+        <p:spPr>
+          <a:xfrm>
+            <a:off x="762000" y="1363966"/>
+            <a:ext cx="6102816" cy="3835474"/>
+          </a:xfrm>
+          <a:prstGeom prst="rect">
+            <a:avLst/>
+          </a:prstGeom>
+        </p:spPr>
+      </p:pic>
+    </p:spTree>
+    <p:extLst>
+      <p:ext uri="{BB962C8B-B14F-4D97-AF65-F5344CB8AC3E}">
+        <p14:creationId xmlns:p14="http://schemas.microsoft.com/office/powerpoint/2010/main" val="358865010"/>
+      </p:ext>
+    </p:extLst>
+  </p:cSld>
+  <p:clrMapOvr>
+    <a:masterClrMapping/>
+  </p:clrMapOvr>
+</p:sld>
+</file>
+
+<file path=ppt/slides/slide36.xml><?xml version="1.0" encoding="utf-8"?>
+<p:sld xmlns:a="http://schemas.openxmlformats.org/drawingml/2006/main" xmlns:r="http://schemas.openxmlformats.org/officeDocument/2006/relationships" xmlns:p="http://schemas.openxmlformats.org/presentationml/2006/main">
+  <p:cSld>
+    <p:spTree>
+      <p:nvGrpSpPr>
+        <p:cNvPr id="1" name="">
+          <a:extLst>
+            <a:ext uri="{FF2B5EF4-FFF2-40B4-BE49-F238E27FC236}">
+              <a16:creationId xmlns:a16="http://schemas.microsoft.com/office/drawing/2014/main" id="{E9056DC1-AEEF-B1EB-31B7-713EFDE642FF}"/>
+            </a:ext>
+          </a:extLst>
+        </p:cNvPr>
+        <p:cNvGrpSpPr/>
+        <p:nvPr/>
+      </p:nvGrpSpPr>
+      <p:grpSpPr>
+        <a:xfrm>
+          <a:off x="0" y="0"/>
+          <a:ext cx="0" cy="0"/>
+          <a:chOff x="0" y="0"/>
+          <a:chExt cx="0" cy="0"/>
+        </a:xfrm>
+      </p:grpSpPr>
+      <p:sp>
+        <p:nvSpPr>
+          <p:cNvPr id="10" name="Titolo 9">
+            <a:extLst>
+              <a:ext uri="{FF2B5EF4-FFF2-40B4-BE49-F238E27FC236}">
+                <a16:creationId xmlns:a16="http://schemas.microsoft.com/office/drawing/2014/main" id="{35BBEE39-0E9B-75F3-F1D5-CDBFD006B0DB}"/>
+              </a:ext>
+            </a:extLst>
+          </p:cNvPr>
+          <p:cNvSpPr>
+            <a:spLocks noGrp="1"/>
+          </p:cNvSpPr>
+          <p:nvPr>
+            <p:ph type="title"/>
+          </p:nvPr>
+        </p:nvSpPr>
+        <p:spPr>
+          <a:xfrm>
+            <a:off x="762000" y="457201"/>
+            <a:ext cx="10515600" cy="538609"/>
+          </a:xfrm>
+        </p:spPr>
+        <p:txBody>
+          <a:bodyPr/>
+          <a:lstStyle/>
+          <a:p>
+            <a:r>
+              <a:rPr lang="en-GB" noProof="0" dirty="0">
+                <a:latin typeface="Arial Black" panose="020B0A04020102020204" pitchFamily="34" charset="0"/>
+              </a:rPr>
+              <a:t>Regression tree – pruned tree</a:t>
+            </a:r>
+          </a:p>
+        </p:txBody>
+      </p:sp>
+      <p:sp>
+        <p:nvSpPr>
+          <p:cNvPr id="7" name="Rectangle 1">
+            <a:extLst>
+              <a:ext uri="{FF2B5EF4-FFF2-40B4-BE49-F238E27FC236}">
+                <a16:creationId xmlns:a16="http://schemas.microsoft.com/office/drawing/2014/main" id="{9EF7B933-DC02-472B-B92D-463079D0E33E}"/>
+              </a:ext>
+            </a:extLst>
+          </p:cNvPr>
+          <p:cNvSpPr>
+            <a:spLocks noChangeArrowheads="1"/>
+          </p:cNvSpPr>
+          <p:nvPr/>
+        </p:nvSpPr>
+        <p:spPr bwMode="auto">
+          <a:xfrm>
+            <a:off x="0" y="90100"/>
+            <a:ext cx="65" cy="276999"/>
+          </a:xfrm>
+          <a:prstGeom prst="rect">
+            <a:avLst/>
+          </a:prstGeom>
+          <a:solidFill>
+            <a:srgbClr val="FFFFFF"/>
+          </a:solidFill>
+          <a:ln>
+            <a:noFill/>
+          </a:ln>
+          <a:effectLst/>
+          <a:extLst>
+            <a:ext uri="{91240B29-F687-4F45-9708-019B960494DF}">
+              <a14:hiddenLine xmlns:a14="http://schemas.microsoft.com/office/drawing/2010/main" w="9525">
+                <a:solidFill>
+                  <a:schemeClr val="tx1"/>
+                </a:solidFill>
+                <a:miter lim="800000"/>
+                <a:headEnd/>
+                <a:tailEnd/>
+              </a14:hiddenLine>
+            </a:ext>
+            <a:ext uri="{AF507438-7753-43E0-B8FC-AC1667EBCBE1}">
+              <a14:hiddenEffects xmlns:a14="http://schemas.microsoft.com/office/drawing/2010/main">
+                <a:effectLst>
+                  <a:outerShdw dist="35921" dir="2700000" algn="ctr" rotWithShape="0">
+                    <a:schemeClr val="bg2"/>
+                  </a:outerShdw>
+                </a:effectLst>
+              </a14:hiddenEffects>
+            </a:ext>
+          </a:extLst>
+        </p:spPr>
+        <p:txBody>
+          <a:bodyPr vert="horz" wrap="none" lIns="0" tIns="0" rIns="0" bIns="0" numCol="1" anchor="ctr" anchorCtr="0" compatLnSpc="1">
+            <a:prstTxWarp prst="textNoShape">
+              <a:avLst/>
+            </a:prstTxWarp>
+            <a:spAutoFit/>
+          </a:bodyPr>
+          <a:lstStyle/>
+          <a:p>
+            <a:pPr marL="0" marR="0" lvl="0" indent="0" algn="l" defTabSz="914400" rtl="0" eaLnBrk="0" fontAlgn="base" latinLnBrk="0" hangingPunct="0">
+              <a:lnSpc>
+                <a:spcPct val="100000"/>
+              </a:lnSpc>
+              <a:spcBef>
+                <a:spcPct val="0"/>
+              </a:spcBef>
+              <a:spcAft>
+                <a:spcPct val="0"/>
+              </a:spcAft>
+              <a:buClrTx/>
+              <a:buSzTx/>
+              <a:buFontTx/>
+              <a:buNone/>
+              <a:tabLst/>
+            </a:pPr>
+            <a:endParaRPr kumimoji="0" lang="en-GB" sz="1800" b="0" i="0" u="none" strike="noStrike" cap="none" normalizeH="0" baseline="0" noProof="0" dirty="0">
+              <a:ln>
+                <a:noFill/>
+              </a:ln>
+              <a:solidFill>
+                <a:schemeClr val="tx1"/>
+              </a:solidFill>
+              <a:effectLst/>
+              <a:latin typeface="Arial" panose="020B0604020202020204" pitchFamily="34" charset="0"/>
+            </a:endParaRPr>
+          </a:p>
+        </p:txBody>
+      </p:sp>
+      <p:pic>
+        <p:nvPicPr>
+          <p:cNvPr id="4" name="Immagine 3">
+            <a:extLst>
+              <a:ext uri="{FF2B5EF4-FFF2-40B4-BE49-F238E27FC236}">
+                <a16:creationId xmlns:a16="http://schemas.microsoft.com/office/drawing/2014/main" id="{41AD3086-582F-F847-1FE6-025BC0501013}"/>
+              </a:ext>
+            </a:extLst>
+          </p:cNvPr>
+          <p:cNvPicPr>
+            <a:picLocks noChangeAspect="1"/>
+          </p:cNvPicPr>
+          <p:nvPr/>
+        </p:nvPicPr>
+        <p:blipFill>
+          <a:blip r:embed="rId2">
+            <a:extLst>
+              <a:ext uri="{28A0092B-C50C-407E-A947-70E740481C1C}">
+                <a14:useLocalDpi xmlns:a14="http://schemas.microsoft.com/office/drawing/2010/main" val="0"/>
+              </a:ext>
+            </a:extLst>
+          </a:blip>
+          <a:stretch>
+            <a:fillRect/>
+          </a:stretch>
+        </p:blipFill>
+        <p:spPr>
+          <a:xfrm>
+            <a:off x="533400" y="1295400"/>
+            <a:ext cx="10820400" cy="3783680"/>
+          </a:xfrm>
+          <a:prstGeom prst="rect">
+            <a:avLst/>
+          </a:prstGeom>
+        </p:spPr>
+      </p:pic>
+      <mc:AlternateContent xmlns:mc="http://schemas.openxmlformats.org/markup-compatibility/2006">
+        <mc:Choice xmlns:a14="http://schemas.microsoft.com/office/drawing/2010/main" Requires="a14">
+          <p:sp>
+            <p:nvSpPr>
+              <p:cNvPr id="5" name="CasellaDiTesto 4">
+                <a:extLst>
+                  <a:ext uri="{FF2B5EF4-FFF2-40B4-BE49-F238E27FC236}">
+                    <a16:creationId xmlns:a16="http://schemas.microsoft.com/office/drawing/2014/main" id="{0F563577-BF8A-ECC7-48E1-2D36D21671B8}"/>
+                  </a:ext>
+                </a:extLst>
+              </p:cNvPr>
+              <p:cNvSpPr txBox="1"/>
+              <p:nvPr/>
+            </p:nvSpPr>
+            <p:spPr>
+              <a:xfrm>
+                <a:off x="762000" y="5257800"/>
+                <a:ext cx="10439400" cy="646331"/>
+              </a:xfrm>
+              <a:prstGeom prst="rect">
+                <a:avLst/>
+              </a:prstGeom>
+              <a:noFill/>
+            </p:spPr>
+            <p:txBody>
+              <a:bodyPr wrap="square" rtlCol="0">
+                <a:spAutoFit/>
+              </a:bodyPr>
+              <a:lstStyle/>
+              <a:p>
+                <a:pPr algn="just" rtl="0"/>
+                <a14:m>
+                  <m:oMath xmlns:m="http://schemas.openxmlformats.org/officeDocument/2006/math">
+                    <m:sSup>
+                      <m:sSupPr>
+                        <m:ctrlPr>
+                          <a:rPr lang="en-GB" sz="1800" b="0" i="1" noProof="0" smtClean="0">
+                            <a:effectLst/>
+                            <a:latin typeface="Cambria Math" panose="02040503050406030204" pitchFamily="18" charset="0"/>
+                            <a:cs typeface="Arial" panose="020B0604020202020204" pitchFamily="34" charset="0"/>
+                          </a:rPr>
+                        </m:ctrlPr>
+                      </m:sSupPr>
+                      <m:e>
+                        <m:r>
+                          <a:rPr lang="en-GB" sz="1800" b="0" i="1" noProof="0" smtClean="0">
+                            <a:effectLst/>
+                            <a:latin typeface="Cambria Math" panose="02040503050406030204" pitchFamily="18" charset="0"/>
+                            <a:cs typeface="Arial" panose="020B0604020202020204" pitchFamily="34" charset="0"/>
+                          </a:rPr>
+                          <m:t>𝑅</m:t>
+                        </m:r>
+                      </m:e>
+                      <m:sup>
+                        <m:r>
+                          <a:rPr lang="en-GB" sz="1800" b="0" i="1" noProof="0" smtClean="0">
+                            <a:effectLst/>
+                            <a:latin typeface="Cambria Math" panose="02040503050406030204" pitchFamily="18" charset="0"/>
+                            <a:cs typeface="Arial" panose="020B0604020202020204" pitchFamily="34" charset="0"/>
+                          </a:rPr>
+                          <m:t>2</m:t>
+                        </m:r>
+                      </m:sup>
+                    </m:sSup>
+                  </m:oMath>
+                </a14:m>
+                <a:r>
+                  <a:rPr lang="en-GB" sz="1800" noProof="0" dirty="0">
+                    <a:latin typeface="Arial" panose="020B0604020202020204" pitchFamily="34" charset="0"/>
+                    <a:cs typeface="Arial" panose="020B0604020202020204" pitchFamily="34" charset="0"/>
+                  </a:rPr>
+                  <a:t> </a:t>
+                </a:r>
+                <a:r>
+                  <a:rPr kumimoji="0" lang="en-GB" sz="1800" b="0" i="0" u="none" strike="noStrike" cap="none" normalizeH="0" baseline="0" noProof="0" dirty="0">
+                    <a:ln>
+                      <a:noFill/>
+                    </a:ln>
+                    <a:solidFill>
+                      <a:schemeClr val="tx1"/>
+                    </a:solidFill>
+                    <a:effectLst/>
+                    <a:latin typeface="Arial" panose="020B0604020202020204" pitchFamily="34" charset="0"/>
+                    <a:cs typeface="Arial" panose="020B0604020202020204" pitchFamily="34" charset="0"/>
+                  </a:rPr>
+                  <a:t>: 0.608				MSE: 174.627			RMSE: </a:t>
+                </a:r>
+                <a:r>
+                  <a:rPr lang="en-GB" noProof="0" dirty="0">
+                    <a:solidFill>
+                      <a:schemeClr val="tx1"/>
+                    </a:solidFill>
+                    <a:latin typeface="Arial" panose="020B0604020202020204" pitchFamily="34" charset="0"/>
+                    <a:cs typeface="Arial" panose="020B0604020202020204" pitchFamily="34" charset="0"/>
+                  </a:rPr>
+                  <a:t>13</a:t>
+                </a:r>
+                <a:r>
+                  <a:rPr kumimoji="0" lang="en-GB" sz="1800" b="0" i="0" u="none" strike="noStrike" cap="none" normalizeH="0" baseline="0" noProof="0" dirty="0">
+                    <a:ln>
+                      <a:noFill/>
+                    </a:ln>
+                    <a:solidFill>
+                      <a:schemeClr val="tx1"/>
+                    </a:solidFill>
+                    <a:effectLst/>
+                    <a:latin typeface="Arial" panose="020B0604020202020204" pitchFamily="34" charset="0"/>
+                    <a:cs typeface="Arial" panose="020B0604020202020204" pitchFamily="34" charset="0"/>
+                  </a:rPr>
+                  <a:t>.215 </a:t>
+                </a:r>
+              </a:p>
+              <a:p>
+                <a:endParaRPr lang="en-GB" noProof="0" dirty="0">
+                  <a:latin typeface="Arial" panose="020B0604020202020204" pitchFamily="34" charset="0"/>
+                  <a:cs typeface="Arial" panose="020B0604020202020204" pitchFamily="34" charset="0"/>
+                </a:endParaRPr>
+              </a:p>
+            </p:txBody>
+          </p:sp>
+        </mc:Choice>
+        <mc:Fallback>
+          <p:sp>
+            <p:nvSpPr>
+              <p:cNvPr id="5" name="CasellaDiTesto 4">
+                <a:extLst>
+                  <a:ext uri="{FF2B5EF4-FFF2-40B4-BE49-F238E27FC236}">
+                    <a16:creationId xmlns:a16="http://schemas.microsoft.com/office/drawing/2014/main" id="{0F563577-BF8A-ECC7-48E1-2D36D21671B8}"/>
+                  </a:ext>
+                </a:extLst>
+              </p:cNvPr>
+              <p:cNvSpPr txBox="1">
+                <a:spLocks noRot="1" noChangeAspect="1" noMove="1" noResize="1" noEditPoints="1" noAdjustHandles="1" noChangeArrowheads="1" noChangeShapeType="1" noTextEdit="1"/>
+              </p:cNvSpPr>
+              <p:nvPr/>
+            </p:nvSpPr>
+            <p:spPr>
+              <a:xfrm>
+                <a:off x="762000" y="5257800"/>
+                <a:ext cx="10439400" cy="646331"/>
+              </a:xfrm>
+              <a:prstGeom prst="rect">
+                <a:avLst/>
+              </a:prstGeom>
+              <a:blipFill>
+                <a:blip r:embed="rId3"/>
+                <a:stretch>
+                  <a:fillRect t="-5660"/>
+                </a:stretch>
+              </a:blipFill>
+            </p:spPr>
+            <p:txBody>
+              <a:bodyPr/>
+              <a:lstStyle/>
+              <a:p>
+                <a:r>
+                  <a:rPr lang="it-IT">
+                    <a:noFill/>
+                  </a:rPr>
+                  <a:t> </a:t>
+                </a:r>
+              </a:p>
+            </p:txBody>
+          </p:sp>
+        </mc:Fallback>
+      </mc:AlternateContent>
+    </p:spTree>
+    <p:extLst>
+      <p:ext uri="{BB962C8B-B14F-4D97-AF65-F5344CB8AC3E}">
+        <p14:creationId xmlns:p14="http://schemas.microsoft.com/office/powerpoint/2010/main" val="3994740528"/>
+      </p:ext>
+    </p:extLst>
+  </p:cSld>
+  <p:clrMapOvr>
+    <a:masterClrMapping/>
+  </p:clrMapOvr>
+</p:sld>
+</file>
+
+<file path=ppt/slides/slide37.xml><?xml version="1.0" encoding="utf-8"?>
+<p:sld xmlns:a="http://schemas.openxmlformats.org/drawingml/2006/main" xmlns:r="http://schemas.openxmlformats.org/officeDocument/2006/relationships" xmlns:p="http://schemas.openxmlformats.org/presentationml/2006/main">
+  <p:cSld>
+    <p:spTree>
+      <p:nvGrpSpPr>
+        <p:cNvPr id="1" name="">
+          <a:extLst>
+            <a:ext uri="{FF2B5EF4-FFF2-40B4-BE49-F238E27FC236}">
+              <a16:creationId xmlns:a16="http://schemas.microsoft.com/office/drawing/2014/main" id="{7DB7FE1B-7FB3-B436-1DEF-EF25E14BBE6B}"/>
+            </a:ext>
+          </a:extLst>
+        </p:cNvPr>
+        <p:cNvGrpSpPr/>
+        <p:nvPr/>
+      </p:nvGrpSpPr>
+      <p:grpSpPr>
+        <a:xfrm>
+          <a:off x="0" y="0"/>
+          <a:ext cx="0" cy="0"/>
+          <a:chOff x="0" y="0"/>
+          <a:chExt cx="0" cy="0"/>
+        </a:xfrm>
+      </p:grpSpPr>
+      <p:sp>
+        <p:nvSpPr>
+          <p:cNvPr id="10" name="Titolo 9">
+            <a:extLst>
+              <a:ext uri="{FF2B5EF4-FFF2-40B4-BE49-F238E27FC236}">
+                <a16:creationId xmlns:a16="http://schemas.microsoft.com/office/drawing/2014/main" id="{46F48351-4052-F6CF-647C-E5C5DF0177AF}"/>
+              </a:ext>
+            </a:extLst>
+          </p:cNvPr>
+          <p:cNvSpPr>
+            <a:spLocks noGrp="1"/>
+          </p:cNvSpPr>
+          <p:nvPr>
+            <p:ph type="title"/>
+          </p:nvPr>
+        </p:nvSpPr>
+        <p:spPr>
+          <a:xfrm>
+            <a:off x="762000" y="457201"/>
+            <a:ext cx="10515600" cy="538609"/>
+          </a:xfrm>
+        </p:spPr>
+        <p:txBody>
+          <a:bodyPr/>
+          <a:lstStyle/>
+          <a:p>
+            <a:r>
+              <a:rPr lang="en-GB" noProof="0" dirty="0">
+                <a:latin typeface="Arial Black" panose="020B0A04020102020204" pitchFamily="34" charset="0"/>
+              </a:rPr>
+              <a:t>Ensemble methods - Bagging</a:t>
+            </a:r>
+          </a:p>
+        </p:txBody>
+      </p:sp>
+      <p:sp>
+        <p:nvSpPr>
+          <p:cNvPr id="6" name="CasellaDiTesto 5">
+            <a:extLst>
+              <a:ext uri="{FF2B5EF4-FFF2-40B4-BE49-F238E27FC236}">
+                <a16:creationId xmlns:a16="http://schemas.microsoft.com/office/drawing/2014/main" id="{B257A7A4-DF1B-649E-EA7A-F2C593B3E444}"/>
+              </a:ext>
+            </a:extLst>
+          </p:cNvPr>
+          <p:cNvSpPr txBox="1"/>
+          <p:nvPr/>
+        </p:nvSpPr>
+        <p:spPr>
+          <a:xfrm>
+            <a:off x="762000" y="1490008"/>
+            <a:ext cx="4961415" cy="2308324"/>
+          </a:xfrm>
+          <a:prstGeom prst="rect">
+            <a:avLst/>
+          </a:prstGeom>
+          <a:noFill/>
+        </p:spPr>
+        <p:txBody>
+          <a:bodyPr wrap="square">
+            <a:spAutoFit/>
+          </a:bodyPr>
+          <a:lstStyle/>
+          <a:p>
+            <a:pPr marL="0" indent="0" algn="just">
+              <a:buNone/>
+            </a:pPr>
+            <a:r>
+              <a:rPr lang="en-GB" sz="2400" noProof="0" dirty="0">
+                <a:latin typeface="Arial" panose="020B0604020202020204" pitchFamily="34" charset="0"/>
+                <a:cs typeface="Arial" panose="020B0604020202020204" pitchFamily="34" charset="0"/>
+              </a:rPr>
+              <a:t>The residual analysis shows better results compared to previous tree-based models.</a:t>
+            </a:r>
+          </a:p>
+          <a:p>
+            <a:pPr marL="0" indent="0" algn="just">
+              <a:buNone/>
+            </a:pPr>
+            <a:endParaRPr lang="en-GB" sz="2400" noProof="0" dirty="0">
+              <a:latin typeface="Arial" panose="020B0604020202020204" pitchFamily="34" charset="0"/>
+              <a:cs typeface="Arial" panose="020B0604020202020204" pitchFamily="34" charset="0"/>
+            </a:endParaRPr>
+          </a:p>
+          <a:p>
+            <a:pPr marL="0" indent="0" algn="just">
+              <a:buNone/>
+            </a:pPr>
+            <a:r>
+              <a:rPr kumimoji="0" lang="en-GB" sz="2400" b="0" i="0" u="none" strike="noStrike" cap="none" normalizeH="0" baseline="0" noProof="0" dirty="0">
+                <a:ln>
+                  <a:noFill/>
+                </a:ln>
+                <a:solidFill>
+                  <a:schemeClr val="tx1"/>
+                </a:solidFill>
+                <a:effectLst/>
+                <a:latin typeface="Arial" panose="020B0604020202020204" pitchFamily="34" charset="0"/>
+                <a:cs typeface="Arial" panose="020B0604020202020204" pitchFamily="34" charset="0"/>
+              </a:rPr>
+              <a:t>Bagging </a:t>
+            </a:r>
+            <a:r>
+              <a:rPr kumimoji="0" lang="en-GB" sz="2400" b="1" i="0" u="none" strike="noStrike" cap="none" normalizeH="0" baseline="0" noProof="0" dirty="0">
+                <a:ln>
+                  <a:noFill/>
+                </a:ln>
+                <a:solidFill>
+                  <a:schemeClr val="tx1"/>
+                </a:solidFill>
+                <a:effectLst/>
+                <a:latin typeface="Arial" panose="020B0604020202020204" pitchFamily="34" charset="0"/>
+                <a:cs typeface="Arial" panose="020B0604020202020204" pitchFamily="34" charset="0"/>
+              </a:rPr>
+              <a:t>MSE</a:t>
+            </a:r>
+            <a:r>
+              <a:rPr kumimoji="0" lang="en-GB" sz="2400" b="0" i="0" u="none" strike="noStrike" cap="none" normalizeH="0" baseline="0" noProof="0" dirty="0">
+                <a:ln>
+                  <a:noFill/>
+                </a:ln>
+                <a:solidFill>
+                  <a:schemeClr val="tx1"/>
+                </a:solidFill>
+                <a:effectLst/>
+                <a:latin typeface="Arial" panose="020B0604020202020204" pitchFamily="34" charset="0"/>
+                <a:cs typeface="Arial" panose="020B0604020202020204" pitchFamily="34" charset="0"/>
+              </a:rPr>
+              <a:t>: 132.252</a:t>
+            </a:r>
+          </a:p>
+          <a:p>
+            <a:pPr marL="0" indent="0" algn="just">
+              <a:buNone/>
+            </a:pPr>
+            <a:r>
+              <a:rPr kumimoji="0" lang="en-GB" sz="2400" b="0" i="0" u="none" strike="noStrike" cap="none" normalizeH="0" baseline="0" noProof="0" dirty="0">
+                <a:ln>
+                  <a:noFill/>
+                </a:ln>
+                <a:solidFill>
+                  <a:schemeClr val="tx1"/>
+                </a:solidFill>
+                <a:effectLst/>
+                <a:latin typeface="Arial" panose="020B0604020202020204" pitchFamily="34" charset="0"/>
+                <a:cs typeface="Arial" panose="020B0604020202020204" pitchFamily="34" charset="0"/>
+              </a:rPr>
+              <a:t>Bagging </a:t>
+            </a:r>
+            <a:r>
+              <a:rPr kumimoji="0" lang="en-GB" sz="2400" b="1" i="0" u="none" strike="noStrike" cap="none" normalizeH="0" baseline="0" noProof="0" dirty="0">
+                <a:ln>
+                  <a:noFill/>
+                </a:ln>
+                <a:solidFill>
+                  <a:schemeClr val="tx1"/>
+                </a:solidFill>
+                <a:effectLst/>
+                <a:latin typeface="Arial" panose="020B0604020202020204" pitchFamily="34" charset="0"/>
+                <a:cs typeface="Arial" panose="020B0604020202020204" pitchFamily="34" charset="0"/>
+              </a:rPr>
+              <a:t>RMSE</a:t>
+            </a:r>
+            <a:r>
+              <a:rPr kumimoji="0" lang="en-GB" sz="2400" b="0" i="0" u="none" strike="noStrike" cap="none" normalizeH="0" baseline="0" noProof="0" dirty="0">
+                <a:ln>
+                  <a:noFill/>
+                </a:ln>
+                <a:solidFill>
+                  <a:schemeClr val="tx1"/>
+                </a:solidFill>
+                <a:effectLst/>
+                <a:latin typeface="Arial" panose="020B0604020202020204" pitchFamily="34" charset="0"/>
+                <a:cs typeface="Arial" panose="020B0604020202020204" pitchFamily="34" charset="0"/>
+              </a:rPr>
+              <a:t>: 11.500 </a:t>
+            </a:r>
+          </a:p>
+        </p:txBody>
+      </p:sp>
+      <p:sp>
+        <p:nvSpPr>
+          <p:cNvPr id="7" name="Rectangle 1">
+            <a:extLst>
+              <a:ext uri="{FF2B5EF4-FFF2-40B4-BE49-F238E27FC236}">
+                <a16:creationId xmlns:a16="http://schemas.microsoft.com/office/drawing/2014/main" id="{1E5F5393-4011-9E8C-FC6A-7589BA826015}"/>
+              </a:ext>
+            </a:extLst>
+          </p:cNvPr>
+          <p:cNvSpPr>
+            <a:spLocks noChangeArrowheads="1"/>
+          </p:cNvSpPr>
+          <p:nvPr/>
+        </p:nvSpPr>
+        <p:spPr bwMode="auto">
+          <a:xfrm>
+            <a:off x="0" y="90100"/>
+            <a:ext cx="65" cy="276999"/>
+          </a:xfrm>
+          <a:prstGeom prst="rect">
+            <a:avLst/>
+          </a:prstGeom>
+          <a:solidFill>
+            <a:srgbClr val="FFFFFF"/>
+          </a:solidFill>
+          <a:ln>
+            <a:noFill/>
+          </a:ln>
+          <a:effectLst/>
+          <a:extLst>
+            <a:ext uri="{91240B29-F687-4F45-9708-019B960494DF}">
+              <a14:hiddenLine xmlns:a14="http://schemas.microsoft.com/office/drawing/2010/main" w="9525">
+                <a:solidFill>
+                  <a:schemeClr val="tx1"/>
+                </a:solidFill>
+                <a:miter lim="800000"/>
+                <a:headEnd/>
+                <a:tailEnd/>
+              </a14:hiddenLine>
+            </a:ext>
+            <a:ext uri="{AF507438-7753-43E0-B8FC-AC1667EBCBE1}">
+              <a14:hiddenEffects xmlns:a14="http://schemas.microsoft.com/office/drawing/2010/main">
+                <a:effectLst>
+                  <a:outerShdw dist="35921" dir="2700000" algn="ctr" rotWithShape="0">
+                    <a:schemeClr val="bg2"/>
+                  </a:outerShdw>
+                </a:effectLst>
+              </a14:hiddenEffects>
+            </a:ext>
+          </a:extLst>
+        </p:spPr>
+        <p:txBody>
+          <a:bodyPr vert="horz" wrap="none" lIns="0" tIns="0" rIns="0" bIns="0" numCol="1" anchor="ctr" anchorCtr="0" compatLnSpc="1">
+            <a:prstTxWarp prst="textNoShape">
+              <a:avLst/>
+            </a:prstTxWarp>
+            <a:spAutoFit/>
+          </a:bodyPr>
+          <a:lstStyle/>
+          <a:p>
+            <a:pPr marL="0" marR="0" lvl="0" indent="0" algn="l" defTabSz="914400" rtl="0" eaLnBrk="0" fontAlgn="base" latinLnBrk="0" hangingPunct="0">
+              <a:lnSpc>
+                <a:spcPct val="100000"/>
+              </a:lnSpc>
+              <a:spcBef>
+                <a:spcPct val="0"/>
+              </a:spcBef>
+              <a:spcAft>
+                <a:spcPct val="0"/>
+              </a:spcAft>
+              <a:buClrTx/>
+              <a:buSzTx/>
+              <a:buFontTx/>
+              <a:buNone/>
+              <a:tabLst/>
+            </a:pPr>
+            <a:endParaRPr kumimoji="0" lang="en-GB" sz="1800" b="0" i="0" u="none" strike="noStrike" cap="none" normalizeH="0" baseline="0" noProof="0" dirty="0">
+              <a:ln>
+                <a:noFill/>
+              </a:ln>
+              <a:solidFill>
+                <a:schemeClr val="tx1"/>
+              </a:solidFill>
+              <a:effectLst/>
+              <a:latin typeface="Arial" panose="020B0604020202020204" pitchFamily="34" charset="0"/>
+            </a:endParaRPr>
+          </a:p>
+        </p:txBody>
+      </p:sp>
+      <p:pic>
+        <p:nvPicPr>
+          <p:cNvPr id="8" name="Immagine 7">
+            <a:extLst>
+              <a:ext uri="{FF2B5EF4-FFF2-40B4-BE49-F238E27FC236}">
+                <a16:creationId xmlns:a16="http://schemas.microsoft.com/office/drawing/2014/main" id="{544C1659-6A59-2125-B90C-8EC883077305}"/>
+              </a:ext>
+            </a:extLst>
+          </p:cNvPr>
+          <p:cNvPicPr>
+            <a:picLocks noChangeAspect="1"/>
+          </p:cNvPicPr>
+          <p:nvPr/>
+        </p:nvPicPr>
+        <p:blipFill>
+          <a:blip r:embed="rId2">
+            <a:extLst>
+              <a:ext uri="{28A0092B-C50C-407E-A947-70E740481C1C}">
+                <a14:useLocalDpi xmlns:a14="http://schemas.microsoft.com/office/drawing/2010/main" val="0"/>
+              </a:ext>
+            </a:extLst>
+          </a:blip>
+          <a:stretch>
+            <a:fillRect/>
+          </a:stretch>
+        </p:blipFill>
+        <p:spPr>
+          <a:xfrm>
+            <a:off x="5723415" y="1371600"/>
+            <a:ext cx="5562652" cy="3608379"/>
+          </a:xfrm>
+          <a:prstGeom prst="rect">
+            <a:avLst/>
+          </a:prstGeom>
+        </p:spPr>
+      </p:pic>
+    </p:spTree>
+    <p:extLst>
+      <p:ext uri="{BB962C8B-B14F-4D97-AF65-F5344CB8AC3E}">
+        <p14:creationId xmlns:p14="http://schemas.microsoft.com/office/powerpoint/2010/main" val="3259522790"/>
+      </p:ext>
+    </p:extLst>
+  </p:cSld>
+  <p:clrMapOvr>
+    <a:masterClrMapping/>
+  </p:clrMapOvr>
+</p:sld>
+</file>
+
+<file path=ppt/slides/slide38.xml><?xml version="1.0" encoding="utf-8"?>
+<p:sld xmlns:a="http://schemas.openxmlformats.org/drawingml/2006/main" xmlns:r="http://schemas.openxmlformats.org/officeDocument/2006/relationships" xmlns:p="http://schemas.openxmlformats.org/presentationml/2006/main">
+  <p:cSld>
+    <p:spTree>
+      <p:nvGrpSpPr>
+        <p:cNvPr id="1" name="">
+          <a:extLst>
+            <a:ext uri="{FF2B5EF4-FFF2-40B4-BE49-F238E27FC236}">
+              <a16:creationId xmlns:a16="http://schemas.microsoft.com/office/drawing/2014/main" id="{9E9B8CBB-3691-FF79-A307-DC27AAF05B96}"/>
+            </a:ext>
+          </a:extLst>
+        </p:cNvPr>
+        <p:cNvGrpSpPr/>
+        <p:nvPr/>
+      </p:nvGrpSpPr>
+      <p:grpSpPr>
+        <a:xfrm>
+          <a:off x="0" y="0"/>
+          <a:ext cx="0" cy="0"/>
+          <a:chOff x="0" y="0"/>
+          <a:chExt cx="0" cy="0"/>
+        </a:xfrm>
+      </p:grpSpPr>
+      <p:sp>
+        <p:nvSpPr>
+          <p:cNvPr id="10" name="Titolo 9">
+            <a:extLst>
+              <a:ext uri="{FF2B5EF4-FFF2-40B4-BE49-F238E27FC236}">
+                <a16:creationId xmlns:a16="http://schemas.microsoft.com/office/drawing/2014/main" id="{38631153-E8F8-7C82-A110-C3C3C8182F1C}"/>
+              </a:ext>
+            </a:extLst>
+          </p:cNvPr>
+          <p:cNvSpPr>
+            <a:spLocks noGrp="1"/>
+          </p:cNvSpPr>
+          <p:nvPr>
+            <p:ph type="title"/>
+          </p:nvPr>
+        </p:nvSpPr>
+        <p:spPr>
+          <a:xfrm>
+            <a:off x="762000" y="457201"/>
+            <a:ext cx="10515600" cy="538609"/>
+          </a:xfrm>
+        </p:spPr>
+        <p:txBody>
+          <a:bodyPr/>
+          <a:lstStyle/>
+          <a:p>
+            <a:r>
+              <a:rPr lang="en-GB" noProof="0" dirty="0">
+                <a:latin typeface="Arial Black" panose="020B0A04020102020204" pitchFamily="34" charset="0"/>
+              </a:rPr>
+              <a:t>Ensemble methods - Random forest</a:t>
+            </a:r>
+          </a:p>
+        </p:txBody>
+      </p:sp>
+      <p:sp>
+        <p:nvSpPr>
+          <p:cNvPr id="6" name="CasellaDiTesto 5">
+            <a:extLst>
+              <a:ext uri="{FF2B5EF4-FFF2-40B4-BE49-F238E27FC236}">
+                <a16:creationId xmlns:a16="http://schemas.microsoft.com/office/drawing/2014/main" id="{3BC4BE29-21BE-4907-E7AF-663EF9877D27}"/>
+              </a:ext>
+            </a:extLst>
+          </p:cNvPr>
+          <p:cNvSpPr txBox="1"/>
+          <p:nvPr/>
+        </p:nvSpPr>
+        <p:spPr>
+          <a:xfrm>
+            <a:off x="6705600" y="1641626"/>
+            <a:ext cx="4572000" cy="3046988"/>
+          </a:xfrm>
+          <a:prstGeom prst="rect">
+            <a:avLst/>
+          </a:prstGeom>
+          <a:noFill/>
+        </p:spPr>
+        <p:txBody>
+          <a:bodyPr wrap="square">
+            <a:spAutoFit/>
+          </a:bodyPr>
+          <a:lstStyle/>
+          <a:p>
+            <a:pPr marL="0" indent="0" algn="just">
+              <a:buNone/>
+            </a:pPr>
+            <a:r>
+              <a:rPr lang="en-GB" sz="2400" noProof="0" dirty="0">
+                <a:latin typeface="Arial" panose="020B0604020202020204" pitchFamily="34" charset="0"/>
+                <a:cs typeface="Arial" panose="020B0604020202020204" pitchFamily="34" charset="0"/>
+              </a:rPr>
+              <a:t>Using Random Forest, we select a random subset of features at each split, rather than considering all features.</a:t>
+            </a:r>
+          </a:p>
+          <a:p>
+            <a:pPr marL="0" indent="0" algn="just">
+              <a:buNone/>
+            </a:pPr>
+            <a:endParaRPr lang="en-GB" sz="2400" noProof="0" dirty="0">
+              <a:latin typeface="Arial" panose="020B0604020202020204" pitchFamily="34" charset="0"/>
+              <a:cs typeface="Arial" panose="020B0604020202020204" pitchFamily="34" charset="0"/>
+            </a:endParaRPr>
+          </a:p>
+          <a:p>
+            <a:pPr marL="0" indent="0" algn="just">
+              <a:buNone/>
+            </a:pPr>
+            <a:r>
+              <a:rPr kumimoji="0" lang="en-GB" sz="2400" b="0" i="0" u="none" strike="noStrike" cap="none" normalizeH="0" baseline="0" noProof="0" dirty="0">
+                <a:ln>
+                  <a:noFill/>
+                </a:ln>
+                <a:solidFill>
+                  <a:schemeClr val="tx1"/>
+                </a:solidFill>
+                <a:effectLst/>
+                <a:latin typeface="Arial" panose="020B0604020202020204" pitchFamily="34" charset="0"/>
+                <a:cs typeface="Arial" panose="020B0604020202020204" pitchFamily="34" charset="0"/>
+              </a:rPr>
+              <a:t>Random Forest </a:t>
+            </a:r>
+            <a:r>
+              <a:rPr kumimoji="0" lang="en-GB" sz="2400" b="1" i="0" u="none" strike="noStrike" cap="none" normalizeH="0" baseline="0" noProof="0" dirty="0">
+                <a:ln>
+                  <a:noFill/>
+                </a:ln>
+                <a:solidFill>
+                  <a:schemeClr val="tx1"/>
+                </a:solidFill>
+                <a:effectLst/>
+                <a:latin typeface="Arial" panose="020B0604020202020204" pitchFamily="34" charset="0"/>
+                <a:cs typeface="Arial" panose="020B0604020202020204" pitchFamily="34" charset="0"/>
+              </a:rPr>
+              <a:t>MSE</a:t>
+            </a:r>
+            <a:r>
+              <a:rPr kumimoji="0" lang="en-GB" sz="2400" b="0" i="0" u="none" strike="noStrike" cap="none" normalizeH="0" baseline="0" noProof="0" dirty="0">
+                <a:ln>
+                  <a:noFill/>
+                </a:ln>
+                <a:solidFill>
+                  <a:schemeClr val="tx1"/>
+                </a:solidFill>
+                <a:effectLst/>
+                <a:latin typeface="Arial" panose="020B0604020202020204" pitchFamily="34" charset="0"/>
+                <a:cs typeface="Arial" panose="020B0604020202020204" pitchFamily="34" charset="0"/>
+              </a:rPr>
+              <a:t>: 131.571</a:t>
+            </a:r>
+          </a:p>
+          <a:p>
+            <a:pPr marL="0" indent="0" algn="just">
+              <a:buNone/>
+            </a:pPr>
+            <a:r>
+              <a:rPr kumimoji="0" lang="en-GB" sz="2400" b="0" i="0" u="none" strike="noStrike" cap="none" normalizeH="0" baseline="0" noProof="0" dirty="0">
+                <a:ln>
+                  <a:noFill/>
+                </a:ln>
+                <a:solidFill>
+                  <a:schemeClr val="tx1"/>
+                </a:solidFill>
+                <a:effectLst/>
+                <a:latin typeface="Arial" panose="020B0604020202020204" pitchFamily="34" charset="0"/>
+                <a:cs typeface="Arial" panose="020B0604020202020204" pitchFamily="34" charset="0"/>
+              </a:rPr>
+              <a:t>Random Forest </a:t>
+            </a:r>
+            <a:r>
+              <a:rPr kumimoji="0" lang="en-GB" sz="2400" b="1" i="0" u="none" strike="noStrike" cap="none" normalizeH="0" baseline="0" noProof="0" dirty="0">
+                <a:ln>
+                  <a:noFill/>
+                </a:ln>
+                <a:solidFill>
+                  <a:schemeClr val="tx1"/>
+                </a:solidFill>
+                <a:effectLst/>
+                <a:latin typeface="Arial" panose="020B0604020202020204" pitchFamily="34" charset="0"/>
+                <a:cs typeface="Arial" panose="020B0604020202020204" pitchFamily="34" charset="0"/>
+              </a:rPr>
+              <a:t>RMSE</a:t>
+            </a:r>
+            <a:r>
+              <a:rPr kumimoji="0" lang="en-GB" sz="2400" b="0" i="0" u="none" strike="noStrike" cap="none" normalizeH="0" baseline="0" noProof="0" dirty="0">
+                <a:ln>
+                  <a:noFill/>
+                </a:ln>
+                <a:solidFill>
+                  <a:schemeClr val="tx1"/>
+                </a:solidFill>
+                <a:effectLst/>
+                <a:latin typeface="Arial" panose="020B0604020202020204" pitchFamily="34" charset="0"/>
+                <a:cs typeface="Arial" panose="020B0604020202020204" pitchFamily="34" charset="0"/>
+              </a:rPr>
+              <a:t>: 11.470 </a:t>
+            </a:r>
+          </a:p>
+          <a:p>
+            <a:pPr marL="0" indent="0" algn="just">
+              <a:buNone/>
+            </a:pPr>
+            <a:endParaRPr lang="en-GB" sz="2400" noProof="0" dirty="0">
+              <a:latin typeface="Arial" panose="020B0604020202020204" pitchFamily="34" charset="0"/>
+              <a:cs typeface="Arial" panose="020B0604020202020204" pitchFamily="34" charset="0"/>
+            </a:endParaRPr>
+          </a:p>
+        </p:txBody>
+      </p:sp>
+      <p:sp>
+        <p:nvSpPr>
+          <p:cNvPr id="7" name="Rectangle 1">
+            <a:extLst>
+              <a:ext uri="{FF2B5EF4-FFF2-40B4-BE49-F238E27FC236}">
+                <a16:creationId xmlns:a16="http://schemas.microsoft.com/office/drawing/2014/main" id="{75A96B43-E27E-D699-9AD3-47494C1C4667}"/>
+              </a:ext>
+            </a:extLst>
+          </p:cNvPr>
+          <p:cNvSpPr>
+            <a:spLocks noChangeArrowheads="1"/>
+          </p:cNvSpPr>
+          <p:nvPr/>
+        </p:nvSpPr>
+        <p:spPr bwMode="auto">
+          <a:xfrm>
+            <a:off x="0" y="90100"/>
+            <a:ext cx="65" cy="276999"/>
+          </a:xfrm>
+          <a:prstGeom prst="rect">
+            <a:avLst/>
+          </a:prstGeom>
+          <a:solidFill>
+            <a:srgbClr val="FFFFFF"/>
+          </a:solidFill>
+          <a:ln>
+            <a:noFill/>
+          </a:ln>
+          <a:effectLst/>
+          <a:extLst>
+            <a:ext uri="{91240B29-F687-4F45-9708-019B960494DF}">
+              <a14:hiddenLine xmlns:a14="http://schemas.microsoft.com/office/drawing/2010/main" w="9525">
+                <a:solidFill>
+                  <a:schemeClr val="tx1"/>
+                </a:solidFill>
+                <a:miter lim="800000"/>
+                <a:headEnd/>
+                <a:tailEnd/>
+              </a14:hiddenLine>
+            </a:ext>
+            <a:ext uri="{AF507438-7753-43E0-B8FC-AC1667EBCBE1}">
+              <a14:hiddenEffects xmlns:a14="http://schemas.microsoft.com/office/drawing/2010/main">
+                <a:effectLst>
+                  <a:outerShdw dist="35921" dir="2700000" algn="ctr" rotWithShape="0">
+                    <a:schemeClr val="bg2"/>
+                  </a:outerShdw>
+                </a:effectLst>
+              </a14:hiddenEffects>
+            </a:ext>
+          </a:extLst>
+        </p:spPr>
+        <p:txBody>
+          <a:bodyPr vert="horz" wrap="none" lIns="0" tIns="0" rIns="0" bIns="0" numCol="1" anchor="ctr" anchorCtr="0" compatLnSpc="1">
+            <a:prstTxWarp prst="textNoShape">
+              <a:avLst/>
+            </a:prstTxWarp>
+            <a:spAutoFit/>
+          </a:bodyPr>
+          <a:lstStyle/>
+          <a:p>
+            <a:pPr marL="0" marR="0" lvl="0" indent="0" algn="l" defTabSz="914400" rtl="0" eaLnBrk="0" fontAlgn="base" latinLnBrk="0" hangingPunct="0">
+              <a:lnSpc>
+                <a:spcPct val="100000"/>
+              </a:lnSpc>
+              <a:spcBef>
+                <a:spcPct val="0"/>
+              </a:spcBef>
+              <a:spcAft>
+                <a:spcPct val="0"/>
+              </a:spcAft>
+              <a:buClrTx/>
+              <a:buSzTx/>
+              <a:buFontTx/>
+              <a:buNone/>
+              <a:tabLst/>
+            </a:pPr>
+            <a:endParaRPr kumimoji="0" lang="en-GB" sz="1800" b="0" i="0" u="none" strike="noStrike" cap="none" normalizeH="0" baseline="0" noProof="0" dirty="0">
+              <a:ln>
+                <a:noFill/>
+              </a:ln>
+              <a:solidFill>
+                <a:schemeClr val="tx1"/>
+              </a:solidFill>
+              <a:effectLst/>
+              <a:latin typeface="Arial" panose="020B0604020202020204" pitchFamily="34" charset="0"/>
+            </a:endParaRPr>
+          </a:p>
+        </p:txBody>
+      </p:sp>
+      <p:pic>
+        <p:nvPicPr>
+          <p:cNvPr id="4" name="Immagine 3">
+            <a:extLst>
+              <a:ext uri="{FF2B5EF4-FFF2-40B4-BE49-F238E27FC236}">
+                <a16:creationId xmlns:a16="http://schemas.microsoft.com/office/drawing/2014/main" id="{FF15BE02-79AF-BF9B-4E4B-1FF62A64E86C}"/>
+              </a:ext>
+            </a:extLst>
+          </p:cNvPr>
+          <p:cNvPicPr>
+            <a:picLocks noChangeAspect="1"/>
+          </p:cNvPicPr>
+          <p:nvPr/>
+        </p:nvPicPr>
+        <p:blipFill>
+          <a:blip r:embed="rId2">
+            <a:extLst>
+              <a:ext uri="{28A0092B-C50C-407E-A947-70E740481C1C}">
+                <a14:useLocalDpi xmlns:a14="http://schemas.microsoft.com/office/drawing/2010/main" val="0"/>
+              </a:ext>
+            </a:extLst>
+          </a:blip>
+          <a:stretch>
+            <a:fillRect/>
+          </a:stretch>
+        </p:blipFill>
+        <p:spPr>
+          <a:xfrm>
+            <a:off x="762000" y="1506252"/>
+            <a:ext cx="5880545" cy="3845495"/>
+          </a:xfrm>
+          <a:prstGeom prst="rect">
+            <a:avLst/>
+          </a:prstGeom>
+        </p:spPr>
+      </p:pic>
+    </p:spTree>
+    <p:extLst>
+      <p:ext uri="{BB962C8B-B14F-4D97-AF65-F5344CB8AC3E}">
+        <p14:creationId xmlns:p14="http://schemas.microsoft.com/office/powerpoint/2010/main" val="2859495054"/>
+      </p:ext>
+    </p:extLst>
+  </p:cSld>
+  <p:clrMapOvr>
+    <a:masterClrMapping/>
+  </p:clrMapOvr>
+</p:sld>
+</file>
+
+<file path=ppt/slides/slide39.xml><?xml version="1.0" encoding="utf-8"?>
+<p:sld xmlns:a="http://schemas.openxmlformats.org/drawingml/2006/main" xmlns:r="http://schemas.openxmlformats.org/officeDocument/2006/relationships" xmlns:p="http://schemas.openxmlformats.org/presentationml/2006/main">
+  <p:cSld>
+    <p:spTree>
+      <p:nvGrpSpPr>
+        <p:cNvPr id="1" name="">
+          <a:extLst>
+            <a:ext uri="{FF2B5EF4-FFF2-40B4-BE49-F238E27FC236}">
+              <a16:creationId xmlns:a16="http://schemas.microsoft.com/office/drawing/2014/main" id="{BEB910D0-0E07-6273-BFC2-E426FADD8832}"/>
+            </a:ext>
+          </a:extLst>
+        </p:cNvPr>
+        <p:cNvGrpSpPr/>
+        <p:nvPr/>
+      </p:nvGrpSpPr>
+      <p:grpSpPr>
+        <a:xfrm>
+          <a:off x="0" y="0"/>
+          <a:ext cx="0" cy="0"/>
+          <a:chOff x="0" y="0"/>
+          <a:chExt cx="0" cy="0"/>
+        </a:xfrm>
+      </p:grpSpPr>
+      <p:sp>
+        <p:nvSpPr>
+          <p:cNvPr id="10" name="Titolo 9">
+            <a:extLst>
+              <a:ext uri="{FF2B5EF4-FFF2-40B4-BE49-F238E27FC236}">
+                <a16:creationId xmlns:a16="http://schemas.microsoft.com/office/drawing/2014/main" id="{6AF636C1-C87D-FC2D-5A2B-203E5F22761B}"/>
+              </a:ext>
+            </a:extLst>
+          </p:cNvPr>
+          <p:cNvSpPr>
+            <a:spLocks noGrp="1"/>
+          </p:cNvSpPr>
+          <p:nvPr>
+            <p:ph type="title"/>
+          </p:nvPr>
+        </p:nvSpPr>
+        <p:spPr>
+          <a:xfrm>
+            <a:off x="762000" y="457201"/>
+            <a:ext cx="10515600" cy="538609"/>
+          </a:xfrm>
+        </p:spPr>
+        <p:txBody>
+          <a:bodyPr/>
+          <a:lstStyle/>
+          <a:p>
+            <a:r>
+              <a:rPr lang="en-GB" noProof="0" dirty="0">
+                <a:latin typeface="Arial Black" panose="020B0A04020102020204" pitchFamily="34" charset="0"/>
+              </a:rPr>
+              <a:t>Ensemble methods - Boosting</a:t>
+            </a:r>
+          </a:p>
+        </p:txBody>
+      </p:sp>
+      <p:sp>
+        <p:nvSpPr>
+          <p:cNvPr id="6" name="CasellaDiTesto 5">
+            <a:extLst>
+              <a:ext uri="{FF2B5EF4-FFF2-40B4-BE49-F238E27FC236}">
+                <a16:creationId xmlns:a16="http://schemas.microsoft.com/office/drawing/2014/main" id="{E851D018-C200-2A0E-6D85-EC61728FE771}"/>
+              </a:ext>
+            </a:extLst>
+          </p:cNvPr>
+          <p:cNvSpPr txBox="1"/>
+          <p:nvPr/>
+        </p:nvSpPr>
+        <p:spPr>
+          <a:xfrm>
+            <a:off x="762000" y="1524000"/>
+            <a:ext cx="4038600" cy="3046988"/>
+          </a:xfrm>
+          <a:prstGeom prst="rect">
+            <a:avLst/>
+          </a:prstGeom>
+          <a:noFill/>
+        </p:spPr>
+        <p:txBody>
+          <a:bodyPr wrap="square">
+            <a:spAutoFit/>
+          </a:bodyPr>
+          <a:lstStyle/>
+          <a:p>
+            <a:pPr marL="0" indent="0" algn="just">
+              <a:buNone/>
+            </a:pPr>
+            <a:r>
+              <a:rPr lang="en-GB" sz="2400" noProof="0" dirty="0"/>
+              <a:t>Based on the results, it appears that Boosting is the most effective tree-based method.</a:t>
+            </a:r>
+            <a:endParaRPr lang="en-GB" sz="2400" noProof="0" dirty="0">
+              <a:latin typeface="Arial" panose="020B0604020202020204" pitchFamily="34" charset="0"/>
+              <a:cs typeface="Arial" panose="020B0604020202020204" pitchFamily="34" charset="0"/>
+            </a:endParaRPr>
+          </a:p>
+          <a:p>
+            <a:pPr marL="0" indent="0" algn="just">
+              <a:buNone/>
+            </a:pPr>
+            <a:endParaRPr lang="en-GB" sz="2400" noProof="0" dirty="0">
+              <a:latin typeface="Arial" panose="020B0604020202020204" pitchFamily="34" charset="0"/>
+              <a:cs typeface="Arial" panose="020B0604020202020204" pitchFamily="34" charset="0"/>
+            </a:endParaRPr>
+          </a:p>
+          <a:p>
+            <a:pPr marL="0" indent="0" algn="just">
+              <a:buNone/>
+            </a:pPr>
+            <a:r>
+              <a:rPr kumimoji="0" lang="en-GB" sz="2400" b="0" i="0" u="none" strike="noStrike" cap="none" normalizeH="0" baseline="0" noProof="0" dirty="0">
+                <a:ln>
+                  <a:noFill/>
+                </a:ln>
+                <a:solidFill>
+                  <a:schemeClr val="tx1"/>
+                </a:solidFill>
+                <a:effectLst/>
+                <a:latin typeface="Arial" panose="020B0604020202020204" pitchFamily="34" charset="0"/>
+                <a:cs typeface="Arial" panose="020B0604020202020204" pitchFamily="34" charset="0"/>
+              </a:rPr>
+              <a:t>Boosting </a:t>
+            </a:r>
+            <a:r>
+              <a:rPr kumimoji="0" lang="en-GB" sz="2400" b="1" i="0" u="none" strike="noStrike" cap="none" normalizeH="0" baseline="0" noProof="0" dirty="0">
+                <a:ln>
+                  <a:noFill/>
+                </a:ln>
+                <a:solidFill>
+                  <a:schemeClr val="tx1"/>
+                </a:solidFill>
+                <a:effectLst/>
+                <a:latin typeface="Arial" panose="020B0604020202020204" pitchFamily="34" charset="0"/>
+                <a:cs typeface="Arial" panose="020B0604020202020204" pitchFamily="34" charset="0"/>
+              </a:rPr>
+              <a:t>MSE</a:t>
+            </a:r>
+            <a:r>
+              <a:rPr kumimoji="0" lang="en-GB" sz="2400" b="0" i="0" u="none" strike="noStrike" cap="none" normalizeH="0" baseline="0" noProof="0" dirty="0">
+                <a:ln>
+                  <a:noFill/>
+                </a:ln>
+                <a:solidFill>
+                  <a:schemeClr val="tx1"/>
+                </a:solidFill>
+                <a:effectLst/>
+                <a:latin typeface="Arial" panose="020B0604020202020204" pitchFamily="34" charset="0"/>
+                <a:cs typeface="Arial" panose="020B0604020202020204" pitchFamily="34" charset="0"/>
+              </a:rPr>
+              <a:t>: 122.121</a:t>
+            </a:r>
+          </a:p>
+          <a:p>
+            <a:pPr marL="0" indent="0" algn="just">
+              <a:buNone/>
+            </a:pPr>
+            <a:r>
+              <a:rPr kumimoji="0" lang="en-GB" sz="2400" b="0" i="0" u="none" strike="noStrike" cap="none" normalizeH="0" baseline="0" noProof="0" dirty="0">
+                <a:ln>
+                  <a:noFill/>
+                </a:ln>
+                <a:solidFill>
+                  <a:schemeClr val="tx1"/>
+                </a:solidFill>
+                <a:effectLst/>
+                <a:latin typeface="Arial" panose="020B0604020202020204" pitchFamily="34" charset="0"/>
+                <a:cs typeface="Arial" panose="020B0604020202020204" pitchFamily="34" charset="0"/>
+              </a:rPr>
+              <a:t>Boosting </a:t>
+            </a:r>
+            <a:r>
+              <a:rPr kumimoji="0" lang="en-GB" sz="2400" b="1" i="0" u="none" strike="noStrike" cap="none" normalizeH="0" baseline="0" noProof="0" dirty="0">
+                <a:ln>
+                  <a:noFill/>
+                </a:ln>
+                <a:solidFill>
+                  <a:schemeClr val="tx1"/>
+                </a:solidFill>
+                <a:effectLst/>
+                <a:latin typeface="Arial" panose="020B0604020202020204" pitchFamily="34" charset="0"/>
+                <a:cs typeface="Arial" panose="020B0604020202020204" pitchFamily="34" charset="0"/>
+              </a:rPr>
+              <a:t>RMSE</a:t>
+            </a:r>
+            <a:r>
+              <a:rPr kumimoji="0" lang="en-GB" sz="2400" b="0" i="0" u="none" strike="noStrike" cap="none" normalizeH="0" baseline="0" noProof="0" dirty="0">
+                <a:ln>
+                  <a:noFill/>
+                </a:ln>
+                <a:solidFill>
+                  <a:schemeClr val="tx1"/>
+                </a:solidFill>
+                <a:effectLst/>
+                <a:latin typeface="Arial" panose="020B0604020202020204" pitchFamily="34" charset="0"/>
+                <a:cs typeface="Arial" panose="020B0604020202020204" pitchFamily="34" charset="0"/>
+              </a:rPr>
+              <a:t>: 11.051 </a:t>
+            </a:r>
+          </a:p>
+          <a:p>
+            <a:pPr marL="0" indent="0" algn="just">
+              <a:buNone/>
+            </a:pPr>
+            <a:endParaRPr lang="en-GB" sz="2400" noProof="0" dirty="0"/>
+          </a:p>
+        </p:txBody>
+      </p:sp>
+      <p:sp>
+        <p:nvSpPr>
+          <p:cNvPr id="7" name="Rectangle 1">
+            <a:extLst>
+              <a:ext uri="{FF2B5EF4-FFF2-40B4-BE49-F238E27FC236}">
+                <a16:creationId xmlns:a16="http://schemas.microsoft.com/office/drawing/2014/main" id="{7028EC0D-AB44-FF58-506D-78272BF0663D}"/>
+              </a:ext>
+            </a:extLst>
+          </p:cNvPr>
+          <p:cNvSpPr>
+            <a:spLocks noChangeArrowheads="1"/>
+          </p:cNvSpPr>
+          <p:nvPr/>
+        </p:nvSpPr>
+        <p:spPr bwMode="auto">
+          <a:xfrm>
+            <a:off x="0" y="90100"/>
+            <a:ext cx="65" cy="276999"/>
+          </a:xfrm>
+          <a:prstGeom prst="rect">
+            <a:avLst/>
+          </a:prstGeom>
+          <a:solidFill>
+            <a:srgbClr val="FFFFFF"/>
+          </a:solidFill>
+          <a:ln>
+            <a:noFill/>
+          </a:ln>
+          <a:effectLst/>
+          <a:extLst>
+            <a:ext uri="{91240B29-F687-4F45-9708-019B960494DF}">
+              <a14:hiddenLine xmlns:a14="http://schemas.microsoft.com/office/drawing/2010/main" w="9525">
+                <a:solidFill>
+                  <a:schemeClr val="tx1"/>
+                </a:solidFill>
+                <a:miter lim="800000"/>
+                <a:headEnd/>
+                <a:tailEnd/>
+              </a14:hiddenLine>
+            </a:ext>
+            <a:ext uri="{AF507438-7753-43E0-B8FC-AC1667EBCBE1}">
+              <a14:hiddenEffects xmlns:a14="http://schemas.microsoft.com/office/drawing/2010/main">
+                <a:effectLst>
+                  <a:outerShdw dist="35921" dir="2700000" algn="ctr" rotWithShape="0">
+                    <a:schemeClr val="bg2"/>
+                  </a:outerShdw>
+                </a:effectLst>
+              </a14:hiddenEffects>
+            </a:ext>
+          </a:extLst>
+        </p:spPr>
+        <p:txBody>
+          <a:bodyPr vert="horz" wrap="none" lIns="0" tIns="0" rIns="0" bIns="0" numCol="1" anchor="ctr" anchorCtr="0" compatLnSpc="1">
+            <a:prstTxWarp prst="textNoShape">
+              <a:avLst/>
+            </a:prstTxWarp>
+            <a:spAutoFit/>
+          </a:bodyPr>
+          <a:lstStyle/>
+          <a:p>
+            <a:pPr marL="0" marR="0" lvl="0" indent="0" algn="l" defTabSz="914400" rtl="0" eaLnBrk="0" fontAlgn="base" latinLnBrk="0" hangingPunct="0">
+              <a:lnSpc>
+                <a:spcPct val="100000"/>
+              </a:lnSpc>
+              <a:spcBef>
+                <a:spcPct val="0"/>
+              </a:spcBef>
+              <a:spcAft>
+                <a:spcPct val="0"/>
+              </a:spcAft>
+              <a:buClrTx/>
+              <a:buSzTx/>
+              <a:buFontTx/>
+              <a:buNone/>
+              <a:tabLst/>
+            </a:pPr>
+            <a:endParaRPr kumimoji="0" lang="en-GB" sz="1800" b="0" i="0" u="none" strike="noStrike" cap="none" normalizeH="0" baseline="0" noProof="0" dirty="0">
+              <a:ln>
+                <a:noFill/>
+              </a:ln>
+              <a:solidFill>
+                <a:schemeClr val="tx1"/>
+              </a:solidFill>
+              <a:effectLst/>
+              <a:latin typeface="Arial" panose="020B0604020202020204" pitchFamily="34" charset="0"/>
+            </a:endParaRPr>
+          </a:p>
+        </p:txBody>
+      </p:sp>
+      <p:pic>
+        <p:nvPicPr>
+          <p:cNvPr id="4" name="Immagine 3">
+            <a:extLst>
+              <a:ext uri="{FF2B5EF4-FFF2-40B4-BE49-F238E27FC236}">
+                <a16:creationId xmlns:a16="http://schemas.microsoft.com/office/drawing/2014/main" id="{6D939428-DE30-1A93-EF44-7583EC4CB73B}"/>
+              </a:ext>
+            </a:extLst>
+          </p:cNvPr>
+          <p:cNvPicPr>
+            <a:picLocks noChangeAspect="1"/>
+          </p:cNvPicPr>
+          <p:nvPr/>
+        </p:nvPicPr>
+        <p:blipFill>
+          <a:blip r:embed="rId2">
+            <a:extLst>
+              <a:ext uri="{28A0092B-C50C-407E-A947-70E740481C1C}">
+                <a14:useLocalDpi xmlns:a14="http://schemas.microsoft.com/office/drawing/2010/main" val="0"/>
+              </a:ext>
+            </a:extLst>
+          </a:blip>
+          <a:stretch>
+            <a:fillRect/>
+          </a:stretch>
+        </p:blipFill>
+        <p:spPr>
+          <a:xfrm>
+            <a:off x="4884550" y="1371600"/>
+            <a:ext cx="6393050" cy="3810000"/>
+          </a:xfrm>
+          <a:prstGeom prst="rect">
+            <a:avLst/>
+          </a:prstGeom>
+        </p:spPr>
+      </p:pic>
+    </p:spTree>
+    <p:extLst>
+      <p:ext uri="{BB962C8B-B14F-4D97-AF65-F5344CB8AC3E}">
+        <p14:creationId xmlns:p14="http://schemas.microsoft.com/office/powerpoint/2010/main" val="3072629954"/>
       </p:ext>
     </p:extLst>
   </p:cSld>
@@ -8107,7 +9800,7 @@
               <a:buChar char="•"/>
             </a:pPr>
             <a:r>
-              <a:rPr lang="en-GB" sz="2400" dirty="0">
+              <a:rPr lang="en-GB" sz="2400" noProof="0" dirty="0">
                 <a:solidFill>
                   <a:schemeClr val="tx1"/>
                 </a:solidFill>
@@ -8119,7 +9812,7 @@
           </a:p>
           <a:p>
             <a:pPr algn="just"/>
-            <a:endParaRPr lang="en-GB" sz="2400" dirty="0">
+            <a:endParaRPr lang="en-GB" sz="2400" noProof="0" dirty="0">
               <a:solidFill>
                 <a:schemeClr val="tx1"/>
               </a:solidFill>
@@ -8150,27 +9843,7 @@
                 <a:latin typeface="Arial" panose="020B0604020202020204" pitchFamily="34" charset="0"/>
                 <a:cs typeface="Arial" panose="020B0604020202020204" pitchFamily="34" charset="0"/>
               </a:rPr>
-              <a:t>develop statistical</a:t>
-            </a:r>
-            <a:r>
-              <a:rPr lang="en-GB" sz="2400" dirty="0">
-                <a:solidFill>
-                  <a:schemeClr val="tx1"/>
-                </a:solidFill>
-                <a:latin typeface="Arial" panose="020B0604020202020204" pitchFamily="34" charset="0"/>
-                <a:cs typeface="Arial" panose="020B0604020202020204" pitchFamily="34" charset="0"/>
-              </a:rPr>
-              <a:t> </a:t>
-            </a:r>
-            <a:r>
-              <a:rPr lang="en-GB" sz="2400" noProof="0" dirty="0">
-                <a:solidFill>
-                  <a:schemeClr val="tx1"/>
-                </a:solidFill>
-                <a:latin typeface="Arial" panose="020B0604020202020204" pitchFamily="34" charset="0"/>
-                <a:cs typeface="Arial" panose="020B0604020202020204" pitchFamily="34" charset="0"/>
-              </a:rPr>
-              <a:t>model to accurately predict delivery times and implement it into an application.</a:t>
+              <a:t>develop statistical model to accurately predict delivery times and implement it into an application.</a:t>
             </a:r>
           </a:p>
         </p:txBody>
@@ -8216,6 +9889,267 @@
     <p:extLst>
       <p:ext uri="{BB962C8B-B14F-4D97-AF65-F5344CB8AC3E}">
         <p14:creationId xmlns:p14="http://schemas.microsoft.com/office/powerpoint/2010/main" val="2586317060"/>
+      </p:ext>
+    </p:extLst>
+  </p:cSld>
+  <p:clrMapOvr>
+    <a:masterClrMapping/>
+  </p:clrMapOvr>
+</p:sld>
+</file>
+
+<file path=ppt/slides/slide40.xml><?xml version="1.0" encoding="utf-8"?>
+<p:sld xmlns:a="http://schemas.openxmlformats.org/drawingml/2006/main" xmlns:r="http://schemas.openxmlformats.org/officeDocument/2006/relationships" xmlns:p="http://schemas.openxmlformats.org/presentationml/2006/main">
+  <p:cSld>
+    <p:spTree>
+      <p:nvGrpSpPr>
+        <p:cNvPr id="1" name="">
+          <a:extLst>
+            <a:ext uri="{FF2B5EF4-FFF2-40B4-BE49-F238E27FC236}">
+              <a16:creationId xmlns:a16="http://schemas.microsoft.com/office/drawing/2014/main" id="{ACB3F7C4-4A7F-C8E7-6B10-3B7FDF6CD292}"/>
+            </a:ext>
+          </a:extLst>
+        </p:cNvPr>
+        <p:cNvGrpSpPr/>
+        <p:nvPr/>
+      </p:nvGrpSpPr>
+      <p:grpSpPr>
+        <a:xfrm>
+          <a:off x="0" y="0"/>
+          <a:ext cx="0" cy="0"/>
+          <a:chOff x="0" y="0"/>
+          <a:chExt cx="0" cy="0"/>
+        </a:xfrm>
+      </p:grpSpPr>
+      <p:sp>
+        <p:nvSpPr>
+          <p:cNvPr id="10" name="Titolo 9">
+            <a:extLst>
+              <a:ext uri="{FF2B5EF4-FFF2-40B4-BE49-F238E27FC236}">
+                <a16:creationId xmlns:a16="http://schemas.microsoft.com/office/drawing/2014/main" id="{CA8962C8-A999-AD6C-DB00-F5E8807019FC}"/>
+              </a:ext>
+            </a:extLst>
+          </p:cNvPr>
+          <p:cNvSpPr>
+            <a:spLocks noGrp="1"/>
+          </p:cNvSpPr>
+          <p:nvPr>
+            <p:ph type="title"/>
+          </p:nvPr>
+        </p:nvSpPr>
+        <p:spPr>
+          <a:xfrm>
+            <a:off x="762000" y="457201"/>
+            <a:ext cx="10515600" cy="538609"/>
+          </a:xfrm>
+        </p:spPr>
+        <p:txBody>
+          <a:bodyPr/>
+          <a:lstStyle/>
+          <a:p>
+            <a:r>
+              <a:rPr lang="en-GB" noProof="0" dirty="0">
+                <a:latin typeface="Arial Black" panose="020B0A04020102020204" pitchFamily="34" charset="0"/>
+              </a:rPr>
+              <a:t>Conclusions</a:t>
+            </a:r>
+          </a:p>
+        </p:txBody>
+      </p:sp>
+      <p:sp>
+        <p:nvSpPr>
+          <p:cNvPr id="6" name="CasellaDiTesto 5">
+            <a:extLst>
+              <a:ext uri="{FF2B5EF4-FFF2-40B4-BE49-F238E27FC236}">
+                <a16:creationId xmlns:a16="http://schemas.microsoft.com/office/drawing/2014/main" id="{4DA1385C-5543-1F5D-1EC4-BC78A7B81FBA}"/>
+              </a:ext>
+            </a:extLst>
+          </p:cNvPr>
+          <p:cNvSpPr txBox="1"/>
+          <p:nvPr/>
+        </p:nvSpPr>
+        <p:spPr>
+          <a:xfrm>
+            <a:off x="762000" y="1641626"/>
+            <a:ext cx="10515600" cy="3416320"/>
+          </a:xfrm>
+          <a:prstGeom prst="rect">
+            <a:avLst/>
+          </a:prstGeom>
+          <a:noFill/>
+        </p:spPr>
+        <p:txBody>
+          <a:bodyPr wrap="square">
+            <a:spAutoFit/>
+          </a:bodyPr>
+          <a:lstStyle/>
+          <a:p>
+            <a:pPr marL="0" indent="0">
+              <a:buNone/>
+            </a:pPr>
+            <a:r>
+              <a:rPr lang="en-GB" sz="2400" noProof="0" dirty="0">
+                <a:latin typeface="Arial" panose="020B0604020202020204" pitchFamily="34" charset="0"/>
+                <a:cs typeface="Arial" panose="020B0604020202020204" pitchFamily="34" charset="0"/>
+              </a:rPr>
+              <a:t>The best statistical model for this dataset in terms of prediction accuracy appears to be the square root transformed model:</a:t>
+            </a:r>
+          </a:p>
+          <a:p>
+            <a:pPr marL="0" indent="0">
+              <a:buNone/>
+            </a:pPr>
+            <a:endParaRPr lang="en-GB" sz="2400" noProof="0" dirty="0">
+              <a:latin typeface="Arial" panose="020B0604020202020204" pitchFamily="34" charset="0"/>
+              <a:cs typeface="Arial" panose="020B0604020202020204" pitchFamily="34" charset="0"/>
+            </a:endParaRPr>
+          </a:p>
+          <a:p>
+            <a:pPr marL="0" indent="0">
+              <a:buNone/>
+            </a:pPr>
+            <a:endParaRPr lang="en-GB" sz="2400" noProof="0" dirty="0">
+              <a:latin typeface="Arial" panose="020B0604020202020204" pitchFamily="34" charset="0"/>
+              <a:cs typeface="Arial" panose="020B0604020202020204" pitchFamily="34" charset="0"/>
+            </a:endParaRPr>
+          </a:p>
+          <a:p>
+            <a:pPr marL="0" indent="0">
+              <a:buNone/>
+            </a:pPr>
+            <a:endParaRPr lang="en-GB" sz="2400" noProof="0" dirty="0">
+              <a:latin typeface="Arial" panose="020B0604020202020204" pitchFamily="34" charset="0"/>
+              <a:cs typeface="Arial" panose="020B0604020202020204" pitchFamily="34" charset="0"/>
+            </a:endParaRPr>
+          </a:p>
+          <a:p>
+            <a:pPr marL="0" indent="0">
+              <a:buNone/>
+            </a:pPr>
+            <a:r>
+              <a:rPr lang="en-GB" sz="2400" noProof="0" dirty="0">
+                <a:latin typeface="Arial" panose="020B0604020202020204" pitchFamily="34" charset="0"/>
+                <a:cs typeface="Arial" panose="020B0604020202020204" pitchFamily="34" charset="0"/>
+              </a:rPr>
+              <a:t>Overall, linear models appear to be better fits for this dataset.</a:t>
+            </a:r>
+          </a:p>
+          <a:p>
+            <a:pPr marL="0" indent="0">
+              <a:buNone/>
+            </a:pPr>
+            <a:endParaRPr lang="en-GB" sz="2400" noProof="0" dirty="0">
+              <a:latin typeface="Arial" panose="020B0604020202020204" pitchFamily="34" charset="0"/>
+              <a:cs typeface="Arial" panose="020B0604020202020204" pitchFamily="34" charset="0"/>
+            </a:endParaRPr>
+          </a:p>
+          <a:p>
+            <a:pPr marL="0" indent="0">
+              <a:buNone/>
+            </a:pPr>
+            <a:r>
+              <a:rPr lang="en-GB" sz="2400" noProof="0" dirty="0">
+                <a:latin typeface="Arial" panose="020B0604020202020204" pitchFamily="34" charset="0"/>
+                <a:cs typeface="Arial" panose="020B0604020202020204" pitchFamily="34" charset="0"/>
+              </a:rPr>
+              <a:t>The reason might be that this set is composed of generated data, perhaps using a linear regression model like the ones utilized in this analysis.</a:t>
+            </a:r>
+          </a:p>
+        </p:txBody>
+      </p:sp>
+      <p:sp>
+        <p:nvSpPr>
+          <p:cNvPr id="7" name="Rectangle 1">
+            <a:extLst>
+              <a:ext uri="{FF2B5EF4-FFF2-40B4-BE49-F238E27FC236}">
+                <a16:creationId xmlns:a16="http://schemas.microsoft.com/office/drawing/2014/main" id="{A95EC8D4-42E7-3603-612D-A70F0B92347B}"/>
+              </a:ext>
+            </a:extLst>
+          </p:cNvPr>
+          <p:cNvSpPr>
+            <a:spLocks noChangeArrowheads="1"/>
+          </p:cNvSpPr>
+          <p:nvPr/>
+        </p:nvSpPr>
+        <p:spPr bwMode="auto">
+          <a:xfrm>
+            <a:off x="0" y="90100"/>
+            <a:ext cx="65" cy="276999"/>
+          </a:xfrm>
+          <a:prstGeom prst="rect">
+            <a:avLst/>
+          </a:prstGeom>
+          <a:solidFill>
+            <a:srgbClr val="FFFFFF"/>
+          </a:solidFill>
+          <a:ln>
+            <a:noFill/>
+          </a:ln>
+          <a:effectLst/>
+          <a:extLst>
+            <a:ext uri="{91240B29-F687-4F45-9708-019B960494DF}">
+              <a14:hiddenLine xmlns:a14="http://schemas.microsoft.com/office/drawing/2010/main" w="9525">
+                <a:solidFill>
+                  <a:schemeClr val="tx1"/>
+                </a:solidFill>
+                <a:miter lim="800000"/>
+                <a:headEnd/>
+                <a:tailEnd/>
+              </a14:hiddenLine>
+            </a:ext>
+            <a:ext uri="{AF507438-7753-43E0-B8FC-AC1667EBCBE1}">
+              <a14:hiddenEffects xmlns:a14="http://schemas.microsoft.com/office/drawing/2010/main">
+                <a:effectLst>
+                  <a:outerShdw dist="35921" dir="2700000" algn="ctr" rotWithShape="0">
+                    <a:schemeClr val="bg2"/>
+                  </a:outerShdw>
+                </a:effectLst>
+              </a14:hiddenEffects>
+            </a:ext>
+          </a:extLst>
+        </p:spPr>
+        <p:txBody>
+          <a:bodyPr vert="horz" wrap="none" lIns="0" tIns="0" rIns="0" bIns="0" numCol="1" anchor="ctr" anchorCtr="0" compatLnSpc="1">
+            <a:prstTxWarp prst="textNoShape">
+              <a:avLst/>
+            </a:prstTxWarp>
+            <a:spAutoFit/>
+          </a:bodyPr>
+          <a:lstStyle/>
+          <a:p>
+            <a:pPr marL="0" marR="0" lvl="0" indent="0" algn="l" defTabSz="914400" rtl="0" eaLnBrk="0" fontAlgn="base" latinLnBrk="0" hangingPunct="0">
+              <a:lnSpc>
+                <a:spcPct val="100000"/>
+              </a:lnSpc>
+              <a:spcBef>
+                <a:spcPct val="0"/>
+              </a:spcBef>
+              <a:spcAft>
+                <a:spcPct val="0"/>
+              </a:spcAft>
+              <a:buClrTx/>
+              <a:buSzTx/>
+              <a:buFontTx/>
+              <a:buNone/>
+              <a:tabLst/>
+            </a:pPr>
+            <a:endParaRPr kumimoji="0" lang="en-GB" sz="1800" b="0" i="0" u="none" strike="noStrike" cap="none" normalizeH="0" baseline="0" noProof="0" dirty="0">
+              <a:ln>
+                <a:noFill/>
+              </a:ln>
+              <a:solidFill>
+                <a:schemeClr val="tx1"/>
+              </a:solidFill>
+              <a:effectLst/>
+              <a:latin typeface="Arial" panose="020B0604020202020204" pitchFamily="34" charset="0"/>
+            </a:endParaRPr>
+          </a:p>
+        </p:txBody>
+      </p:sp>
+    </p:spTree>
+    <p:extLst>
+      <p:ext uri="{BB962C8B-B14F-4D97-AF65-F5344CB8AC3E}">
+        <p14:creationId xmlns:p14="http://schemas.microsoft.com/office/powerpoint/2010/main" val="1315467376"/>
       </p:ext>
     </p:extLst>
   </p:cSld>
@@ -8275,27 +10209,24 @@
           <a:lstStyle/>
           <a:p>
             <a:r>
-              <a:rPr lang="en-US" b="0" noProof="0" dirty="0">
+              <a:rPr lang="en-GB" b="0" noProof="0" dirty="0">
                 <a:latin typeface="Arial" panose="020B0604020202020204" pitchFamily="34" charset="0"/>
                 <a:cs typeface="Arial" panose="020B0604020202020204" pitchFamily="34" charset="0"/>
               </a:rPr>
               <a:t>Selected dataset:</a:t>
             </a:r>
             <a:br>
-              <a:rPr lang="en-US" b="0" noProof="0" dirty="0">
+              <a:rPr lang="en-GB" b="0" noProof="0" dirty="0">
                 <a:latin typeface="Arial" panose="020B0604020202020204" pitchFamily="34" charset="0"/>
                 <a:cs typeface="Arial" panose="020B0604020202020204" pitchFamily="34" charset="0"/>
               </a:rPr>
             </a:br>
             <a:r>
-              <a:rPr lang="en-US" noProof="0" dirty="0">
+              <a:rPr lang="en-GB" noProof="0" dirty="0">
                 <a:latin typeface="Arial Black" panose="020B0A04020102020204" pitchFamily="34" charset="0"/>
               </a:rPr>
               <a:t>Food Delivery Time Prediction</a:t>
             </a:r>
-            <a:endParaRPr lang="en-GB" noProof="0" dirty="0">
-              <a:latin typeface="Arial Black" panose="020B0A04020102020204" pitchFamily="34" charset="0"/>
-            </a:endParaRPr>
           </a:p>
         </p:txBody>
       </p:sp>
@@ -8533,14 +10464,7 @@
                 <a:latin typeface="Arial" panose="020B0604020202020204" pitchFamily="34" charset="0"/>
                 <a:cs typeface="Arial" panose="020B0604020202020204" pitchFamily="34" charset="0"/>
               </a:rPr>
-              <a:t>Distance (km</a:t>
-            </a:r>
-            <a:r>
-              <a:rPr lang="en-GB" sz="2400" b="1" dirty="0">
-                <a:latin typeface="Arial" panose="020B0604020202020204" pitchFamily="34" charset="0"/>
-                <a:cs typeface="Arial" panose="020B0604020202020204" pitchFamily="34" charset="0"/>
-              </a:rPr>
-              <a:t>)</a:t>
+              <a:t>Distance (km)</a:t>
             </a:r>
             <a:r>
               <a:rPr lang="en-GB" sz="2400" noProof="0" dirty="0">
@@ -8549,10 +10473,6 @@
               </a:rPr>
               <a:t>: The order delivery distance </a:t>
             </a:r>
-            <a:endParaRPr lang="en-GB" sz="2400" dirty="0">
-              <a:latin typeface="Arial" panose="020B0604020202020204" pitchFamily="34" charset="0"/>
-              <a:cs typeface="Arial" panose="020B0604020202020204" pitchFamily="34" charset="0"/>
-            </a:endParaRPr>
           </a:p>
           <a:p>
             <a:pPr marL="342900" indent="-342900" algn="l" fontAlgn="base">
@@ -8613,21 +10533,7 @@
                 <a:latin typeface="Arial" panose="020B0604020202020204" pitchFamily="34" charset="0"/>
                 <a:cs typeface="Arial" panose="020B0604020202020204" pitchFamily="34" charset="0"/>
               </a:rPr>
-              <a:t>Time of</a:t>
-            </a:r>
-            <a:r>
-              <a:rPr lang="en-GB" sz="2400" b="1" dirty="0">
-                <a:latin typeface="Arial" panose="020B0604020202020204" pitchFamily="34" charset="0"/>
-                <a:cs typeface="Arial" panose="020B0604020202020204" pitchFamily="34" charset="0"/>
-              </a:rPr>
-              <a:t> </a:t>
-            </a:r>
-            <a:r>
-              <a:rPr lang="en-GB" sz="2400" b="1" noProof="0" dirty="0">
-                <a:latin typeface="Arial" panose="020B0604020202020204" pitchFamily="34" charset="0"/>
-                <a:cs typeface="Arial" panose="020B0604020202020204" pitchFamily="34" charset="0"/>
-              </a:rPr>
-              <a:t>Day</a:t>
+              <a:t>Time of Day</a:t>
             </a:r>
             <a:r>
               <a:rPr lang="en-GB" sz="2400" noProof="0" dirty="0">
@@ -8673,28 +10579,7 @@
                 <a:latin typeface="Arial" panose="020B0604020202020204" pitchFamily="34" charset="0"/>
                 <a:cs typeface="Arial" panose="020B0604020202020204" pitchFamily="34" charset="0"/>
               </a:rPr>
-              <a:t>Preparation Time</a:t>
-            </a:r>
-            <a:r>
-              <a:rPr lang="en-GB" sz="2400" b="1" dirty="0">
-                <a:latin typeface="Arial" panose="020B0604020202020204" pitchFamily="34" charset="0"/>
-                <a:cs typeface="Arial" panose="020B0604020202020204" pitchFamily="34" charset="0"/>
-              </a:rPr>
-              <a:t> (</a:t>
-            </a:r>
-            <a:r>
-              <a:rPr lang="en-GB" sz="2400" b="1" noProof="0" dirty="0">
-                <a:latin typeface="Arial" panose="020B0604020202020204" pitchFamily="34" charset="0"/>
-                <a:cs typeface="Arial" panose="020B0604020202020204" pitchFamily="34" charset="0"/>
-              </a:rPr>
-              <a:t>min</a:t>
-            </a:r>
-            <a:r>
-              <a:rPr lang="en-GB" sz="2400" b="1" dirty="0">
-                <a:latin typeface="Arial" panose="020B0604020202020204" pitchFamily="34" charset="0"/>
-                <a:cs typeface="Arial" panose="020B0604020202020204" pitchFamily="34" charset="0"/>
-              </a:rPr>
-              <a:t>)</a:t>
+              <a:t>Preparation Time (min)</a:t>
             </a:r>
             <a:r>
               <a:rPr lang="en-GB" sz="2400" noProof="0" dirty="0">
@@ -8717,28 +10602,7 @@
                 <a:latin typeface="Arial" panose="020B0604020202020204" pitchFamily="34" charset="0"/>
                 <a:cs typeface="Arial" panose="020B0604020202020204" pitchFamily="34" charset="0"/>
               </a:rPr>
-              <a:t>Courier Experience</a:t>
-            </a:r>
-            <a:r>
-              <a:rPr lang="en-GB" sz="2400" b="1" dirty="0">
-                <a:latin typeface="Arial" panose="020B0604020202020204" pitchFamily="34" charset="0"/>
-                <a:cs typeface="Arial" panose="020B0604020202020204" pitchFamily="34" charset="0"/>
-              </a:rPr>
-              <a:t> (</a:t>
-            </a:r>
-            <a:r>
-              <a:rPr lang="en-GB" sz="2400" b="1" noProof="0" dirty="0">
-                <a:latin typeface="Arial" panose="020B0604020202020204" pitchFamily="34" charset="0"/>
-                <a:cs typeface="Arial" panose="020B0604020202020204" pitchFamily="34" charset="0"/>
-              </a:rPr>
-              <a:t>years</a:t>
-            </a:r>
-            <a:r>
-              <a:rPr lang="en-GB" sz="2400" b="1" dirty="0">
-                <a:latin typeface="Arial" panose="020B0604020202020204" pitchFamily="34" charset="0"/>
-                <a:cs typeface="Arial" panose="020B0604020202020204" pitchFamily="34" charset="0"/>
-              </a:rPr>
-              <a:t>)</a:t>
+              <a:t>Courier Experience (years)</a:t>
             </a:r>
             <a:r>
               <a:rPr lang="en-GB" sz="2400" noProof="0" dirty="0">
@@ -8764,37 +10628,7 @@
                 <a:latin typeface="Arial" panose="020B0604020202020204" pitchFamily="34" charset="0"/>
                 <a:cs typeface="Arial" panose="020B0604020202020204" pitchFamily="34" charset="0"/>
               </a:rPr>
-              <a:t>Delivery Time</a:t>
-            </a:r>
-            <a:r>
-              <a:rPr lang="en-GB" sz="2400" b="1" u="sng" dirty="0">
-                <a:solidFill>
-                  <a:srgbClr val="FF0000"/>
-                </a:solidFill>
-                <a:latin typeface="Arial" panose="020B0604020202020204" pitchFamily="34" charset="0"/>
-                <a:cs typeface="Arial" panose="020B0604020202020204" pitchFamily="34" charset="0"/>
-              </a:rPr>
-              <a:t> (</a:t>
-            </a:r>
-            <a:r>
-              <a:rPr lang="en-GB" sz="2400" b="1" u="sng" noProof="0" dirty="0">
-                <a:solidFill>
-                  <a:srgbClr val="FF0000"/>
-                </a:solidFill>
-                <a:latin typeface="Arial" panose="020B0604020202020204" pitchFamily="34" charset="0"/>
-                <a:cs typeface="Arial" panose="020B0604020202020204" pitchFamily="34" charset="0"/>
-              </a:rPr>
-              <a:t>min</a:t>
-            </a:r>
-            <a:r>
-              <a:rPr lang="en-GB" sz="2400" b="1" u="sng" dirty="0">
-                <a:solidFill>
-                  <a:srgbClr val="FF0000"/>
-                </a:solidFill>
-                <a:latin typeface="Arial" panose="020B0604020202020204" pitchFamily="34" charset="0"/>
-                <a:cs typeface="Arial" panose="020B0604020202020204" pitchFamily="34" charset="0"/>
-              </a:rPr>
-              <a:t>)</a:t>
+              <a:t>Delivery Time (min)</a:t>
             </a:r>
             <a:r>
               <a:rPr lang="en-GB" sz="2400" noProof="0" dirty="0">
@@ -8879,14 +10713,11 @@
           <a:lstStyle/>
           <a:p>
             <a:r>
-              <a:rPr lang="en-GB" dirty="0">
+              <a:rPr lang="en-GB" noProof="0" dirty="0">
                 <a:latin typeface="Arial Black" panose="020B0A04020102020204" pitchFamily="34" charset="0"/>
               </a:rPr>
               <a:t>Preliminary analysis</a:t>
             </a:r>
-            <a:endParaRPr lang="en-GB" noProof="0" dirty="0">
-              <a:latin typeface="Arial Black" panose="020B0A04020102020204" pitchFamily="34" charset="0"/>
-            </a:endParaRPr>
           </a:p>
         </p:txBody>
       </p:sp>
@@ -8923,14 +10754,7 @@
                 <a:latin typeface="Arial" panose="020B0604020202020204" pitchFamily="34" charset="0"/>
                 <a:cs typeface="Arial" panose="020B0604020202020204" pitchFamily="34" charset="0"/>
               </a:rPr>
-              <a:t>The dataset contain</a:t>
-            </a:r>
-            <a:r>
-              <a:rPr lang="en-GB" sz="2400" dirty="0">
-                <a:latin typeface="Arial" panose="020B0604020202020204" pitchFamily="34" charset="0"/>
-                <a:cs typeface="Arial" panose="020B0604020202020204" pitchFamily="34" charset="0"/>
-              </a:rPr>
-              <a:t>ed </a:t>
+              <a:t>The dataset contained </a:t>
             </a:r>
             <a:r>
               <a:rPr lang="en-GB" sz="2400" b="1" noProof="0" dirty="0">
@@ -8944,41 +10768,37 @@
               <a:t>rows</a:t>
             </a:r>
             <a:r>
-              <a:rPr lang="en-GB" sz="2400" dirty="0"/>
+              <a:rPr lang="en-GB" sz="2400" noProof="0" dirty="0"/>
               <a:t>, reduced to </a:t>
             </a:r>
             <a:r>
-              <a:rPr lang="en-GB" sz="2400" b="1" dirty="0"/>
+              <a:rPr lang="en-GB" sz="2400" b="1" noProof="0" dirty="0"/>
               <a:t>883</a:t>
             </a:r>
             <a:r>
-              <a:rPr lang="en-GB" sz="2400" dirty="0"/>
+              <a:rPr lang="en-GB" sz="2400" noProof="0" dirty="0"/>
               <a:t> after removal of rows with null values.</a:t>
             </a:r>
           </a:p>
           <a:p>
-            <a:endParaRPr lang="en-GB" sz="2400" dirty="0"/>
-          </a:p>
-          <a:p>
-            <a:r>
-              <a:rPr lang="en-GB" sz="2400" dirty="0"/>
-              <a:t>We then removed outliers using the </a:t>
-            </a:r>
+            <a:endParaRPr lang="en-GB" sz="2400" noProof="0" dirty="0"/>
+          </a:p>
+          <a:p>
             <a:r>
               <a:rPr lang="en-GB" sz="2400" noProof="0" dirty="0"/>
-              <a:t>Interquartile Range (IQR) method.</a:t>
-            </a:r>
-          </a:p>
-          <a:p>
-            <a:endParaRPr lang="en-GB" sz="2400" dirty="0"/>
-          </a:p>
-          <a:p>
-            <a:r>
-              <a:rPr lang="en-GB" sz="2400" dirty="0"/>
+              <a:t>We then removed outliers using the Interquartile Range (IQR) method.</a:t>
+            </a:r>
+          </a:p>
+          <a:p>
+            <a:endParaRPr lang="en-GB" sz="2400" noProof="0" dirty="0"/>
+          </a:p>
+          <a:p>
+            <a:r>
+              <a:rPr lang="en-GB" sz="2400" noProof="0" dirty="0"/>
               <a:t>Remaining rows: </a:t>
             </a:r>
             <a:r>
-              <a:rPr lang="en-GB" sz="2400" b="1" dirty="0"/>
+              <a:rPr lang="en-GB" sz="2400" b="1" noProof="0" dirty="0"/>
               <a:t>879</a:t>
             </a:r>
           </a:p>
@@ -9068,19 +10888,7 @@
               <a:rPr lang="en-GB" noProof="0" dirty="0">
                 <a:latin typeface="Arial Black" panose="020B0A04020102020204" pitchFamily="34" charset="0"/>
               </a:rPr>
-              <a:t>Data </a:t>
-            </a:r>
-            <a:r>
-              <a:rPr lang="en-GB" noProof="0" dirty="0" err="1">
-                <a:latin typeface="Arial Black" panose="020B0A04020102020204" pitchFamily="34" charset="0"/>
-              </a:rPr>
-              <a:t>Distribuition</a:t>
-            </a:r>
-            <a:r>
-              <a:rPr lang="en-GB" noProof="0" dirty="0">
-                <a:latin typeface="Arial Black" panose="020B0A04020102020204" pitchFamily="34" charset="0"/>
-              </a:rPr>
-              <a:t> - </a:t>
+              <a:t>Data Distribution - </a:t>
             </a:r>
             <a:r>
               <a:rPr lang="en-GB" noProof="0" dirty="0">
@@ -9230,19 +11038,7 @@
               <a:rPr lang="en-GB" noProof="0" dirty="0">
                 <a:latin typeface="Arial Black" panose="020B0A04020102020204" pitchFamily="34" charset="0"/>
               </a:rPr>
-              <a:t>Data </a:t>
-            </a:r>
-            <a:r>
-              <a:rPr lang="en-GB" noProof="0" dirty="0" err="1">
-                <a:latin typeface="Arial Black" panose="020B0A04020102020204" pitchFamily="34" charset="0"/>
-              </a:rPr>
-              <a:t>Distribuition</a:t>
-            </a:r>
-            <a:r>
-              <a:rPr lang="en-GB" noProof="0" dirty="0">
-                <a:latin typeface="Arial Black" panose="020B0A04020102020204" pitchFamily="34" charset="0"/>
-              </a:rPr>
-              <a:t> - </a:t>
+              <a:t>Data Distribution - </a:t>
             </a:r>
             <a:r>
               <a:rPr lang="en-GB" noProof="0" dirty="0">

</xml_diff>